<commit_message>
Basic task is ready
-rotates in dec points
-gives a warning if the dec is wrong
-goes to the next target if the answer is correct
-saves all the reaction times and error number
</commit_message>
<xml_diff>
--- a/Route_Following/Explanations.pptx
+++ b/Route_Following/Explanations.pptx
@@ -11,7 +11,17 @@
     <p:sldId id="260" r:id="rId5"/>
     <p:sldId id="258" r:id="rId6"/>
     <p:sldId id="261" r:id="rId7"/>
-    <p:sldId id="263" r:id="rId8"/>
+    <p:sldId id="264" r:id="rId8"/>
+    <p:sldId id="263" r:id="rId9"/>
+    <p:sldId id="265" r:id="rId10"/>
+    <p:sldId id="268" r:id="rId11"/>
+    <p:sldId id="267" r:id="rId12"/>
+    <p:sldId id="266" r:id="rId13"/>
+    <p:sldId id="270" r:id="rId14"/>
+    <p:sldId id="269" r:id="rId15"/>
+    <p:sldId id="271" r:id="rId16"/>
+    <p:sldId id="272" r:id="rId17"/>
+    <p:sldId id="273" r:id="rId18"/>
   </p:sldIdLst>
   <p:sldSz cx="12192000" cy="6858000"/>
   <p:notesSz cx="6858000" cy="9144000"/>
@@ -110,6 +120,11 @@
       </a:defRPr>
     </a:lvl9pPr>
   </p:defaultTextStyle>
+  <p:extLst>
+    <p:ext uri="{EFAFB233-063F-42B5-8137-9DF3F51BA10A}">
+      <p15:sldGuideLst xmlns:p15="http://schemas.microsoft.com/office/powerpoint/2012/main"/>
+    </p:ext>
+  </p:extLst>
 </p:presentation>
 </file>
 
@@ -118,7 +133,7 @@
   <pc:docChgLst>
     <pc:chgData name="Hatice Dedetas" userId="0f1ed94a-1d65-4e39-8c1f-69d4ca4b7cee" providerId="ADAL" clId="{39B2A147-5B08-4919-8EC3-FE551673579F}"/>
     <pc:docChg chg="undo custSel addSld delSld modSld sldOrd">
-      <pc:chgData name="Hatice Dedetas" userId="0f1ed94a-1d65-4e39-8c1f-69d4ca4b7cee" providerId="ADAL" clId="{39B2A147-5B08-4919-8EC3-FE551673579F}" dt="2023-06-23T15:49:20.107" v="829" actId="20577"/>
+      <pc:chgData name="Hatice Dedetas" userId="0f1ed94a-1d65-4e39-8c1f-69d4ca4b7cee" providerId="ADAL" clId="{39B2A147-5B08-4919-8EC3-FE551673579F}" dt="2023-06-29T17:07:42.579" v="3980" actId="1076"/>
       <pc:docMkLst>
         <pc:docMk/>
       </pc:docMkLst>
@@ -292,13 +307,6 @@
           </ac:spMkLst>
         </pc:spChg>
       </pc:sldChg>
-      <pc:sldChg chg="add del">
-        <pc:chgData name="Hatice Dedetas" userId="0f1ed94a-1d65-4e39-8c1f-69d4ca4b7cee" providerId="ADAL" clId="{39B2A147-5B08-4919-8EC3-FE551673579F}" dt="2023-06-23T15:49:12.991" v="809" actId="2696"/>
-        <pc:sldMkLst>
-          <pc:docMk/>
-          <pc:sldMk cId="43552252" sldId="262"/>
-        </pc:sldMkLst>
-      </pc:sldChg>
       <pc:sldChg chg="modSp add">
         <pc:chgData name="Hatice Dedetas" userId="0f1ed94a-1d65-4e39-8c1f-69d4ca4b7cee" providerId="ADAL" clId="{39B2A147-5B08-4919-8EC3-FE551673579F}" dt="2023-06-23T15:49:20.107" v="829" actId="20577"/>
         <pc:sldMkLst>
@@ -311,6 +319,308 @@
             <pc:docMk/>
             <pc:sldMk cId="2662140163" sldId="263"/>
             <ac:spMk id="2" creationId="{4665C8CF-18FA-4F21-8E50-70CBBB143081}"/>
+          </ac:spMkLst>
+        </pc:spChg>
+      </pc:sldChg>
+      <pc:sldChg chg="addSp modSp add">
+        <pc:chgData name="Hatice Dedetas" userId="0f1ed94a-1d65-4e39-8c1f-69d4ca4b7cee" providerId="ADAL" clId="{39B2A147-5B08-4919-8EC3-FE551673579F}" dt="2023-06-26T10:16:13.041" v="1967" actId="1037"/>
+        <pc:sldMkLst>
+          <pc:docMk/>
+          <pc:sldMk cId="2525323788" sldId="264"/>
+        </pc:sldMkLst>
+        <pc:spChg chg="mod">
+          <ac:chgData name="Hatice Dedetas" userId="0f1ed94a-1d65-4e39-8c1f-69d4ca4b7cee" providerId="ADAL" clId="{39B2A147-5B08-4919-8EC3-FE551673579F}" dt="2023-06-26T10:04:47.459" v="899" actId="20577"/>
+          <ac:spMkLst>
+            <pc:docMk/>
+            <pc:sldMk cId="2525323788" sldId="264"/>
+            <ac:spMk id="2" creationId="{94632AE7-3AF1-4AC5-AEF8-AF0B119A989C}"/>
+          </ac:spMkLst>
+        </pc:spChg>
+        <pc:spChg chg="mod">
+          <ac:chgData name="Hatice Dedetas" userId="0f1ed94a-1d65-4e39-8c1f-69d4ca4b7cee" providerId="ADAL" clId="{39B2A147-5B08-4919-8EC3-FE551673579F}" dt="2023-06-26T10:15:26.722" v="1943" actId="20577"/>
+          <ac:spMkLst>
+            <pc:docMk/>
+            <pc:sldMk cId="2525323788" sldId="264"/>
+            <ac:spMk id="3" creationId="{B176D1DE-E506-4C8B-85C4-722B3200E3BB}"/>
+          </ac:spMkLst>
+        </pc:spChg>
+        <pc:spChg chg="add mod">
+          <ac:chgData name="Hatice Dedetas" userId="0f1ed94a-1d65-4e39-8c1f-69d4ca4b7cee" providerId="ADAL" clId="{39B2A147-5B08-4919-8EC3-FE551673579F}" dt="2023-06-26T10:16:13.041" v="1967" actId="1037"/>
+          <ac:spMkLst>
+            <pc:docMk/>
+            <pc:sldMk cId="2525323788" sldId="264"/>
+            <ac:spMk id="5" creationId="{79CEA022-660C-4B15-9723-8888FC56D694}"/>
+          </ac:spMkLst>
+        </pc:spChg>
+        <pc:picChg chg="add mod">
+          <ac:chgData name="Hatice Dedetas" userId="0f1ed94a-1d65-4e39-8c1f-69d4ca4b7cee" providerId="ADAL" clId="{39B2A147-5B08-4919-8EC3-FE551673579F}" dt="2023-06-26T10:15:53.940" v="1952" actId="1076"/>
+          <ac:picMkLst>
+            <pc:docMk/>
+            <pc:sldMk cId="2525323788" sldId="264"/>
+            <ac:picMk id="4" creationId="{72FDA21B-A7E5-4E73-882A-8F02F31F7A59}"/>
+          </ac:picMkLst>
+        </pc:picChg>
+      </pc:sldChg>
+      <pc:sldChg chg="addSp delSp modSp add">
+        <pc:chgData name="Hatice Dedetas" userId="0f1ed94a-1d65-4e39-8c1f-69d4ca4b7cee" providerId="ADAL" clId="{39B2A147-5B08-4919-8EC3-FE551673579F}" dt="2023-06-26T10:13:20.559" v="1616" actId="20577"/>
+        <pc:sldMkLst>
+          <pc:docMk/>
+          <pc:sldMk cId="3835119679" sldId="265"/>
+        </pc:sldMkLst>
+        <pc:spChg chg="del">
+          <ac:chgData name="Hatice Dedetas" userId="0f1ed94a-1d65-4e39-8c1f-69d4ca4b7cee" providerId="ADAL" clId="{39B2A147-5B08-4919-8EC3-FE551673579F}" dt="2023-06-26T10:11:35.952" v="1486" actId="478"/>
+          <ac:spMkLst>
+            <pc:docMk/>
+            <pc:sldMk cId="3835119679" sldId="265"/>
+            <ac:spMk id="2" creationId="{CFF0AC17-C216-4C9F-A32F-085E0CEE4035}"/>
+          </ac:spMkLst>
+        </pc:spChg>
+        <pc:spChg chg="mod">
+          <ac:chgData name="Hatice Dedetas" userId="0f1ed94a-1d65-4e39-8c1f-69d4ca4b7cee" providerId="ADAL" clId="{39B2A147-5B08-4919-8EC3-FE551673579F}" dt="2023-06-26T10:13:20.559" v="1616" actId="20577"/>
+          <ac:spMkLst>
+            <pc:docMk/>
+            <pc:sldMk cId="3835119679" sldId="265"/>
+            <ac:spMk id="3" creationId="{E9CA1E7D-8E65-45A9-AA1D-86C64EECE4AE}"/>
+          </ac:spMkLst>
+        </pc:spChg>
+        <pc:spChg chg="add mod">
+          <ac:chgData name="Hatice Dedetas" userId="0f1ed94a-1d65-4e39-8c1f-69d4ca4b7cee" providerId="ADAL" clId="{39B2A147-5B08-4919-8EC3-FE551673579F}" dt="2023-06-26T10:09:48.222" v="1277" actId="1038"/>
+          <ac:spMkLst>
+            <pc:docMk/>
+            <pc:sldMk cId="3835119679" sldId="265"/>
+            <ac:spMk id="5" creationId="{A3AE4026-02B2-47CC-A4B5-9A07A2746536}"/>
+          </ac:spMkLst>
+        </pc:spChg>
+        <pc:picChg chg="add mod">
+          <ac:chgData name="Hatice Dedetas" userId="0f1ed94a-1d65-4e39-8c1f-69d4ca4b7cee" providerId="ADAL" clId="{39B2A147-5B08-4919-8EC3-FE551673579F}" dt="2023-06-26T10:12:53.767" v="1607" actId="1076"/>
+          <ac:picMkLst>
+            <pc:docMk/>
+            <pc:sldMk cId="3835119679" sldId="265"/>
+            <ac:picMk id="4" creationId="{DC189001-50F8-47A2-A49D-02BFE9BFB8C2}"/>
+          </ac:picMkLst>
+        </pc:picChg>
+        <pc:picChg chg="add mod modCrop">
+          <ac:chgData name="Hatice Dedetas" userId="0f1ed94a-1d65-4e39-8c1f-69d4ca4b7cee" providerId="ADAL" clId="{39B2A147-5B08-4919-8EC3-FE551673579F}" dt="2023-06-26T10:12:55.087" v="1608" actId="1076"/>
+          <ac:picMkLst>
+            <pc:docMk/>
+            <pc:sldMk cId="3835119679" sldId="265"/>
+            <ac:picMk id="6" creationId="{EA862B0C-F239-4D9B-A8B5-A0A23240EB7A}"/>
+          </ac:picMkLst>
+        </pc:picChg>
+      </pc:sldChg>
+      <pc:sldChg chg="modSp add">
+        <pc:chgData name="Hatice Dedetas" userId="0f1ed94a-1d65-4e39-8c1f-69d4ca4b7cee" providerId="ADAL" clId="{39B2A147-5B08-4919-8EC3-FE551673579F}" dt="2023-06-26T10:20:35.408" v="2301" actId="20577"/>
+        <pc:sldMkLst>
+          <pc:docMk/>
+          <pc:sldMk cId="748826352" sldId="266"/>
+        </pc:sldMkLst>
+        <pc:spChg chg="mod">
+          <ac:chgData name="Hatice Dedetas" userId="0f1ed94a-1d65-4e39-8c1f-69d4ca4b7cee" providerId="ADAL" clId="{39B2A147-5B08-4919-8EC3-FE551673579F}" dt="2023-06-26T10:17:21.491" v="1980" actId="20577"/>
+          <ac:spMkLst>
+            <pc:docMk/>
+            <pc:sldMk cId="748826352" sldId="266"/>
+            <ac:spMk id="2" creationId="{687C739F-86A8-4EB0-95DA-964C7D2E718D}"/>
+          </ac:spMkLst>
+        </pc:spChg>
+        <pc:spChg chg="mod">
+          <ac:chgData name="Hatice Dedetas" userId="0f1ed94a-1d65-4e39-8c1f-69d4ca4b7cee" providerId="ADAL" clId="{39B2A147-5B08-4919-8EC3-FE551673579F}" dt="2023-06-26T10:20:35.408" v="2301" actId="20577"/>
+          <ac:spMkLst>
+            <pc:docMk/>
+            <pc:sldMk cId="748826352" sldId="266"/>
+            <ac:spMk id="3" creationId="{FF9019CD-C434-4CEE-BF58-4EC60E4C5360}"/>
+          </ac:spMkLst>
+        </pc:spChg>
+      </pc:sldChg>
+      <pc:sldChg chg="addSp delSp modSp add">
+        <pc:chgData name="Hatice Dedetas" userId="0f1ed94a-1d65-4e39-8c1f-69d4ca4b7cee" providerId="ADAL" clId="{39B2A147-5B08-4919-8EC3-FE551673579F}" dt="2023-06-26T14:35:29.768" v="3374" actId="20577"/>
+        <pc:sldMkLst>
+          <pc:docMk/>
+          <pc:sldMk cId="1437378199" sldId="267"/>
+        </pc:sldMkLst>
+        <pc:spChg chg="del mod">
+          <ac:chgData name="Hatice Dedetas" userId="0f1ed94a-1d65-4e39-8c1f-69d4ca4b7cee" providerId="ADAL" clId="{39B2A147-5B08-4919-8EC3-FE551673579F}" dt="2023-06-26T14:01:19.202" v="2992" actId="478"/>
+          <ac:spMkLst>
+            <pc:docMk/>
+            <pc:sldMk cId="1437378199" sldId="267"/>
+            <ac:spMk id="2" creationId="{F722087B-7776-4C20-BD5D-EABBFCF025B9}"/>
+          </ac:spMkLst>
+        </pc:spChg>
+        <pc:spChg chg="mod">
+          <ac:chgData name="Hatice Dedetas" userId="0f1ed94a-1d65-4e39-8c1f-69d4ca4b7cee" providerId="ADAL" clId="{39B2A147-5B08-4919-8EC3-FE551673579F}" dt="2023-06-26T14:35:29.768" v="3374" actId="20577"/>
+          <ac:spMkLst>
+            <pc:docMk/>
+            <pc:sldMk cId="1437378199" sldId="267"/>
+            <ac:spMk id="3" creationId="{08B72133-7326-445D-BB65-AD83538A29F2}"/>
+          </ac:spMkLst>
+        </pc:spChg>
+        <pc:spChg chg="add del mod">
+          <ac:chgData name="Hatice Dedetas" userId="0f1ed94a-1d65-4e39-8c1f-69d4ca4b7cee" providerId="ADAL" clId="{39B2A147-5B08-4919-8EC3-FE551673579F}" dt="2023-06-26T14:01:20.901" v="2993" actId="478"/>
+          <ac:spMkLst>
+            <pc:docMk/>
+            <pc:sldMk cId="1437378199" sldId="267"/>
+            <ac:spMk id="5" creationId="{3BC5DCF5-3316-40B7-BAEC-F2AAD9E9D979}"/>
+          </ac:spMkLst>
+        </pc:spChg>
+      </pc:sldChg>
+      <pc:sldChg chg="modSp add">
+        <pc:chgData name="Hatice Dedetas" userId="0f1ed94a-1d65-4e39-8c1f-69d4ca4b7cee" providerId="ADAL" clId="{39B2A147-5B08-4919-8EC3-FE551673579F}" dt="2023-06-26T14:01:13.671" v="2991" actId="20577"/>
+        <pc:sldMkLst>
+          <pc:docMk/>
+          <pc:sldMk cId="3272094254" sldId="268"/>
+        </pc:sldMkLst>
+        <pc:spChg chg="mod">
+          <ac:chgData name="Hatice Dedetas" userId="0f1ed94a-1d65-4e39-8c1f-69d4ca4b7cee" providerId="ADAL" clId="{39B2A147-5B08-4919-8EC3-FE551673579F}" dt="2023-06-26T14:01:13.671" v="2991" actId="20577"/>
+          <ac:spMkLst>
+            <pc:docMk/>
+            <pc:sldMk cId="3272094254" sldId="268"/>
+            <ac:spMk id="2" creationId="{4665C8CF-18FA-4F21-8E50-70CBBB143081}"/>
+          </ac:spMkLst>
+        </pc:spChg>
+      </pc:sldChg>
+      <pc:sldChg chg="delSp modSp add">
+        <pc:chgData name="Hatice Dedetas" userId="0f1ed94a-1d65-4e39-8c1f-69d4ca4b7cee" providerId="ADAL" clId="{39B2A147-5B08-4919-8EC3-FE551673579F}" dt="2023-06-29T17:01:18.640" v="3469" actId="27636"/>
+        <pc:sldMkLst>
+          <pc:docMk/>
+          <pc:sldMk cId="3924939235" sldId="269"/>
+        </pc:sldMkLst>
+        <pc:spChg chg="del">
+          <ac:chgData name="Hatice Dedetas" userId="0f1ed94a-1d65-4e39-8c1f-69d4ca4b7cee" providerId="ADAL" clId="{39B2A147-5B08-4919-8EC3-FE551673579F}" dt="2023-06-29T15:19:18.114" v="3452" actId="478"/>
+          <ac:spMkLst>
+            <pc:docMk/>
+            <pc:sldMk cId="3924939235" sldId="269"/>
+            <ac:spMk id="2" creationId="{FC802104-B42B-4445-AF9A-349E2F97A53C}"/>
+          </ac:spMkLst>
+        </pc:spChg>
+        <pc:spChg chg="mod">
+          <ac:chgData name="Hatice Dedetas" userId="0f1ed94a-1d65-4e39-8c1f-69d4ca4b7cee" providerId="ADAL" clId="{39B2A147-5B08-4919-8EC3-FE551673579F}" dt="2023-06-29T17:01:18.640" v="3469" actId="27636"/>
+          <ac:spMkLst>
+            <pc:docMk/>
+            <pc:sldMk cId="3924939235" sldId="269"/>
+            <ac:spMk id="3" creationId="{86E75D4E-0808-4661-A807-A1C5608F7572}"/>
+          </ac:spMkLst>
+        </pc:spChg>
+      </pc:sldChg>
+      <pc:sldChg chg="modSp add">
+        <pc:chgData name="Hatice Dedetas" userId="0f1ed94a-1d65-4e39-8c1f-69d4ca4b7cee" providerId="ADAL" clId="{39B2A147-5B08-4919-8EC3-FE551673579F}" dt="2023-06-29T15:17:38.385" v="3387" actId="20577"/>
+        <pc:sldMkLst>
+          <pc:docMk/>
+          <pc:sldMk cId="897568325" sldId="270"/>
+        </pc:sldMkLst>
+        <pc:spChg chg="mod">
+          <ac:chgData name="Hatice Dedetas" userId="0f1ed94a-1d65-4e39-8c1f-69d4ca4b7cee" providerId="ADAL" clId="{39B2A147-5B08-4919-8EC3-FE551673579F}" dt="2023-06-29T15:17:38.385" v="3387" actId="20577"/>
+          <ac:spMkLst>
+            <pc:docMk/>
+            <pc:sldMk cId="897568325" sldId="270"/>
+            <ac:spMk id="2" creationId="{4665C8CF-18FA-4F21-8E50-70CBBB143081}"/>
+          </ac:spMkLst>
+        </pc:spChg>
+      </pc:sldChg>
+      <pc:sldChg chg="modSp add">
+        <pc:chgData name="Hatice Dedetas" userId="0f1ed94a-1d65-4e39-8c1f-69d4ca4b7cee" providerId="ADAL" clId="{39B2A147-5B08-4919-8EC3-FE551673579F}" dt="2023-06-29T17:02:02.219" v="3502" actId="20577"/>
+        <pc:sldMkLst>
+          <pc:docMk/>
+          <pc:sldMk cId="2384805011" sldId="271"/>
+        </pc:sldMkLst>
+        <pc:spChg chg="mod">
+          <ac:chgData name="Hatice Dedetas" userId="0f1ed94a-1d65-4e39-8c1f-69d4ca4b7cee" providerId="ADAL" clId="{39B2A147-5B08-4919-8EC3-FE551673579F}" dt="2023-06-29T17:02:02.219" v="3502" actId="20577"/>
+          <ac:spMkLst>
+            <pc:docMk/>
+            <pc:sldMk cId="2384805011" sldId="271"/>
+            <ac:spMk id="2" creationId="{86CE3D65-2B09-4573-85B3-FC1C57CFE3ED}"/>
+          </ac:spMkLst>
+        </pc:spChg>
+        <pc:spChg chg="mod">
+          <ac:chgData name="Hatice Dedetas" userId="0f1ed94a-1d65-4e39-8c1f-69d4ca4b7cee" providerId="ADAL" clId="{39B2A147-5B08-4919-8EC3-FE551673579F}" dt="2023-06-29T17:01:53.744" v="3470"/>
+          <ac:spMkLst>
+            <pc:docMk/>
+            <pc:sldMk cId="2384805011" sldId="271"/>
+            <ac:spMk id="3" creationId="{FD3EC0A7-3CE2-4C89-87BD-677861FE45AF}"/>
+          </ac:spMkLst>
+        </pc:spChg>
+      </pc:sldChg>
+      <pc:sldChg chg="addSp modSp add">
+        <pc:chgData name="Hatice Dedetas" userId="0f1ed94a-1d65-4e39-8c1f-69d4ca4b7cee" providerId="ADAL" clId="{39B2A147-5B08-4919-8EC3-FE551673579F}" dt="2023-06-29T17:05:05.993" v="3685" actId="20577"/>
+        <pc:sldMkLst>
+          <pc:docMk/>
+          <pc:sldMk cId="2269389679" sldId="272"/>
+        </pc:sldMkLst>
+        <pc:spChg chg="mod">
+          <ac:chgData name="Hatice Dedetas" userId="0f1ed94a-1d65-4e39-8c1f-69d4ca4b7cee" providerId="ADAL" clId="{39B2A147-5B08-4919-8EC3-FE551673579F}" dt="2023-06-29T17:04:02.941" v="3553" actId="20577"/>
+          <ac:spMkLst>
+            <pc:docMk/>
+            <pc:sldMk cId="2269389679" sldId="272"/>
+            <ac:spMk id="2" creationId="{229E3037-B34E-4F35-A828-70ADC326337A}"/>
+          </ac:spMkLst>
+        </pc:spChg>
+        <pc:spChg chg="mod">
+          <ac:chgData name="Hatice Dedetas" userId="0f1ed94a-1d65-4e39-8c1f-69d4ca4b7cee" providerId="ADAL" clId="{39B2A147-5B08-4919-8EC3-FE551673579F}" dt="2023-06-29T17:04:26.713" v="3563" actId="27636"/>
+          <ac:spMkLst>
+            <pc:docMk/>
+            <pc:sldMk cId="2269389679" sldId="272"/>
+            <ac:spMk id="3" creationId="{C69F729A-E06C-4CAA-B8EC-787DE6073F90}"/>
+          </ac:spMkLst>
+        </pc:spChg>
+        <pc:spChg chg="add mod">
+          <ac:chgData name="Hatice Dedetas" userId="0f1ed94a-1d65-4e39-8c1f-69d4ca4b7cee" providerId="ADAL" clId="{39B2A147-5B08-4919-8EC3-FE551673579F}" dt="2023-06-29T17:04:20.795" v="3558" actId="1076"/>
+          <ac:spMkLst>
+            <pc:docMk/>
+            <pc:sldMk cId="2269389679" sldId="272"/>
+            <ac:spMk id="4" creationId="{48CBD1AF-832F-4B56-85FC-EDBC92A47D27}"/>
+          </ac:spMkLst>
+        </pc:spChg>
+        <pc:spChg chg="add mod">
+          <ac:chgData name="Hatice Dedetas" userId="0f1ed94a-1d65-4e39-8c1f-69d4ca4b7cee" providerId="ADAL" clId="{39B2A147-5B08-4919-8EC3-FE551673579F}" dt="2023-06-29T17:05:05.993" v="3685" actId="20577"/>
+          <ac:spMkLst>
+            <pc:docMk/>
+            <pc:sldMk cId="2269389679" sldId="272"/>
+            <ac:spMk id="5" creationId="{4E382925-D569-4587-B4E2-00627ECEF187}"/>
+          </ac:spMkLst>
+        </pc:spChg>
+      </pc:sldChg>
+      <pc:sldChg chg="addSp delSp modSp add">
+        <pc:chgData name="Hatice Dedetas" userId="0f1ed94a-1d65-4e39-8c1f-69d4ca4b7cee" providerId="ADAL" clId="{39B2A147-5B08-4919-8EC3-FE551673579F}" dt="2023-06-29T17:07:42.579" v="3980" actId="1076"/>
+        <pc:sldMkLst>
+          <pc:docMk/>
+          <pc:sldMk cId="1281712653" sldId="273"/>
+        </pc:sldMkLst>
+        <pc:spChg chg="mod">
+          <ac:chgData name="Hatice Dedetas" userId="0f1ed94a-1d65-4e39-8c1f-69d4ca4b7cee" providerId="ADAL" clId="{39B2A147-5B08-4919-8EC3-FE551673579F}" dt="2023-06-29T17:05:10.862" v="3686"/>
+          <ac:spMkLst>
+            <pc:docMk/>
+            <pc:sldMk cId="1281712653" sldId="273"/>
+            <ac:spMk id="2" creationId="{229E3037-B34E-4F35-A828-70ADC326337A}"/>
+          </ac:spMkLst>
+        </pc:spChg>
+        <pc:spChg chg="del">
+          <ac:chgData name="Hatice Dedetas" userId="0f1ed94a-1d65-4e39-8c1f-69d4ca4b7cee" providerId="ADAL" clId="{39B2A147-5B08-4919-8EC3-FE551673579F}" dt="2023-06-29T17:03:28.656" v="3520"/>
+          <ac:spMkLst>
+            <pc:docMk/>
+            <pc:sldMk cId="1281712653" sldId="273"/>
+            <ac:spMk id="3" creationId="{C69F729A-E06C-4CAA-B8EC-787DE6073F90}"/>
+          </ac:spMkLst>
+        </pc:spChg>
+        <pc:spChg chg="add mod">
+          <ac:chgData name="Hatice Dedetas" userId="0f1ed94a-1d65-4e39-8c1f-69d4ca4b7cee" providerId="ADAL" clId="{39B2A147-5B08-4919-8EC3-FE551673579F}" dt="2023-06-29T17:05:27.826" v="3690" actId="1076"/>
+          <ac:spMkLst>
+            <pc:docMk/>
+            <pc:sldMk cId="1281712653" sldId="273"/>
+            <ac:spMk id="4" creationId="{02750C28-2B3D-413D-B918-8E1236E3134A}"/>
+          </ac:spMkLst>
+        </pc:spChg>
+        <pc:spChg chg="add mod">
+          <ac:chgData name="Hatice Dedetas" userId="0f1ed94a-1d65-4e39-8c1f-69d4ca4b7cee" providerId="ADAL" clId="{39B2A147-5B08-4919-8EC3-FE551673579F}" dt="2023-06-29T17:06:22.237" v="3852" actId="20577"/>
+          <ac:spMkLst>
+            <pc:docMk/>
+            <pc:sldMk cId="1281712653" sldId="273"/>
+            <ac:spMk id="5" creationId="{B912919B-199B-4F77-BC85-7E261ED243A8}"/>
+          </ac:spMkLst>
+        </pc:spChg>
+        <pc:spChg chg="add mod">
+          <ac:chgData name="Hatice Dedetas" userId="0f1ed94a-1d65-4e39-8c1f-69d4ca4b7cee" providerId="ADAL" clId="{39B2A147-5B08-4919-8EC3-FE551673579F}" dt="2023-06-29T17:07:42.579" v="3980" actId="1076"/>
+          <ac:spMkLst>
+            <pc:docMk/>
+            <pc:sldMk cId="1281712653" sldId="273"/>
+            <ac:spMk id="6" creationId="{3620537F-8271-4AC7-B4C9-831222354790}"/>
           </ac:spMkLst>
         </pc:spChg>
       </pc:sldChg>
@@ -468,7 +778,7 @@
           <a:p>
             <a:fld id="{27A1BD6C-8E33-4C79-A2B2-98AAAC5F43E1}" type="datetimeFigureOut">
               <a:rPr lang="de-DE" smtClean="0"/>
-              <a:t>23.06.2023</a:t>
+              <a:t>29.06.2023</a:t>
             </a:fld>
             <a:endParaRPr lang="de-DE"/>
           </a:p>
@@ -668,7 +978,7 @@
           <a:p>
             <a:fld id="{27A1BD6C-8E33-4C79-A2B2-98AAAC5F43E1}" type="datetimeFigureOut">
               <a:rPr lang="de-DE" smtClean="0"/>
-              <a:t>23.06.2023</a:t>
+              <a:t>29.06.2023</a:t>
             </a:fld>
             <a:endParaRPr lang="de-DE"/>
           </a:p>
@@ -878,7 +1188,7 @@
           <a:p>
             <a:fld id="{27A1BD6C-8E33-4C79-A2B2-98AAAC5F43E1}" type="datetimeFigureOut">
               <a:rPr lang="de-DE" smtClean="0"/>
-              <a:t>23.06.2023</a:t>
+              <a:t>29.06.2023</a:t>
             </a:fld>
             <a:endParaRPr lang="de-DE"/>
           </a:p>
@@ -1078,7 +1388,7 @@
           <a:p>
             <a:fld id="{27A1BD6C-8E33-4C79-A2B2-98AAAC5F43E1}" type="datetimeFigureOut">
               <a:rPr lang="de-DE" smtClean="0"/>
-              <a:t>23.06.2023</a:t>
+              <a:t>29.06.2023</a:t>
             </a:fld>
             <a:endParaRPr lang="de-DE"/>
           </a:p>
@@ -1354,7 +1664,7 @@
           <a:p>
             <a:fld id="{27A1BD6C-8E33-4C79-A2B2-98AAAC5F43E1}" type="datetimeFigureOut">
               <a:rPr lang="de-DE" smtClean="0"/>
-              <a:t>23.06.2023</a:t>
+              <a:t>29.06.2023</a:t>
             </a:fld>
             <a:endParaRPr lang="de-DE"/>
           </a:p>
@@ -1622,7 +1932,7 @@
           <a:p>
             <a:fld id="{27A1BD6C-8E33-4C79-A2B2-98AAAC5F43E1}" type="datetimeFigureOut">
               <a:rPr lang="de-DE" smtClean="0"/>
-              <a:t>23.06.2023</a:t>
+              <a:t>29.06.2023</a:t>
             </a:fld>
             <a:endParaRPr lang="de-DE"/>
           </a:p>
@@ -2037,7 +2347,7 @@
           <a:p>
             <a:fld id="{27A1BD6C-8E33-4C79-A2B2-98AAAC5F43E1}" type="datetimeFigureOut">
               <a:rPr lang="de-DE" smtClean="0"/>
-              <a:t>23.06.2023</a:t>
+              <a:t>29.06.2023</a:t>
             </a:fld>
             <a:endParaRPr lang="de-DE"/>
           </a:p>
@@ -2179,7 +2489,7 @@
           <a:p>
             <a:fld id="{27A1BD6C-8E33-4C79-A2B2-98AAAC5F43E1}" type="datetimeFigureOut">
               <a:rPr lang="de-DE" smtClean="0"/>
-              <a:t>23.06.2023</a:t>
+              <a:t>29.06.2023</a:t>
             </a:fld>
             <a:endParaRPr lang="de-DE"/>
           </a:p>
@@ -2292,7 +2602,7 @@
           <a:p>
             <a:fld id="{27A1BD6C-8E33-4C79-A2B2-98AAAC5F43E1}" type="datetimeFigureOut">
               <a:rPr lang="de-DE" smtClean="0"/>
-              <a:t>23.06.2023</a:t>
+              <a:t>29.06.2023</a:t>
             </a:fld>
             <a:endParaRPr lang="de-DE"/>
           </a:p>
@@ -2605,7 +2915,7 @@
           <a:p>
             <a:fld id="{27A1BD6C-8E33-4C79-A2B2-98AAAC5F43E1}" type="datetimeFigureOut">
               <a:rPr lang="de-DE" smtClean="0"/>
-              <a:t>23.06.2023</a:t>
+              <a:t>29.06.2023</a:t>
             </a:fld>
             <a:endParaRPr lang="de-DE"/>
           </a:p>
@@ -2894,7 +3204,7 @@
           <a:p>
             <a:fld id="{27A1BD6C-8E33-4C79-A2B2-98AAAC5F43E1}" type="datetimeFigureOut">
               <a:rPr lang="de-DE" smtClean="0"/>
-              <a:t>23.06.2023</a:t>
+              <a:t>29.06.2023</a:t>
             </a:fld>
             <a:endParaRPr lang="de-DE"/>
           </a:p>
@@ -3137,7 +3447,7 @@
           <a:p>
             <a:fld id="{27A1BD6C-8E33-4C79-A2B2-98AAAC5F43E1}" type="datetimeFigureOut">
               <a:rPr lang="de-DE" smtClean="0"/>
-              <a:t>23.06.2023</a:t>
+              <a:t>29.06.2023</a:t>
             </a:fld>
             <a:endParaRPr lang="de-DE"/>
           </a:p>
@@ -3679,6 +3989,3207 @@
 </p:sld>
 </file>
 
+<file path=ppt/slides/slide10.xml><?xml version="1.0" encoding="utf-8"?>
+<p:sld xmlns:a="http://schemas.openxmlformats.org/drawingml/2006/main" xmlns:r="http://schemas.openxmlformats.org/officeDocument/2006/relationships" xmlns:p="http://schemas.openxmlformats.org/presentationml/2006/main">
+  <p:cSld>
+    <p:spTree>
+      <p:nvGrpSpPr>
+        <p:cNvPr id="1" name=""/>
+        <p:cNvGrpSpPr/>
+        <p:nvPr/>
+      </p:nvGrpSpPr>
+      <p:grpSpPr>
+        <a:xfrm>
+          <a:off x="0" y="0"/>
+          <a:ext cx="0" cy="0"/>
+          <a:chOff x="0" y="0"/>
+          <a:chExt cx="0" cy="0"/>
+        </a:xfrm>
+      </p:grpSpPr>
+      <p:sp>
+        <p:nvSpPr>
+          <p:cNvPr id="2" name="Title 1">
+            <a:extLst>
+              <a:ext uri="{FF2B5EF4-FFF2-40B4-BE49-F238E27FC236}">
+                <a16:creationId xmlns:a16="http://schemas.microsoft.com/office/drawing/2014/main" id="{4665C8CF-18FA-4F21-8E50-70CBBB143081}"/>
+              </a:ext>
+            </a:extLst>
+          </p:cNvPr>
+          <p:cNvSpPr>
+            <a:spLocks noGrp="1"/>
+          </p:cNvSpPr>
+          <p:nvPr>
+            <p:ph type="ctrTitle"/>
+          </p:nvPr>
+        </p:nvSpPr>
+        <p:spPr/>
+        <p:txBody>
+          <a:bodyPr/>
+          <a:lstStyle/>
+          <a:p>
+            <a:r>
+              <a:rPr lang="de-DE" dirty="0"/>
+              <a:t>Alert Messages</a:t>
+            </a:r>
+          </a:p>
+        </p:txBody>
+      </p:sp>
+      <p:sp>
+        <p:nvSpPr>
+          <p:cNvPr id="3" name="Subtitle 2">
+            <a:extLst>
+              <a:ext uri="{FF2B5EF4-FFF2-40B4-BE49-F238E27FC236}">
+                <a16:creationId xmlns:a16="http://schemas.microsoft.com/office/drawing/2014/main" id="{4901B3B2-DE50-467A-BB32-D282EF20ECD9}"/>
+              </a:ext>
+            </a:extLst>
+          </p:cNvPr>
+          <p:cNvSpPr>
+            <a:spLocks noGrp="1"/>
+          </p:cNvSpPr>
+          <p:nvPr>
+            <p:ph type="subTitle" idx="1"/>
+          </p:nvPr>
+        </p:nvSpPr>
+        <p:spPr/>
+        <p:txBody>
+          <a:bodyPr/>
+          <a:lstStyle/>
+          <a:p>
+            <a:endParaRPr lang="de-DE"/>
+          </a:p>
+        </p:txBody>
+      </p:sp>
+    </p:spTree>
+    <p:extLst>
+      <p:ext uri="{BB962C8B-B14F-4D97-AF65-F5344CB8AC3E}">
+        <p14:creationId xmlns:p14="http://schemas.microsoft.com/office/powerpoint/2010/main" val="3272094254"/>
+      </p:ext>
+    </p:extLst>
+  </p:cSld>
+  <p:clrMapOvr>
+    <a:masterClrMapping/>
+  </p:clrMapOvr>
+</p:sld>
+</file>
+
+<file path=ppt/slides/slide11.xml><?xml version="1.0" encoding="utf-8"?>
+<p:sld xmlns:a="http://schemas.openxmlformats.org/drawingml/2006/main" xmlns:r="http://schemas.openxmlformats.org/officeDocument/2006/relationships" xmlns:p="http://schemas.openxmlformats.org/presentationml/2006/main">
+  <p:cSld>
+    <p:spTree>
+      <p:nvGrpSpPr>
+        <p:cNvPr id="1" name=""/>
+        <p:cNvGrpSpPr/>
+        <p:nvPr/>
+      </p:nvGrpSpPr>
+      <p:grpSpPr>
+        <a:xfrm>
+          <a:off x="0" y="0"/>
+          <a:ext cx="0" cy="0"/>
+          <a:chOff x="0" y="0"/>
+          <a:chExt cx="0" cy="0"/>
+        </a:xfrm>
+      </p:grpSpPr>
+      <p:sp>
+        <p:nvSpPr>
+          <p:cNvPr id="3" name="Content Placeholder 2">
+            <a:extLst>
+              <a:ext uri="{FF2B5EF4-FFF2-40B4-BE49-F238E27FC236}">
+                <a16:creationId xmlns:a16="http://schemas.microsoft.com/office/drawing/2014/main" id="{08B72133-7326-445D-BB65-AD83538A29F2}"/>
+              </a:ext>
+            </a:extLst>
+          </p:cNvPr>
+          <p:cNvSpPr>
+            <a:spLocks noGrp="1"/>
+          </p:cNvSpPr>
+          <p:nvPr>
+            <p:ph idx="1"/>
+          </p:nvPr>
+        </p:nvSpPr>
+        <p:spPr>
+          <a:xfrm>
+            <a:off x="838200" y="289932"/>
+            <a:ext cx="10515600" cy="6333892"/>
+          </a:xfrm>
+        </p:spPr>
+        <p:txBody>
+          <a:bodyPr>
+            <a:normAutofit fontScale="55000" lnSpcReduction="20000"/>
+          </a:bodyPr>
+          <a:lstStyle/>
+          <a:p>
+            <a:r>
+              <a:rPr lang="en-GB" dirty="0"/>
+              <a:t>For the pop-up alert messages, I created a text object and implemented it in the </a:t>
+            </a:r>
+            <a:r>
+              <a:rPr lang="en-GB" dirty="0" err="1"/>
+              <a:t>PlayerMovement</a:t>
+            </a:r>
+            <a:r>
+              <a:rPr lang="en-GB" dirty="0"/>
+              <a:t> script. Then, I dragged that text </a:t>
+            </a:r>
+            <a:r>
+              <a:rPr lang="en-GB" dirty="0" err="1"/>
+              <a:t>GameObject</a:t>
+            </a:r>
+            <a:r>
+              <a:rPr lang="en-GB" dirty="0"/>
+              <a:t> to the Main Camera/Player Movement script.</a:t>
+            </a:r>
+          </a:p>
+          <a:p>
+            <a:r>
+              <a:rPr lang="en-GB" dirty="0"/>
+              <a:t>In that text object, there the </a:t>
+            </a:r>
+            <a:r>
+              <a:rPr lang="en-GB" dirty="0" err="1"/>
+              <a:t>alertMessage</a:t>
+            </a:r>
+            <a:r>
+              <a:rPr lang="en-GB" dirty="0"/>
+              <a:t> script is attached.</a:t>
+            </a:r>
+          </a:p>
+          <a:p>
+            <a:r>
+              <a:rPr lang="en-GB" dirty="0"/>
+              <a:t>In this script, two public functions are defined: </a:t>
+            </a:r>
+          </a:p>
+          <a:p>
+            <a:pPr lvl="1"/>
+            <a:r>
+              <a:rPr lang="de-DE" dirty="0" err="1"/>
+              <a:t>ShowAlert</a:t>
+            </a:r>
+            <a:r>
+              <a:rPr lang="de-DE" dirty="0"/>
+              <a:t>(</a:t>
+            </a:r>
+            <a:r>
+              <a:rPr lang="de-DE" dirty="0" err="1"/>
+              <a:t>string</a:t>
+            </a:r>
+            <a:r>
+              <a:rPr lang="de-DE" dirty="0"/>
+              <a:t> </a:t>
+            </a:r>
+            <a:r>
+              <a:rPr lang="de-DE" dirty="0" err="1"/>
+              <a:t>message</a:t>
+            </a:r>
+            <a:r>
+              <a:rPr lang="de-DE" dirty="0"/>
+              <a:t>): In </a:t>
+            </a:r>
+            <a:r>
+              <a:rPr lang="de-DE" dirty="0" err="1"/>
+              <a:t>player</a:t>
+            </a:r>
+            <a:r>
+              <a:rPr lang="de-DE" dirty="0"/>
+              <a:t> </a:t>
+            </a:r>
+            <a:r>
+              <a:rPr lang="de-DE" dirty="0" err="1"/>
+              <a:t>movement</a:t>
+            </a:r>
+            <a:r>
+              <a:rPr lang="de-DE" dirty="0"/>
+              <a:t> </a:t>
+            </a:r>
+            <a:r>
+              <a:rPr lang="de-DE" dirty="0" err="1"/>
+              <a:t>script</a:t>
+            </a:r>
+            <a:r>
+              <a:rPr lang="de-DE" dirty="0"/>
+              <a:t>, </a:t>
+            </a:r>
+            <a:r>
+              <a:rPr lang="de-DE" dirty="0" err="1"/>
+              <a:t>if</a:t>
+            </a:r>
+            <a:r>
+              <a:rPr lang="de-DE" dirty="0"/>
+              <a:t> I </a:t>
+            </a:r>
+            <a:r>
+              <a:rPr lang="de-DE" dirty="0" err="1"/>
+              <a:t>want</a:t>
+            </a:r>
+            <a:r>
+              <a:rPr lang="de-DE" dirty="0"/>
+              <a:t> </a:t>
+            </a:r>
+            <a:r>
+              <a:rPr lang="de-DE" dirty="0" err="1"/>
+              <a:t>to</a:t>
+            </a:r>
+            <a:r>
+              <a:rPr lang="de-DE" dirty="0"/>
+              <a:t> </a:t>
+            </a:r>
+            <a:r>
+              <a:rPr lang="de-DE" dirty="0" err="1"/>
+              <a:t>create</a:t>
+            </a:r>
+            <a:r>
+              <a:rPr lang="de-DE" dirty="0"/>
+              <a:t> a </a:t>
+            </a:r>
+            <a:r>
+              <a:rPr lang="de-DE" dirty="0" err="1"/>
+              <a:t>popup</a:t>
+            </a:r>
+            <a:r>
+              <a:rPr lang="de-DE" dirty="0"/>
+              <a:t> </a:t>
+            </a:r>
+            <a:r>
+              <a:rPr lang="de-DE" dirty="0" err="1"/>
+              <a:t>message</a:t>
+            </a:r>
+            <a:r>
+              <a:rPr lang="de-DE" dirty="0"/>
+              <a:t>, I </a:t>
+            </a:r>
+            <a:r>
+              <a:rPr lang="de-DE" dirty="0" err="1"/>
+              <a:t>create</a:t>
+            </a:r>
+            <a:r>
+              <a:rPr lang="de-DE" dirty="0"/>
+              <a:t> a </a:t>
+            </a:r>
+            <a:r>
+              <a:rPr lang="de-DE" dirty="0" err="1"/>
+              <a:t>string</a:t>
+            </a:r>
+            <a:r>
+              <a:rPr lang="de-DE" dirty="0"/>
+              <a:t> (</a:t>
+            </a:r>
+            <a:r>
+              <a:rPr lang="de-DE" dirty="0" err="1"/>
+              <a:t>myscript</a:t>
+            </a:r>
+            <a:r>
+              <a:rPr lang="de-DE" dirty="0"/>
+              <a:t>) and </a:t>
+            </a:r>
+            <a:r>
+              <a:rPr lang="de-DE" dirty="0" err="1"/>
+              <a:t>write</a:t>
+            </a:r>
+            <a:r>
+              <a:rPr lang="de-DE" dirty="0"/>
+              <a:t> </a:t>
+            </a:r>
+            <a:r>
+              <a:rPr lang="de-DE" dirty="0" err="1"/>
+              <a:t>the</a:t>
+            </a:r>
+            <a:r>
+              <a:rPr lang="de-DE" dirty="0"/>
+              <a:t> </a:t>
+            </a:r>
+            <a:r>
+              <a:rPr lang="de-DE" dirty="0" err="1"/>
+              <a:t>message</a:t>
+            </a:r>
+            <a:r>
+              <a:rPr lang="de-DE" dirty="0"/>
+              <a:t> in </a:t>
+            </a:r>
+            <a:r>
+              <a:rPr lang="de-DE" dirty="0" err="1"/>
+              <a:t>that</a:t>
+            </a:r>
+            <a:r>
+              <a:rPr lang="de-DE" dirty="0"/>
+              <a:t>. </a:t>
+            </a:r>
+            <a:r>
+              <a:rPr lang="de-DE" dirty="0" err="1"/>
+              <a:t>Then</a:t>
+            </a:r>
+            <a:r>
+              <a:rPr lang="de-DE" dirty="0"/>
+              <a:t>, I </a:t>
+            </a:r>
+            <a:r>
+              <a:rPr lang="de-DE" dirty="0" err="1"/>
+              <a:t>call</a:t>
+            </a:r>
+            <a:r>
+              <a:rPr lang="de-DE" dirty="0"/>
+              <a:t> </a:t>
+            </a:r>
+            <a:r>
+              <a:rPr lang="de-DE" dirty="0" err="1"/>
+              <a:t>this</a:t>
+            </a:r>
+            <a:r>
+              <a:rPr lang="de-DE" dirty="0"/>
+              <a:t> </a:t>
+            </a:r>
+            <a:r>
+              <a:rPr lang="de-DE" dirty="0" err="1"/>
+              <a:t>function</a:t>
+            </a:r>
+            <a:r>
+              <a:rPr lang="de-DE" dirty="0"/>
+              <a:t> </a:t>
+            </a:r>
+            <a:r>
+              <a:rPr lang="de-DE" dirty="0" err="1"/>
+              <a:t>ShowAlert</a:t>
+            </a:r>
+            <a:r>
+              <a:rPr lang="de-DE" dirty="0"/>
+              <a:t>(</a:t>
+            </a:r>
+            <a:r>
+              <a:rPr lang="de-DE" dirty="0" err="1"/>
+              <a:t>myscript</a:t>
+            </a:r>
+            <a:r>
+              <a:rPr lang="de-DE" dirty="0"/>
+              <a:t>) </a:t>
+            </a:r>
+            <a:r>
+              <a:rPr lang="de-DE" dirty="0" err="1"/>
+              <a:t>to</a:t>
+            </a:r>
+            <a:r>
+              <a:rPr lang="de-DE" dirty="0"/>
+              <a:t> </a:t>
+            </a:r>
+            <a:r>
+              <a:rPr lang="de-DE" dirty="0" err="1"/>
+              <a:t>show</a:t>
+            </a:r>
+            <a:r>
+              <a:rPr lang="de-DE" dirty="0"/>
+              <a:t> </a:t>
+            </a:r>
+            <a:r>
+              <a:rPr lang="de-DE" dirty="0" err="1"/>
+              <a:t>the</a:t>
+            </a:r>
+            <a:r>
+              <a:rPr lang="de-DE" dirty="0"/>
+              <a:t> alert </a:t>
+            </a:r>
+            <a:r>
+              <a:rPr lang="de-DE" dirty="0" err="1"/>
+              <a:t>message</a:t>
+            </a:r>
+            <a:r>
+              <a:rPr lang="de-DE" dirty="0"/>
+              <a:t>. </a:t>
+            </a:r>
+          </a:p>
+          <a:p>
+            <a:pPr lvl="1"/>
+            <a:r>
+              <a:rPr lang="de-DE" dirty="0" err="1"/>
+              <a:t>HideAlert</a:t>
+            </a:r>
+            <a:r>
+              <a:rPr lang="de-DE" dirty="0"/>
+              <a:t>(): </a:t>
+            </a:r>
+            <a:r>
+              <a:rPr lang="de-DE" dirty="0" err="1"/>
+              <a:t>this</a:t>
+            </a:r>
+            <a:r>
+              <a:rPr lang="de-DE" dirty="0"/>
+              <a:t> </a:t>
+            </a:r>
+            <a:r>
+              <a:rPr lang="de-DE" dirty="0" err="1"/>
+              <a:t>is</a:t>
+            </a:r>
+            <a:r>
+              <a:rPr lang="de-DE" dirty="0"/>
+              <a:t> </a:t>
+            </a:r>
+            <a:r>
+              <a:rPr lang="de-DE" dirty="0" err="1"/>
+              <a:t>to</a:t>
+            </a:r>
+            <a:r>
+              <a:rPr lang="de-DE" dirty="0"/>
+              <a:t> </a:t>
+            </a:r>
+            <a:r>
+              <a:rPr lang="de-DE" dirty="0" err="1"/>
+              <a:t>remove</a:t>
+            </a:r>
+            <a:r>
+              <a:rPr lang="de-DE" dirty="0"/>
+              <a:t> </a:t>
+            </a:r>
+            <a:r>
+              <a:rPr lang="de-DE" dirty="0" err="1"/>
+              <a:t>the</a:t>
+            </a:r>
+            <a:r>
+              <a:rPr lang="de-DE" dirty="0"/>
+              <a:t> alert </a:t>
+            </a:r>
+            <a:r>
+              <a:rPr lang="de-DE" dirty="0" err="1"/>
+              <a:t>message</a:t>
+            </a:r>
+            <a:r>
+              <a:rPr lang="de-DE" dirty="0"/>
+              <a:t> </a:t>
+            </a:r>
+            <a:r>
+              <a:rPr lang="de-DE" dirty="0" err="1"/>
+              <a:t>from</a:t>
+            </a:r>
+            <a:r>
+              <a:rPr lang="de-DE" dirty="0"/>
+              <a:t> </a:t>
+            </a:r>
+            <a:r>
+              <a:rPr lang="de-DE" dirty="0" err="1"/>
+              <a:t>the</a:t>
+            </a:r>
+            <a:r>
+              <a:rPr lang="de-DE" dirty="0"/>
+              <a:t> screen.</a:t>
+            </a:r>
+          </a:p>
+          <a:p>
+            <a:r>
+              <a:rPr lang="de-DE" dirty="0" err="1"/>
+              <a:t>Within</a:t>
+            </a:r>
+            <a:r>
+              <a:rPr lang="de-DE" dirty="0"/>
+              <a:t> </a:t>
+            </a:r>
+            <a:r>
+              <a:rPr lang="de-DE" dirty="0" err="1"/>
+              <a:t>the</a:t>
+            </a:r>
+            <a:r>
+              <a:rPr lang="de-DE" dirty="0"/>
+              <a:t> </a:t>
+            </a:r>
+            <a:r>
+              <a:rPr lang="de-DE" dirty="0" err="1"/>
+              <a:t>player</a:t>
+            </a:r>
+            <a:r>
+              <a:rPr lang="de-DE" dirty="0"/>
+              <a:t> </a:t>
+            </a:r>
+            <a:r>
+              <a:rPr lang="de-DE" dirty="0" err="1"/>
+              <a:t>movement</a:t>
+            </a:r>
+            <a:r>
+              <a:rPr lang="de-DE" dirty="0"/>
+              <a:t> </a:t>
+            </a:r>
+            <a:r>
+              <a:rPr lang="de-DE" dirty="0" err="1"/>
+              <a:t>script</a:t>
+            </a:r>
+            <a:r>
+              <a:rPr lang="de-DE" dirty="0"/>
+              <a:t>:</a:t>
+            </a:r>
+          </a:p>
+          <a:p>
+            <a:pPr lvl="1"/>
+            <a:r>
+              <a:rPr lang="de-DE" dirty="0" err="1"/>
+              <a:t>if</a:t>
+            </a:r>
+            <a:r>
+              <a:rPr lang="de-DE" dirty="0"/>
+              <a:t> (</a:t>
+            </a:r>
+            <a:r>
+              <a:rPr lang="de-DE" dirty="0" err="1"/>
+              <a:t>shouldMove</a:t>
+            </a:r>
+            <a:r>
+              <a:rPr lang="de-DE" dirty="0"/>
+              <a:t>)	# </a:t>
+            </a:r>
+            <a:r>
+              <a:rPr lang="de-DE" dirty="0" err="1"/>
+              <a:t>when</a:t>
+            </a:r>
+            <a:r>
+              <a:rPr lang="de-DE" dirty="0"/>
+              <a:t> </a:t>
+            </a:r>
+            <a:r>
+              <a:rPr lang="de-DE" dirty="0" err="1"/>
+              <a:t>it</a:t>
+            </a:r>
+            <a:r>
+              <a:rPr lang="de-DE" dirty="0"/>
+              <a:t> </a:t>
+            </a:r>
+            <a:r>
+              <a:rPr lang="de-DE" dirty="0" err="1"/>
+              <a:t>moves</a:t>
+            </a:r>
+            <a:r>
+              <a:rPr lang="de-DE" dirty="0"/>
+              <a:t>, </a:t>
+            </a:r>
+            <a:r>
+              <a:rPr lang="de-DE" dirty="0" err="1"/>
+              <a:t>no</a:t>
+            </a:r>
+            <a:r>
+              <a:rPr lang="de-DE" dirty="0"/>
+              <a:t> alert will </a:t>
+            </a:r>
+            <a:r>
+              <a:rPr lang="de-DE" dirty="0" err="1"/>
+              <a:t>be</a:t>
+            </a:r>
+            <a:r>
+              <a:rPr lang="de-DE" dirty="0"/>
+              <a:t> </a:t>
+            </a:r>
+            <a:r>
+              <a:rPr lang="de-DE" dirty="0" err="1"/>
+              <a:t>presented</a:t>
+            </a:r>
+            <a:endParaRPr lang="de-DE" dirty="0"/>
+          </a:p>
+          <a:p>
+            <a:pPr lvl="2"/>
+            <a:r>
+              <a:rPr lang="de-DE" dirty="0" err="1"/>
+              <a:t>alertMessageComponent.HideAlert</a:t>
+            </a:r>
+            <a:r>
+              <a:rPr lang="de-DE" dirty="0"/>
+              <a:t>();</a:t>
+            </a:r>
+          </a:p>
+          <a:p>
+            <a:pPr lvl="1"/>
+            <a:r>
+              <a:rPr lang="de-DE" dirty="0" err="1"/>
+              <a:t>if</a:t>
+            </a:r>
+            <a:r>
+              <a:rPr lang="de-DE" dirty="0"/>
+              <a:t> (</a:t>
+            </a:r>
+            <a:r>
+              <a:rPr lang="de-DE" dirty="0" err="1"/>
+              <a:t>isRotating</a:t>
+            </a:r>
+            <a:r>
+              <a:rPr lang="de-DE" dirty="0"/>
+              <a:t>) # </a:t>
+            </a:r>
+            <a:r>
+              <a:rPr lang="de-DE" dirty="0" err="1"/>
+              <a:t>when</a:t>
+            </a:r>
+            <a:r>
+              <a:rPr lang="de-DE" dirty="0"/>
+              <a:t> </a:t>
+            </a:r>
+            <a:r>
+              <a:rPr lang="de-DE" dirty="0" err="1"/>
+              <a:t>it</a:t>
+            </a:r>
+            <a:r>
+              <a:rPr lang="de-DE" dirty="0"/>
+              <a:t> </a:t>
+            </a:r>
+            <a:r>
+              <a:rPr lang="de-DE" dirty="0" err="1"/>
+              <a:t>is</a:t>
+            </a:r>
+            <a:r>
+              <a:rPr lang="de-DE" dirty="0"/>
+              <a:t> </a:t>
+            </a:r>
+            <a:r>
+              <a:rPr lang="de-DE" dirty="0" err="1"/>
+              <a:t>rotating</a:t>
+            </a:r>
+            <a:endParaRPr lang="de-DE" dirty="0"/>
+          </a:p>
+          <a:p>
+            <a:pPr lvl="2"/>
+            <a:r>
+              <a:rPr lang="en-US" dirty="0"/>
+              <a:t>if (</a:t>
+            </a:r>
+            <a:r>
+              <a:rPr lang="en-US" dirty="0" err="1"/>
+              <a:t>decCorrect</a:t>
+            </a:r>
+            <a:r>
+              <a:rPr lang="en-US" dirty="0"/>
+              <a:t>) # if decision is correct</a:t>
+            </a:r>
+          </a:p>
+          <a:p>
+            <a:pPr lvl="2"/>
+            <a:r>
+              <a:rPr lang="en-US" dirty="0"/>
+              <a:t>            {</a:t>
+            </a:r>
+          </a:p>
+          <a:p>
+            <a:pPr lvl="2"/>
+            <a:r>
+              <a:rPr lang="en-US" dirty="0"/>
+              <a:t>                string </a:t>
+            </a:r>
+            <a:r>
+              <a:rPr lang="en-US" dirty="0" err="1"/>
+              <a:t>rotationMessage</a:t>
+            </a:r>
+            <a:r>
+              <a:rPr lang="en-US" dirty="0"/>
+              <a:t> = "Please rotate around to see your options and press button to proceed to the decision phase.";</a:t>
+            </a:r>
+          </a:p>
+          <a:p>
+            <a:pPr lvl="2"/>
+            <a:r>
+              <a:rPr lang="en-US" dirty="0"/>
+              <a:t>                </a:t>
+            </a:r>
+            <a:r>
+              <a:rPr lang="en-US" dirty="0" err="1"/>
+              <a:t>alertMessageComponent.ShowAlert</a:t>
+            </a:r>
+            <a:r>
+              <a:rPr lang="en-US" dirty="0"/>
+              <a:t>(</a:t>
+            </a:r>
+            <a:r>
+              <a:rPr lang="en-US" dirty="0" err="1"/>
+              <a:t>rotationMessage</a:t>
+            </a:r>
+            <a:r>
+              <a:rPr lang="en-US" dirty="0"/>
+              <a:t>);</a:t>
+            </a:r>
+          </a:p>
+          <a:p>
+            <a:pPr lvl="2"/>
+            <a:r>
+              <a:rPr lang="en-US" dirty="0"/>
+              <a:t>            }</a:t>
+            </a:r>
+          </a:p>
+          <a:p>
+            <a:pPr lvl="2"/>
+            <a:r>
+              <a:rPr lang="en-US" dirty="0"/>
+              <a:t>            else if (!</a:t>
+            </a:r>
+            <a:r>
+              <a:rPr lang="en-US" dirty="0" err="1"/>
+              <a:t>decCorrect</a:t>
+            </a:r>
+            <a:r>
+              <a:rPr lang="en-US" dirty="0"/>
+              <a:t>) # if decision is not correct</a:t>
+            </a:r>
+          </a:p>
+          <a:p>
+            <a:pPr lvl="2"/>
+            <a:r>
+              <a:rPr lang="en-US" dirty="0"/>
+              <a:t>            {</a:t>
+            </a:r>
+          </a:p>
+          <a:p>
+            <a:pPr lvl="2"/>
+            <a:r>
+              <a:rPr lang="en-US" dirty="0"/>
+              <a:t>                string </a:t>
+            </a:r>
+            <a:r>
+              <a:rPr lang="en-US" dirty="0" err="1"/>
+              <a:t>errorMessage</a:t>
+            </a:r>
+            <a:r>
+              <a:rPr lang="en-US" dirty="0"/>
+              <a:t> = "Your decision is wrong. You can rotate again or make a new response after pressing the space button.";</a:t>
+            </a:r>
+          </a:p>
+          <a:p>
+            <a:pPr lvl="2"/>
+            <a:r>
+              <a:rPr lang="en-US" dirty="0"/>
+              <a:t>                </a:t>
+            </a:r>
+            <a:r>
+              <a:rPr lang="en-US" dirty="0" err="1"/>
+              <a:t>alertMessageComponent.ShowAlert</a:t>
+            </a:r>
+            <a:r>
+              <a:rPr lang="en-US" dirty="0"/>
+              <a:t>(</a:t>
+            </a:r>
+            <a:r>
+              <a:rPr lang="en-US" dirty="0" err="1"/>
+              <a:t>errorMessage</a:t>
+            </a:r>
+            <a:r>
+              <a:rPr lang="en-US" dirty="0"/>
+              <a:t>);</a:t>
+            </a:r>
+          </a:p>
+          <a:p>
+            <a:pPr lvl="2"/>
+            <a:r>
+              <a:rPr lang="en-US" dirty="0"/>
+              <a:t>            }</a:t>
+            </a:r>
+            <a:endParaRPr lang="de-DE" dirty="0"/>
+          </a:p>
+          <a:p>
+            <a:pPr lvl="1"/>
+            <a:r>
+              <a:rPr lang="de-DE" dirty="0" err="1"/>
+              <a:t>if</a:t>
+            </a:r>
+            <a:r>
+              <a:rPr lang="de-DE" dirty="0"/>
+              <a:t> (</a:t>
+            </a:r>
+            <a:r>
+              <a:rPr lang="de-DE" dirty="0" err="1"/>
+              <a:t>rotationTimer</a:t>
+            </a:r>
+            <a:r>
+              <a:rPr lang="de-DE" dirty="0"/>
+              <a:t> &gt;= </a:t>
+            </a:r>
+            <a:r>
+              <a:rPr lang="de-DE" dirty="0" err="1"/>
+              <a:t>rotationTimeLimit</a:t>
+            </a:r>
+            <a:r>
+              <a:rPr lang="de-DE" dirty="0"/>
+              <a:t>) # </a:t>
+            </a:r>
+            <a:r>
+              <a:rPr lang="de-DE" dirty="0" err="1"/>
+              <a:t>when</a:t>
+            </a:r>
+            <a:r>
+              <a:rPr lang="de-DE" dirty="0"/>
+              <a:t> </a:t>
+            </a:r>
+            <a:r>
+              <a:rPr lang="de-DE" dirty="0" err="1"/>
+              <a:t>the</a:t>
+            </a:r>
+            <a:r>
+              <a:rPr lang="de-DE" dirty="0"/>
+              <a:t> time </a:t>
+            </a:r>
+            <a:r>
+              <a:rPr lang="de-DE" dirty="0" err="1"/>
+              <a:t>is</a:t>
+            </a:r>
+            <a:r>
+              <a:rPr lang="de-DE" dirty="0"/>
+              <a:t> </a:t>
+            </a:r>
+            <a:r>
+              <a:rPr lang="de-DE" dirty="0" err="1"/>
+              <a:t>up</a:t>
+            </a:r>
+            <a:r>
+              <a:rPr lang="de-DE" dirty="0"/>
+              <a:t>, </a:t>
+            </a:r>
+            <a:r>
+              <a:rPr lang="de-DE" dirty="0" err="1"/>
+              <a:t>present</a:t>
+            </a:r>
+            <a:r>
+              <a:rPr lang="de-DE" dirty="0"/>
+              <a:t> alert.</a:t>
+            </a:r>
+          </a:p>
+          <a:p>
+            <a:pPr lvl="2"/>
+            <a:r>
+              <a:rPr lang="en-US" dirty="0"/>
+              <a:t>string </a:t>
+            </a:r>
+            <a:r>
+              <a:rPr lang="en-US" dirty="0" err="1"/>
+              <a:t>timeUpMessage</a:t>
+            </a:r>
+            <a:r>
+              <a:rPr lang="en-US" dirty="0"/>
+              <a:t> = "Your time is up, please make your decision.";</a:t>
+            </a:r>
+          </a:p>
+          <a:p>
+            <a:pPr lvl="2"/>
+            <a:r>
+              <a:rPr lang="de-DE" dirty="0" err="1"/>
+              <a:t>alertMessageComponent.ShowAlert</a:t>
+            </a:r>
+            <a:r>
+              <a:rPr lang="de-DE" dirty="0"/>
+              <a:t>(</a:t>
+            </a:r>
+            <a:r>
+              <a:rPr lang="de-DE" dirty="0" err="1"/>
+              <a:t>timeUpMessage</a:t>
+            </a:r>
+            <a:r>
+              <a:rPr lang="de-DE" dirty="0"/>
+              <a:t>);</a:t>
+            </a:r>
+          </a:p>
+          <a:p>
+            <a:pPr lvl="1"/>
+            <a:r>
+              <a:rPr lang="en-US" dirty="0"/>
+              <a:t>if (</a:t>
+            </a:r>
+            <a:r>
+              <a:rPr lang="en-US" dirty="0" err="1"/>
+              <a:t>Input.GetKeyDown</a:t>
+            </a:r>
+            <a:r>
+              <a:rPr lang="en-US" dirty="0"/>
+              <a:t>(</a:t>
+            </a:r>
+            <a:r>
+              <a:rPr lang="en-US" dirty="0" err="1"/>
+              <a:t>KeyCode.Space</a:t>
+            </a:r>
+            <a:r>
+              <a:rPr lang="en-US" dirty="0"/>
+              <a:t>)) # to remind them to make a decision.</a:t>
+            </a:r>
+          </a:p>
+          <a:p>
+            <a:pPr lvl="2"/>
+            <a:r>
+              <a:rPr lang="en-US" dirty="0"/>
+              <a:t>string </a:t>
+            </a:r>
+            <a:r>
+              <a:rPr lang="en-US" dirty="0" err="1"/>
+              <a:t>errorMessage</a:t>
+            </a:r>
+            <a:r>
+              <a:rPr lang="en-US" dirty="0"/>
+              <a:t> = "Please make your decision.";</a:t>
+            </a:r>
+          </a:p>
+          <a:p>
+            <a:pPr lvl="2"/>
+            <a:r>
+              <a:rPr lang="en-US" dirty="0" err="1"/>
+              <a:t>alertMessageComponent.ShowAlert</a:t>
+            </a:r>
+            <a:r>
+              <a:rPr lang="en-US" dirty="0"/>
+              <a:t>(</a:t>
+            </a:r>
+            <a:r>
+              <a:rPr lang="en-US" dirty="0" err="1"/>
+              <a:t>errorMessage</a:t>
+            </a:r>
+            <a:r>
+              <a:rPr lang="en-US" dirty="0"/>
+              <a:t>);</a:t>
+            </a:r>
+          </a:p>
+          <a:p>
+            <a:pPr lvl="1"/>
+            <a:r>
+              <a:rPr lang="en-US" dirty="0"/>
+              <a:t>If the decision is wrong:</a:t>
+            </a:r>
+          </a:p>
+          <a:p>
+            <a:pPr lvl="2"/>
+            <a:r>
+              <a:rPr lang="en-US" dirty="0"/>
+              <a:t>string </a:t>
+            </a:r>
+            <a:r>
+              <a:rPr lang="en-US" dirty="0" err="1"/>
+              <a:t>errorMessage</a:t>
+            </a:r>
+            <a:r>
+              <a:rPr lang="en-US" dirty="0"/>
+              <a:t> = "Your decision is wrong. You can rotate again or make a new response after pressing the space button.";</a:t>
+            </a:r>
+          </a:p>
+          <a:p>
+            <a:pPr lvl="2"/>
+            <a:r>
+              <a:rPr lang="en-US" dirty="0" err="1"/>
+              <a:t>alertMessageComponent.ShowAlert</a:t>
+            </a:r>
+            <a:r>
+              <a:rPr lang="en-US" dirty="0"/>
+              <a:t>(</a:t>
+            </a:r>
+            <a:r>
+              <a:rPr lang="en-US" dirty="0" err="1"/>
+              <a:t>errorMessage</a:t>
+            </a:r>
+            <a:r>
+              <a:rPr lang="en-US" dirty="0"/>
+              <a:t>);</a:t>
+            </a:r>
+            <a:endParaRPr lang="de-DE" dirty="0"/>
+          </a:p>
+        </p:txBody>
+      </p:sp>
+    </p:spTree>
+    <p:extLst>
+      <p:ext uri="{BB962C8B-B14F-4D97-AF65-F5344CB8AC3E}">
+        <p14:creationId xmlns:p14="http://schemas.microsoft.com/office/powerpoint/2010/main" val="1437378199"/>
+      </p:ext>
+    </p:extLst>
+  </p:cSld>
+  <p:clrMapOvr>
+    <a:masterClrMapping/>
+  </p:clrMapOvr>
+</p:sld>
+</file>
+
+<file path=ppt/slides/slide12.xml><?xml version="1.0" encoding="utf-8"?>
+<p:sld xmlns:a="http://schemas.openxmlformats.org/drawingml/2006/main" xmlns:r="http://schemas.openxmlformats.org/officeDocument/2006/relationships" xmlns:p="http://schemas.openxmlformats.org/presentationml/2006/main">
+  <p:cSld>
+    <p:spTree>
+      <p:nvGrpSpPr>
+        <p:cNvPr id="1" name=""/>
+        <p:cNvGrpSpPr/>
+        <p:nvPr/>
+      </p:nvGrpSpPr>
+      <p:grpSpPr>
+        <a:xfrm>
+          <a:off x="0" y="0"/>
+          <a:ext cx="0" cy="0"/>
+          <a:chOff x="0" y="0"/>
+          <a:chExt cx="0" cy="0"/>
+        </a:xfrm>
+      </p:grpSpPr>
+      <p:sp>
+        <p:nvSpPr>
+          <p:cNvPr id="2" name="Title 1">
+            <a:extLst>
+              <a:ext uri="{FF2B5EF4-FFF2-40B4-BE49-F238E27FC236}">
+                <a16:creationId xmlns:a16="http://schemas.microsoft.com/office/drawing/2014/main" id="{687C739F-86A8-4EB0-95DA-964C7D2E718D}"/>
+              </a:ext>
+            </a:extLst>
+          </p:cNvPr>
+          <p:cNvSpPr>
+            <a:spLocks noGrp="1"/>
+          </p:cNvSpPr>
+          <p:nvPr>
+            <p:ph type="title"/>
+          </p:nvPr>
+        </p:nvSpPr>
+        <p:spPr/>
+        <p:txBody>
+          <a:bodyPr/>
+          <a:lstStyle/>
+          <a:p>
+            <a:r>
+              <a:rPr lang="de-DE" dirty="0" err="1"/>
+              <a:t>What</a:t>
+            </a:r>
+            <a:r>
+              <a:rPr lang="de-DE" dirty="0"/>
+              <a:t> </a:t>
+            </a:r>
+            <a:r>
+              <a:rPr lang="de-DE" dirty="0" err="1"/>
+              <a:t>is</a:t>
+            </a:r>
+            <a:r>
+              <a:rPr lang="de-DE" dirty="0"/>
+              <a:t> </a:t>
+            </a:r>
+            <a:r>
+              <a:rPr lang="de-DE" dirty="0" err="1"/>
+              <a:t>next</a:t>
+            </a:r>
+            <a:r>
+              <a:rPr lang="de-DE" dirty="0"/>
+              <a:t>?</a:t>
+            </a:r>
+          </a:p>
+        </p:txBody>
+      </p:sp>
+      <p:sp>
+        <p:nvSpPr>
+          <p:cNvPr id="3" name="Content Placeholder 2">
+            <a:extLst>
+              <a:ext uri="{FF2B5EF4-FFF2-40B4-BE49-F238E27FC236}">
+                <a16:creationId xmlns:a16="http://schemas.microsoft.com/office/drawing/2014/main" id="{FF9019CD-C434-4CEE-BF58-4EC60E4C5360}"/>
+              </a:ext>
+            </a:extLst>
+          </p:cNvPr>
+          <p:cNvSpPr>
+            <a:spLocks noGrp="1"/>
+          </p:cNvSpPr>
+          <p:nvPr>
+            <p:ph idx="1"/>
+          </p:nvPr>
+        </p:nvSpPr>
+        <p:spPr/>
+        <p:txBody>
+          <a:bodyPr/>
+          <a:lstStyle/>
+          <a:p>
+            <a:r>
+              <a:rPr lang="de-DE" dirty="0"/>
+              <a:t>Rotation </a:t>
+            </a:r>
+            <a:r>
+              <a:rPr lang="de-DE" dirty="0" err="1"/>
+              <a:t>sirasinda</a:t>
+            </a:r>
+            <a:r>
+              <a:rPr lang="de-DE" dirty="0"/>
+              <a:t> </a:t>
+            </a:r>
+            <a:r>
+              <a:rPr lang="de-DE" dirty="0" err="1"/>
+              <a:t>kalan</a:t>
+            </a:r>
+            <a:r>
+              <a:rPr lang="de-DE" dirty="0"/>
+              <a:t> </a:t>
+            </a:r>
+            <a:r>
+              <a:rPr lang="de-DE" dirty="0" err="1"/>
+              <a:t>süre</a:t>
+            </a:r>
+            <a:r>
+              <a:rPr lang="de-DE" dirty="0"/>
+              <a:t> </a:t>
+            </a:r>
+            <a:r>
+              <a:rPr lang="de-DE" dirty="0" err="1"/>
+              <a:t>ekranda</a:t>
+            </a:r>
+            <a:r>
+              <a:rPr lang="de-DE" dirty="0"/>
+              <a:t> </a:t>
+            </a:r>
+            <a:r>
+              <a:rPr lang="de-DE" dirty="0" err="1"/>
+              <a:t>yazsin</a:t>
+            </a:r>
+            <a:r>
+              <a:rPr lang="de-DE" dirty="0"/>
+              <a:t>.</a:t>
+            </a:r>
+          </a:p>
+          <a:p>
+            <a:r>
+              <a:rPr lang="de-DE" dirty="0"/>
+              <a:t>Rotation </a:t>
+            </a:r>
+            <a:r>
+              <a:rPr lang="de-DE" dirty="0" err="1"/>
+              <a:t>sirasinda</a:t>
+            </a:r>
+            <a:r>
+              <a:rPr lang="de-DE" dirty="0"/>
+              <a:t> ‚</a:t>
+            </a:r>
+            <a:r>
+              <a:rPr lang="de-DE" dirty="0" err="1"/>
+              <a:t>Please</a:t>
+            </a:r>
+            <a:r>
+              <a:rPr lang="de-DE" dirty="0"/>
+              <a:t> </a:t>
+            </a:r>
+            <a:r>
+              <a:rPr lang="de-DE" dirty="0" err="1"/>
+              <a:t>look</a:t>
+            </a:r>
+            <a:r>
+              <a:rPr lang="de-DE" dirty="0"/>
+              <a:t> </a:t>
+            </a:r>
+            <a:r>
+              <a:rPr lang="de-DE" dirty="0" err="1"/>
+              <a:t>around</a:t>
+            </a:r>
+            <a:r>
+              <a:rPr lang="de-DE" dirty="0"/>
+              <a:t>. </a:t>
+            </a:r>
+            <a:r>
+              <a:rPr lang="de-DE" dirty="0" err="1"/>
+              <a:t>If</a:t>
+            </a:r>
+            <a:r>
+              <a:rPr lang="de-DE" dirty="0"/>
+              <a:t> </a:t>
+            </a:r>
+            <a:r>
+              <a:rPr lang="de-DE" dirty="0" err="1"/>
+              <a:t>you</a:t>
+            </a:r>
+            <a:r>
+              <a:rPr lang="de-DE" dirty="0"/>
+              <a:t> </a:t>
+            </a:r>
+            <a:r>
+              <a:rPr lang="de-DE" dirty="0" err="1"/>
+              <a:t>want</a:t>
+            </a:r>
+            <a:r>
+              <a:rPr lang="de-DE" dirty="0"/>
+              <a:t> </a:t>
+            </a:r>
+            <a:r>
+              <a:rPr lang="de-DE" dirty="0" err="1"/>
+              <a:t>to</a:t>
+            </a:r>
+            <a:r>
+              <a:rPr lang="de-DE" dirty="0"/>
+              <a:t> </a:t>
+            </a:r>
+            <a:r>
+              <a:rPr lang="de-DE" dirty="0" err="1"/>
+              <a:t>make</a:t>
+            </a:r>
+            <a:r>
+              <a:rPr lang="de-DE" dirty="0"/>
+              <a:t> a </a:t>
+            </a:r>
+            <a:r>
+              <a:rPr lang="de-DE" dirty="0" err="1"/>
+              <a:t>decision</a:t>
+            </a:r>
+            <a:r>
+              <a:rPr lang="de-DE" dirty="0"/>
+              <a:t>, press </a:t>
+            </a:r>
+            <a:r>
+              <a:rPr lang="de-DE" dirty="0" err="1"/>
+              <a:t>space</a:t>
+            </a:r>
+            <a:r>
+              <a:rPr lang="de-DE" dirty="0"/>
+              <a:t> </a:t>
+            </a:r>
+            <a:r>
+              <a:rPr lang="de-DE" dirty="0" err="1"/>
+              <a:t>button</a:t>
+            </a:r>
+            <a:r>
+              <a:rPr lang="de-DE" dirty="0"/>
+              <a:t>.‘ </a:t>
+            </a:r>
+            <a:r>
+              <a:rPr lang="de-DE" dirty="0" err="1"/>
+              <a:t>yazsin</a:t>
+            </a:r>
+            <a:r>
+              <a:rPr lang="de-DE" dirty="0"/>
+              <a:t>.</a:t>
+            </a:r>
+          </a:p>
+          <a:p>
+            <a:r>
+              <a:rPr lang="de-DE" dirty="0" err="1"/>
+              <a:t>Decision</a:t>
+            </a:r>
+            <a:r>
+              <a:rPr lang="de-DE" dirty="0"/>
+              <a:t> </a:t>
+            </a:r>
+            <a:r>
+              <a:rPr lang="de-DE" dirty="0" err="1"/>
+              <a:t>sirasinda</a:t>
+            </a:r>
+            <a:r>
+              <a:rPr lang="de-DE" dirty="0"/>
+              <a:t> </a:t>
+            </a:r>
+            <a:r>
+              <a:rPr lang="de-DE" dirty="0" err="1"/>
+              <a:t>ekranda</a:t>
+            </a:r>
+            <a:r>
+              <a:rPr lang="de-DE" dirty="0"/>
+              <a:t> ‚</a:t>
+            </a:r>
+            <a:r>
+              <a:rPr lang="de-DE" dirty="0" err="1"/>
+              <a:t>Please</a:t>
+            </a:r>
+            <a:r>
+              <a:rPr lang="de-DE" dirty="0"/>
+              <a:t> </a:t>
+            </a:r>
+            <a:r>
+              <a:rPr lang="de-DE" dirty="0" err="1"/>
+              <a:t>select</a:t>
+            </a:r>
+            <a:r>
+              <a:rPr lang="de-DE" dirty="0"/>
+              <a:t>.‘ </a:t>
+            </a:r>
+            <a:r>
+              <a:rPr lang="de-DE" dirty="0" err="1"/>
+              <a:t>yazsin</a:t>
+            </a:r>
+            <a:r>
+              <a:rPr lang="de-DE" dirty="0"/>
+              <a:t> </a:t>
+            </a:r>
+            <a:r>
+              <a:rPr lang="de-DE" dirty="0" err="1"/>
+              <a:t>ve</a:t>
+            </a:r>
+            <a:r>
+              <a:rPr lang="de-DE" dirty="0"/>
+              <a:t> </a:t>
+            </a:r>
+            <a:r>
+              <a:rPr lang="de-DE" dirty="0" err="1"/>
+              <a:t>secenekler</a:t>
+            </a:r>
+            <a:r>
+              <a:rPr lang="de-DE" dirty="0"/>
+              <a:t> </a:t>
+            </a:r>
+            <a:r>
+              <a:rPr lang="de-DE" dirty="0" err="1"/>
+              <a:t>ciksin</a:t>
+            </a:r>
+            <a:r>
+              <a:rPr lang="de-DE" dirty="0"/>
+              <a:t>.</a:t>
+            </a:r>
+          </a:p>
+          <a:p>
+            <a:endParaRPr lang="de-DE" dirty="0"/>
+          </a:p>
+          <a:p>
+            <a:r>
+              <a:rPr lang="de-DE" dirty="0" err="1"/>
+              <a:t>Secenekleri</a:t>
+            </a:r>
+            <a:r>
+              <a:rPr lang="de-DE" dirty="0"/>
+              <a:t> </a:t>
+            </a:r>
+            <a:r>
+              <a:rPr lang="de-DE" dirty="0" err="1"/>
+              <a:t>scene‘e</a:t>
+            </a:r>
+            <a:r>
+              <a:rPr lang="de-DE" dirty="0"/>
+              <a:t> ekle </a:t>
+            </a:r>
+            <a:r>
+              <a:rPr lang="de-DE" dirty="0" err="1"/>
+              <a:t>ve</a:t>
+            </a:r>
+            <a:r>
+              <a:rPr lang="de-DE" dirty="0"/>
+              <a:t> </a:t>
+            </a:r>
+            <a:r>
+              <a:rPr lang="de-DE" dirty="0" err="1"/>
+              <a:t>decision</a:t>
+            </a:r>
+            <a:r>
+              <a:rPr lang="de-DE" dirty="0"/>
+              <a:t> </a:t>
+            </a:r>
+            <a:r>
+              <a:rPr lang="de-DE" dirty="0" err="1"/>
+              <a:t>pointleri</a:t>
+            </a:r>
+            <a:r>
+              <a:rPr lang="de-DE" dirty="0"/>
+              <a:t> </a:t>
+            </a:r>
+            <a:r>
+              <a:rPr lang="de-DE" dirty="0" err="1"/>
+              <a:t>belirle</a:t>
+            </a:r>
+            <a:r>
+              <a:rPr lang="de-DE" dirty="0"/>
+              <a:t>.</a:t>
+            </a:r>
+          </a:p>
+        </p:txBody>
+      </p:sp>
+    </p:spTree>
+    <p:extLst>
+      <p:ext uri="{BB962C8B-B14F-4D97-AF65-F5344CB8AC3E}">
+        <p14:creationId xmlns:p14="http://schemas.microsoft.com/office/powerpoint/2010/main" val="748826352"/>
+      </p:ext>
+    </p:extLst>
+  </p:cSld>
+  <p:clrMapOvr>
+    <a:masterClrMapping/>
+  </p:clrMapOvr>
+</p:sld>
+</file>
+
+<file path=ppt/slides/slide13.xml><?xml version="1.0" encoding="utf-8"?>
+<p:sld xmlns:a="http://schemas.openxmlformats.org/drawingml/2006/main" xmlns:r="http://schemas.openxmlformats.org/officeDocument/2006/relationships" xmlns:p="http://schemas.openxmlformats.org/presentationml/2006/main">
+  <p:cSld>
+    <p:spTree>
+      <p:nvGrpSpPr>
+        <p:cNvPr id="1" name=""/>
+        <p:cNvGrpSpPr/>
+        <p:nvPr/>
+      </p:nvGrpSpPr>
+      <p:grpSpPr>
+        <a:xfrm>
+          <a:off x="0" y="0"/>
+          <a:ext cx="0" cy="0"/>
+          <a:chOff x="0" y="0"/>
+          <a:chExt cx="0" cy="0"/>
+        </a:xfrm>
+      </p:grpSpPr>
+      <p:sp>
+        <p:nvSpPr>
+          <p:cNvPr id="2" name="Title 1">
+            <a:extLst>
+              <a:ext uri="{FF2B5EF4-FFF2-40B4-BE49-F238E27FC236}">
+                <a16:creationId xmlns:a16="http://schemas.microsoft.com/office/drawing/2014/main" id="{4665C8CF-18FA-4F21-8E50-70CBBB143081}"/>
+              </a:ext>
+            </a:extLst>
+          </p:cNvPr>
+          <p:cNvSpPr>
+            <a:spLocks noGrp="1"/>
+          </p:cNvSpPr>
+          <p:nvPr>
+            <p:ph type="ctrTitle"/>
+          </p:nvPr>
+        </p:nvSpPr>
+        <p:spPr/>
+        <p:txBody>
+          <a:bodyPr/>
+          <a:lstStyle/>
+          <a:p>
+            <a:r>
+              <a:rPr lang="de-DE" dirty="0"/>
+              <a:t>Data </a:t>
+            </a:r>
+            <a:r>
+              <a:rPr lang="de-DE" dirty="0" err="1"/>
+              <a:t>Saving</a:t>
+            </a:r>
+            <a:endParaRPr lang="de-DE" dirty="0"/>
+          </a:p>
+        </p:txBody>
+      </p:sp>
+      <p:sp>
+        <p:nvSpPr>
+          <p:cNvPr id="3" name="Subtitle 2">
+            <a:extLst>
+              <a:ext uri="{FF2B5EF4-FFF2-40B4-BE49-F238E27FC236}">
+                <a16:creationId xmlns:a16="http://schemas.microsoft.com/office/drawing/2014/main" id="{4901B3B2-DE50-467A-BB32-D282EF20ECD9}"/>
+              </a:ext>
+            </a:extLst>
+          </p:cNvPr>
+          <p:cNvSpPr>
+            <a:spLocks noGrp="1"/>
+          </p:cNvSpPr>
+          <p:nvPr>
+            <p:ph type="subTitle" idx="1"/>
+          </p:nvPr>
+        </p:nvSpPr>
+        <p:spPr/>
+        <p:txBody>
+          <a:bodyPr/>
+          <a:lstStyle/>
+          <a:p>
+            <a:endParaRPr lang="de-DE"/>
+          </a:p>
+        </p:txBody>
+      </p:sp>
+    </p:spTree>
+    <p:extLst>
+      <p:ext uri="{BB962C8B-B14F-4D97-AF65-F5344CB8AC3E}">
+        <p14:creationId xmlns:p14="http://schemas.microsoft.com/office/powerpoint/2010/main" val="897568325"/>
+      </p:ext>
+    </p:extLst>
+  </p:cSld>
+  <p:clrMapOvr>
+    <a:masterClrMapping/>
+  </p:clrMapOvr>
+</p:sld>
+</file>
+
+<file path=ppt/slides/slide14.xml><?xml version="1.0" encoding="utf-8"?>
+<p:sld xmlns:a="http://schemas.openxmlformats.org/drawingml/2006/main" xmlns:r="http://schemas.openxmlformats.org/officeDocument/2006/relationships" xmlns:p="http://schemas.openxmlformats.org/presentationml/2006/main">
+  <p:cSld>
+    <p:spTree>
+      <p:nvGrpSpPr>
+        <p:cNvPr id="1" name=""/>
+        <p:cNvGrpSpPr/>
+        <p:nvPr/>
+      </p:nvGrpSpPr>
+      <p:grpSpPr>
+        <a:xfrm>
+          <a:off x="0" y="0"/>
+          <a:ext cx="0" cy="0"/>
+          <a:chOff x="0" y="0"/>
+          <a:chExt cx="0" cy="0"/>
+        </a:xfrm>
+      </p:grpSpPr>
+      <p:sp>
+        <p:nvSpPr>
+          <p:cNvPr id="3" name="Content Placeholder 2">
+            <a:extLst>
+              <a:ext uri="{FF2B5EF4-FFF2-40B4-BE49-F238E27FC236}">
+                <a16:creationId xmlns:a16="http://schemas.microsoft.com/office/drawing/2014/main" id="{86E75D4E-0808-4661-A807-A1C5608F7572}"/>
+              </a:ext>
+            </a:extLst>
+          </p:cNvPr>
+          <p:cNvSpPr>
+            <a:spLocks noGrp="1"/>
+          </p:cNvSpPr>
+          <p:nvPr>
+            <p:ph idx="1"/>
+          </p:nvPr>
+        </p:nvSpPr>
+        <p:spPr>
+          <a:xfrm>
+            <a:off x="838200" y="1471961"/>
+            <a:ext cx="10515600" cy="4705002"/>
+          </a:xfrm>
+        </p:spPr>
+        <p:txBody>
+          <a:bodyPr>
+            <a:normAutofit fontScale="77500" lnSpcReduction="20000"/>
+          </a:bodyPr>
+          <a:lstStyle/>
+          <a:p>
+            <a:r>
+              <a:rPr lang="de-DE" dirty="0"/>
+              <a:t>I </a:t>
+            </a:r>
+            <a:r>
+              <a:rPr lang="de-DE" dirty="0" err="1"/>
+              <a:t>created</a:t>
+            </a:r>
+            <a:r>
+              <a:rPr lang="de-DE" dirty="0"/>
+              <a:t> a </a:t>
+            </a:r>
+            <a:r>
+              <a:rPr lang="de-DE" dirty="0" err="1"/>
+              <a:t>data</a:t>
+            </a:r>
+            <a:r>
+              <a:rPr lang="de-DE" dirty="0"/>
+              <a:t> </a:t>
+            </a:r>
+            <a:r>
+              <a:rPr lang="de-DE" dirty="0" err="1"/>
+              <a:t>list</a:t>
+            </a:r>
+            <a:r>
+              <a:rPr lang="de-DE" dirty="0"/>
+              <a:t> </a:t>
+            </a:r>
+            <a:r>
+              <a:rPr lang="de-DE" dirty="0" err="1"/>
+              <a:t>which</a:t>
+            </a:r>
+            <a:r>
+              <a:rPr lang="de-DE" dirty="0"/>
+              <a:t> </a:t>
+            </a:r>
+            <a:r>
+              <a:rPr lang="de-DE" dirty="0" err="1"/>
+              <a:t>includes</a:t>
+            </a:r>
+            <a:r>
+              <a:rPr lang="de-DE" dirty="0"/>
+              <a:t> </a:t>
+            </a:r>
+            <a:r>
+              <a:rPr lang="de-DE" dirty="0" err="1"/>
+              <a:t>trial</a:t>
+            </a:r>
+            <a:r>
+              <a:rPr lang="de-DE" dirty="0"/>
+              <a:t> </a:t>
+            </a:r>
+            <a:r>
+              <a:rPr lang="de-DE" dirty="0" err="1"/>
+              <a:t>data</a:t>
+            </a:r>
+            <a:r>
+              <a:rPr lang="de-DE" dirty="0"/>
+              <a:t> </a:t>
+            </a:r>
+            <a:r>
+              <a:rPr lang="de-DE" dirty="0" err="1"/>
+              <a:t>lists</a:t>
+            </a:r>
+            <a:r>
+              <a:rPr lang="de-DE" dirty="0"/>
+              <a:t>:</a:t>
+            </a:r>
+          </a:p>
+          <a:p>
+            <a:endParaRPr lang="de-DE" dirty="0"/>
+          </a:p>
+          <a:p>
+            <a:pPr marL="0" indent="0">
+              <a:buNone/>
+            </a:pPr>
+            <a:r>
+              <a:rPr lang="en-US" dirty="0"/>
+              <a:t> class </a:t>
+            </a:r>
+            <a:r>
+              <a:rPr lang="en-US" dirty="0" err="1"/>
+              <a:t>Trial_Data</a:t>
+            </a:r>
+            <a:endParaRPr lang="en-US" dirty="0"/>
+          </a:p>
+          <a:p>
+            <a:pPr marL="0" indent="0">
+              <a:buNone/>
+            </a:pPr>
+            <a:r>
+              <a:rPr lang="en-US" dirty="0"/>
+              <a:t>    {</a:t>
+            </a:r>
+          </a:p>
+          <a:p>
+            <a:pPr marL="0" indent="0">
+              <a:buNone/>
+            </a:pPr>
+            <a:r>
+              <a:rPr lang="en-US" dirty="0"/>
+              <a:t>        public string </a:t>
+            </a:r>
+            <a:r>
+              <a:rPr lang="en-US" dirty="0" err="1"/>
+              <a:t>DP_Name</a:t>
+            </a:r>
+            <a:r>
+              <a:rPr lang="en-US" dirty="0"/>
+              <a:t> { get; set; } // decision point name</a:t>
+            </a:r>
+          </a:p>
+          <a:p>
+            <a:pPr marL="0" indent="0">
+              <a:buNone/>
+            </a:pPr>
+            <a:r>
+              <a:rPr lang="en-US" dirty="0"/>
+              <a:t>        public int </a:t>
+            </a:r>
+            <a:r>
+              <a:rPr lang="en-US" dirty="0" err="1"/>
+              <a:t>Index_Number</a:t>
+            </a:r>
+            <a:r>
+              <a:rPr lang="en-US" dirty="0"/>
+              <a:t> { get; set; } // the index number        </a:t>
+            </a:r>
+          </a:p>
+          <a:p>
+            <a:pPr marL="0" indent="0">
+              <a:buNone/>
+            </a:pPr>
+            <a:r>
+              <a:rPr lang="en-US" dirty="0"/>
+              <a:t>        public float </a:t>
+            </a:r>
+            <a:r>
+              <a:rPr lang="en-US" dirty="0" err="1"/>
+              <a:t>ErrorNumber</a:t>
+            </a:r>
+            <a:r>
+              <a:rPr lang="en-US" dirty="0"/>
+              <a:t> { get; set; } // number of errors</a:t>
+            </a:r>
+          </a:p>
+          <a:p>
+            <a:pPr marL="0" indent="0">
+              <a:buNone/>
+            </a:pPr>
+            <a:r>
+              <a:rPr lang="en-US" dirty="0"/>
+              <a:t>        public float RT1 { get; set; } // reaction time during rotation</a:t>
+            </a:r>
+          </a:p>
+          <a:p>
+            <a:pPr marL="0" indent="0">
+              <a:buNone/>
+            </a:pPr>
+            <a:r>
+              <a:rPr lang="en-US" dirty="0"/>
+              <a:t>        public float RT2 { get; set; } // reaction time during rotation</a:t>
+            </a:r>
+          </a:p>
+          <a:p>
+            <a:pPr marL="0" indent="0">
+              <a:buNone/>
+            </a:pPr>
+            <a:r>
+              <a:rPr lang="en-US" dirty="0"/>
+              <a:t>        public float RT3 { get; set; } // reaction time during rotation</a:t>
+            </a:r>
+          </a:p>
+          <a:p>
+            <a:pPr marL="0" indent="0">
+              <a:buNone/>
+            </a:pPr>
+            <a:r>
+              <a:rPr lang="en-US" dirty="0"/>
+              <a:t>    }</a:t>
+            </a:r>
+          </a:p>
+          <a:p>
+            <a:pPr marL="0" indent="0">
+              <a:buNone/>
+            </a:pPr>
+            <a:endParaRPr lang="en-US" dirty="0"/>
+          </a:p>
+          <a:p>
+            <a:pPr marL="0" indent="0">
+              <a:buNone/>
+            </a:pPr>
+            <a:r>
+              <a:rPr lang="en-US" dirty="0"/>
+              <a:t>    List&lt;</a:t>
+            </a:r>
+            <a:r>
+              <a:rPr lang="en-US" dirty="0" err="1"/>
+              <a:t>Trial_Data</a:t>
+            </a:r>
+            <a:r>
+              <a:rPr lang="en-US" dirty="0"/>
+              <a:t>&gt; </a:t>
+            </a:r>
+            <a:r>
+              <a:rPr lang="en-US" dirty="0" err="1"/>
+              <a:t>data_list</a:t>
+            </a:r>
+            <a:r>
+              <a:rPr lang="en-US" dirty="0"/>
+              <a:t> = new List&lt;</a:t>
+            </a:r>
+            <a:r>
+              <a:rPr lang="en-US" dirty="0" err="1"/>
+              <a:t>Trial_Data</a:t>
+            </a:r>
+            <a:r>
+              <a:rPr lang="en-US" dirty="0"/>
+              <a:t>&gt;(); // the list which consists of trial data</a:t>
+            </a:r>
+            <a:endParaRPr lang="de-DE" dirty="0"/>
+          </a:p>
+        </p:txBody>
+      </p:sp>
+    </p:spTree>
+    <p:extLst>
+      <p:ext uri="{BB962C8B-B14F-4D97-AF65-F5344CB8AC3E}">
+        <p14:creationId xmlns:p14="http://schemas.microsoft.com/office/powerpoint/2010/main" val="3924939235"/>
+      </p:ext>
+    </p:extLst>
+  </p:cSld>
+  <p:clrMapOvr>
+    <a:masterClrMapping/>
+  </p:clrMapOvr>
+</p:sld>
+</file>
+
+<file path=ppt/slides/slide15.xml><?xml version="1.0" encoding="utf-8"?>
+<p:sld xmlns:a="http://schemas.openxmlformats.org/drawingml/2006/main" xmlns:r="http://schemas.openxmlformats.org/officeDocument/2006/relationships" xmlns:p="http://schemas.openxmlformats.org/presentationml/2006/main">
+  <p:cSld>
+    <p:spTree>
+      <p:nvGrpSpPr>
+        <p:cNvPr id="1" name=""/>
+        <p:cNvGrpSpPr/>
+        <p:nvPr/>
+      </p:nvGrpSpPr>
+      <p:grpSpPr>
+        <a:xfrm>
+          <a:off x="0" y="0"/>
+          <a:ext cx="0" cy="0"/>
+          <a:chOff x="0" y="0"/>
+          <a:chExt cx="0" cy="0"/>
+        </a:xfrm>
+      </p:grpSpPr>
+      <p:sp>
+        <p:nvSpPr>
+          <p:cNvPr id="2" name="Title 1">
+            <a:extLst>
+              <a:ext uri="{FF2B5EF4-FFF2-40B4-BE49-F238E27FC236}">
+                <a16:creationId xmlns:a16="http://schemas.microsoft.com/office/drawing/2014/main" id="{86CE3D65-2B09-4573-85B3-FC1C57CFE3ED}"/>
+              </a:ext>
+            </a:extLst>
+          </p:cNvPr>
+          <p:cNvSpPr>
+            <a:spLocks noGrp="1"/>
+          </p:cNvSpPr>
+          <p:nvPr>
+            <p:ph type="title"/>
+          </p:nvPr>
+        </p:nvSpPr>
+        <p:spPr/>
+        <p:txBody>
+          <a:bodyPr/>
+          <a:lstStyle/>
+          <a:p>
+            <a:r>
+              <a:rPr lang="de-DE" dirty="0"/>
+              <a:t>I </a:t>
+            </a:r>
+            <a:r>
+              <a:rPr lang="de-DE" dirty="0" err="1"/>
+              <a:t>created</a:t>
+            </a:r>
+            <a:r>
+              <a:rPr lang="de-DE" dirty="0"/>
+              <a:t> </a:t>
+            </a:r>
+            <a:r>
+              <a:rPr lang="de-DE" dirty="0" err="1"/>
+              <a:t>the</a:t>
+            </a:r>
+            <a:r>
+              <a:rPr lang="de-DE" dirty="0"/>
+              <a:t> </a:t>
+            </a:r>
+            <a:r>
+              <a:rPr lang="de-DE" dirty="0" err="1"/>
+              <a:t>required</a:t>
+            </a:r>
+            <a:r>
+              <a:rPr lang="de-DE" dirty="0"/>
+              <a:t> variables</a:t>
+            </a:r>
+          </a:p>
+        </p:txBody>
+      </p:sp>
+      <p:sp>
+        <p:nvSpPr>
+          <p:cNvPr id="3" name="Content Placeholder 2">
+            <a:extLst>
+              <a:ext uri="{FF2B5EF4-FFF2-40B4-BE49-F238E27FC236}">
+                <a16:creationId xmlns:a16="http://schemas.microsoft.com/office/drawing/2014/main" id="{FD3EC0A7-3CE2-4C89-87BD-677861FE45AF}"/>
+              </a:ext>
+            </a:extLst>
+          </p:cNvPr>
+          <p:cNvSpPr>
+            <a:spLocks noGrp="1"/>
+          </p:cNvSpPr>
+          <p:nvPr>
+            <p:ph idx="1"/>
+          </p:nvPr>
+        </p:nvSpPr>
+        <p:spPr/>
+        <p:txBody>
+          <a:bodyPr/>
+          <a:lstStyle/>
+          <a:p>
+            <a:r>
+              <a:rPr lang="de-DE" dirty="0"/>
+              <a:t> private </a:t>
+            </a:r>
+            <a:r>
+              <a:rPr lang="de-DE" dirty="0" err="1"/>
+              <a:t>int</a:t>
+            </a:r>
+            <a:r>
+              <a:rPr lang="de-DE" dirty="0"/>
+              <a:t> </a:t>
+            </a:r>
+            <a:r>
+              <a:rPr lang="de-DE" dirty="0" err="1"/>
+              <a:t>numberofError</a:t>
+            </a:r>
+            <a:r>
+              <a:rPr lang="de-DE" dirty="0"/>
+              <a:t> = 0;</a:t>
+            </a:r>
+          </a:p>
+          <a:p>
+            <a:endParaRPr lang="de-DE" dirty="0"/>
+          </a:p>
+          <a:p>
+            <a:r>
+              <a:rPr lang="en-US" dirty="0"/>
+              <a:t>    // Create possible reaction times for each try</a:t>
+            </a:r>
+          </a:p>
+          <a:p>
+            <a:r>
+              <a:rPr lang="en-US" dirty="0"/>
+              <a:t>    private float </a:t>
+            </a:r>
+            <a:r>
+              <a:rPr lang="en-US" dirty="0" err="1"/>
+              <a:t>RT_first</a:t>
+            </a:r>
+            <a:r>
+              <a:rPr lang="en-US" dirty="0"/>
+              <a:t> = 0; // RT for the first try</a:t>
+            </a:r>
+          </a:p>
+          <a:p>
+            <a:r>
+              <a:rPr lang="en-US" dirty="0"/>
+              <a:t>    private float </a:t>
+            </a:r>
+            <a:r>
+              <a:rPr lang="en-US" dirty="0" err="1"/>
+              <a:t>RT_second</a:t>
+            </a:r>
+            <a:r>
+              <a:rPr lang="en-US" dirty="0"/>
+              <a:t> = 0; // RT for the second try</a:t>
+            </a:r>
+          </a:p>
+          <a:p>
+            <a:r>
+              <a:rPr lang="en-US" dirty="0"/>
+              <a:t>    private float </a:t>
+            </a:r>
+            <a:r>
+              <a:rPr lang="en-US" dirty="0" err="1"/>
+              <a:t>RT_third</a:t>
+            </a:r>
+            <a:r>
+              <a:rPr lang="en-US" dirty="0"/>
+              <a:t> = 0; // RT for the third try</a:t>
+            </a:r>
+            <a:endParaRPr lang="de-DE" dirty="0"/>
+          </a:p>
+        </p:txBody>
+      </p:sp>
+    </p:spTree>
+    <p:extLst>
+      <p:ext uri="{BB962C8B-B14F-4D97-AF65-F5344CB8AC3E}">
+        <p14:creationId xmlns:p14="http://schemas.microsoft.com/office/powerpoint/2010/main" val="2384805011"/>
+      </p:ext>
+    </p:extLst>
+  </p:cSld>
+  <p:clrMapOvr>
+    <a:masterClrMapping/>
+  </p:clrMapOvr>
+</p:sld>
+</file>
+
+<file path=ppt/slides/slide16.xml><?xml version="1.0" encoding="utf-8"?>
+<p:sld xmlns:a="http://schemas.openxmlformats.org/drawingml/2006/main" xmlns:r="http://schemas.openxmlformats.org/officeDocument/2006/relationships" xmlns:p="http://schemas.openxmlformats.org/presentationml/2006/main">
+  <p:cSld>
+    <p:spTree>
+      <p:nvGrpSpPr>
+        <p:cNvPr id="1" name=""/>
+        <p:cNvGrpSpPr/>
+        <p:nvPr/>
+      </p:nvGrpSpPr>
+      <p:grpSpPr>
+        <a:xfrm>
+          <a:off x="0" y="0"/>
+          <a:ext cx="0" cy="0"/>
+          <a:chOff x="0" y="0"/>
+          <a:chExt cx="0" cy="0"/>
+        </a:xfrm>
+      </p:grpSpPr>
+      <p:sp>
+        <p:nvSpPr>
+          <p:cNvPr id="2" name="Title 1">
+            <a:extLst>
+              <a:ext uri="{FF2B5EF4-FFF2-40B4-BE49-F238E27FC236}">
+                <a16:creationId xmlns:a16="http://schemas.microsoft.com/office/drawing/2014/main" id="{229E3037-B34E-4F35-A828-70ADC326337A}"/>
+              </a:ext>
+            </a:extLst>
+          </p:cNvPr>
+          <p:cNvSpPr>
+            <a:spLocks noGrp="1"/>
+          </p:cNvSpPr>
+          <p:nvPr>
+            <p:ph type="title"/>
+          </p:nvPr>
+        </p:nvSpPr>
+        <p:spPr/>
+        <p:txBody>
+          <a:bodyPr/>
+          <a:lstStyle/>
+          <a:p>
+            <a:r>
+              <a:rPr lang="de-DE" dirty="0" err="1"/>
+              <a:t>If</a:t>
+            </a:r>
+            <a:r>
+              <a:rPr lang="de-DE" dirty="0"/>
+              <a:t> </a:t>
+            </a:r>
+            <a:r>
+              <a:rPr lang="de-DE" dirty="0" err="1"/>
+              <a:t>decision</a:t>
+            </a:r>
+            <a:r>
+              <a:rPr lang="de-DE" dirty="0"/>
+              <a:t> </a:t>
+            </a:r>
+            <a:r>
+              <a:rPr lang="de-DE" dirty="0" err="1"/>
+              <a:t>is</a:t>
+            </a:r>
+            <a:r>
+              <a:rPr lang="de-DE" dirty="0"/>
+              <a:t> </a:t>
+            </a:r>
+            <a:r>
+              <a:rPr lang="de-DE" dirty="0" err="1"/>
+              <a:t>correct</a:t>
+            </a:r>
+            <a:endParaRPr lang="de-DE" dirty="0"/>
+          </a:p>
+        </p:txBody>
+      </p:sp>
+      <p:sp>
+        <p:nvSpPr>
+          <p:cNvPr id="3" name="Content Placeholder 2">
+            <a:extLst>
+              <a:ext uri="{FF2B5EF4-FFF2-40B4-BE49-F238E27FC236}">
+                <a16:creationId xmlns:a16="http://schemas.microsoft.com/office/drawing/2014/main" id="{C69F729A-E06C-4CAA-B8EC-787DE6073F90}"/>
+              </a:ext>
+            </a:extLst>
+          </p:cNvPr>
+          <p:cNvSpPr>
+            <a:spLocks noGrp="1"/>
+          </p:cNvSpPr>
+          <p:nvPr>
+            <p:ph idx="1"/>
+          </p:nvPr>
+        </p:nvSpPr>
+        <p:spPr>
+          <a:xfrm>
+            <a:off x="838200" y="1959439"/>
+            <a:ext cx="5506844" cy="2924795"/>
+          </a:xfrm>
+        </p:spPr>
+        <p:txBody>
+          <a:bodyPr>
+            <a:normAutofit fontScale="62500" lnSpcReduction="20000"/>
+          </a:bodyPr>
+          <a:lstStyle/>
+          <a:p>
+            <a:pPr marL="0" indent="0">
+              <a:buNone/>
+            </a:pPr>
+            <a:r>
+              <a:rPr lang="de-DE" dirty="0" err="1"/>
+              <a:t>if</a:t>
+            </a:r>
+            <a:r>
+              <a:rPr lang="de-DE" dirty="0"/>
+              <a:t> (</a:t>
+            </a:r>
+            <a:r>
+              <a:rPr lang="de-DE" dirty="0" err="1"/>
+              <a:t>currentDecisionIndex</a:t>
+            </a:r>
+            <a:r>
+              <a:rPr lang="de-DE" dirty="0"/>
+              <a:t> == 0)</a:t>
+            </a:r>
+          </a:p>
+          <a:p>
+            <a:pPr marL="0" indent="0">
+              <a:buNone/>
+            </a:pPr>
+            <a:r>
+              <a:rPr lang="de-DE" dirty="0"/>
+              <a:t>                    {</a:t>
+            </a:r>
+          </a:p>
+          <a:p>
+            <a:pPr marL="0" indent="0">
+              <a:buNone/>
+            </a:pPr>
+            <a:r>
+              <a:rPr lang="de-DE" dirty="0"/>
+              <a:t>                        </a:t>
+            </a:r>
+            <a:r>
+              <a:rPr lang="de-DE" dirty="0" err="1"/>
+              <a:t>decision_point_name</a:t>
+            </a:r>
+            <a:r>
+              <a:rPr lang="de-DE" dirty="0"/>
+              <a:t> = "DP1";</a:t>
+            </a:r>
+          </a:p>
+          <a:p>
+            <a:pPr marL="0" indent="0">
+              <a:buNone/>
+            </a:pPr>
+            <a:r>
+              <a:rPr lang="de-DE" dirty="0"/>
+              <a:t>                    }</a:t>
+            </a:r>
+          </a:p>
+          <a:p>
+            <a:pPr marL="0" indent="0">
+              <a:buNone/>
+            </a:pPr>
+            <a:r>
+              <a:rPr lang="de-DE" dirty="0"/>
+              <a:t>                    </a:t>
+            </a:r>
+            <a:r>
+              <a:rPr lang="de-DE" dirty="0" err="1"/>
+              <a:t>else</a:t>
+            </a:r>
+            <a:r>
+              <a:rPr lang="de-DE" dirty="0"/>
+              <a:t> </a:t>
+            </a:r>
+          </a:p>
+          <a:p>
+            <a:pPr marL="0" indent="0">
+              <a:buNone/>
+            </a:pPr>
+            <a:r>
+              <a:rPr lang="de-DE" dirty="0"/>
+              <a:t>                    {</a:t>
+            </a:r>
+          </a:p>
+          <a:p>
+            <a:pPr marL="0" indent="0">
+              <a:buNone/>
+            </a:pPr>
+            <a:r>
+              <a:rPr lang="en-US" dirty="0"/>
+              <a:t>                        </a:t>
+            </a:r>
+            <a:r>
+              <a:rPr lang="en-US" dirty="0" err="1"/>
+              <a:t>decision_point_name</a:t>
+            </a:r>
+            <a:r>
+              <a:rPr lang="en-US" dirty="0"/>
+              <a:t> = </a:t>
+            </a:r>
+            <a:r>
+              <a:rPr lang="en-US" dirty="0" err="1"/>
+              <a:t>decisionPoints</a:t>
+            </a:r>
+            <a:r>
+              <a:rPr lang="en-US" dirty="0"/>
+              <a:t>[currentDecisionIndex-1].target.name;</a:t>
+            </a:r>
+          </a:p>
+          <a:p>
+            <a:pPr marL="0" indent="0">
+              <a:buNone/>
+            </a:pPr>
+            <a:r>
+              <a:rPr lang="de-DE" dirty="0"/>
+              <a:t>                    }</a:t>
+            </a:r>
+          </a:p>
+        </p:txBody>
+      </p:sp>
+      <p:sp>
+        <p:nvSpPr>
+          <p:cNvPr id="4" name="TextBox 3">
+            <a:extLst>
+              <a:ext uri="{FF2B5EF4-FFF2-40B4-BE49-F238E27FC236}">
+                <a16:creationId xmlns:a16="http://schemas.microsoft.com/office/drawing/2014/main" id="{48CBD1AF-832F-4B56-85FC-EDBC92A47D27}"/>
+              </a:ext>
+            </a:extLst>
+          </p:cNvPr>
+          <p:cNvSpPr txBox="1"/>
+          <p:nvPr/>
+        </p:nvSpPr>
+        <p:spPr>
+          <a:xfrm>
+            <a:off x="6813395" y="1360448"/>
+            <a:ext cx="4850781" cy="4801314"/>
+          </a:xfrm>
+          <a:prstGeom prst="rect">
+            <a:avLst/>
+          </a:prstGeom>
+          <a:noFill/>
+        </p:spPr>
+        <p:txBody>
+          <a:bodyPr wrap="square" rtlCol="0">
+            <a:spAutoFit/>
+          </a:bodyPr>
+          <a:lstStyle/>
+          <a:p>
+            <a:r>
+              <a:rPr lang="de-DE" dirty="0" err="1"/>
+              <a:t>RT_first</a:t>
+            </a:r>
+            <a:r>
+              <a:rPr lang="de-DE" dirty="0"/>
+              <a:t> = </a:t>
+            </a:r>
+            <a:r>
+              <a:rPr lang="de-DE" dirty="0" err="1"/>
+              <a:t>rotationTimer</a:t>
+            </a:r>
+            <a:r>
+              <a:rPr lang="de-DE" dirty="0"/>
+              <a:t>;</a:t>
+            </a:r>
+          </a:p>
+          <a:p>
+            <a:endParaRPr lang="de-DE" dirty="0"/>
+          </a:p>
+          <a:p>
+            <a:r>
+              <a:rPr lang="en-US" dirty="0"/>
+              <a:t>                    </a:t>
+            </a:r>
+            <a:r>
+              <a:rPr lang="en-US" dirty="0" err="1"/>
+              <a:t>data_list.Insert</a:t>
+            </a:r>
+            <a:r>
+              <a:rPr lang="en-US" dirty="0"/>
+              <a:t>(</a:t>
+            </a:r>
+            <a:r>
+              <a:rPr lang="en-US" dirty="0" err="1"/>
+              <a:t>currentDecisionIndex</a:t>
+            </a:r>
+            <a:r>
+              <a:rPr lang="en-US" dirty="0"/>
+              <a:t>, new </a:t>
+            </a:r>
+            <a:r>
+              <a:rPr lang="en-US" dirty="0" err="1"/>
+              <a:t>Trial_Data</a:t>
+            </a:r>
+            <a:r>
+              <a:rPr lang="en-US" dirty="0"/>
+              <a:t> { </a:t>
+            </a:r>
+            <a:r>
+              <a:rPr lang="en-US" dirty="0" err="1"/>
+              <a:t>DP_Name</a:t>
+            </a:r>
+            <a:r>
+              <a:rPr lang="en-US" dirty="0"/>
+              <a:t> = </a:t>
+            </a:r>
+            <a:r>
+              <a:rPr lang="en-US" dirty="0" err="1"/>
+              <a:t>decision_point_name</a:t>
+            </a:r>
+            <a:r>
+              <a:rPr lang="en-US" dirty="0"/>
+              <a:t>, </a:t>
+            </a:r>
+          </a:p>
+          <a:p>
+            <a:r>
+              <a:rPr lang="de-DE" dirty="0"/>
+              <a:t>                        </a:t>
+            </a:r>
+            <a:r>
+              <a:rPr lang="de-DE" dirty="0" err="1"/>
+              <a:t>Index_Number</a:t>
+            </a:r>
+            <a:r>
+              <a:rPr lang="de-DE" dirty="0"/>
+              <a:t> = </a:t>
+            </a:r>
+            <a:r>
+              <a:rPr lang="de-DE" dirty="0" err="1"/>
+              <a:t>currentDecisionIndex</a:t>
+            </a:r>
+            <a:r>
+              <a:rPr lang="de-DE" dirty="0"/>
+              <a:t>,                         </a:t>
+            </a:r>
+          </a:p>
+          <a:p>
+            <a:r>
+              <a:rPr lang="de-DE" dirty="0"/>
+              <a:t>                        </a:t>
+            </a:r>
+            <a:r>
+              <a:rPr lang="de-DE" dirty="0" err="1"/>
+              <a:t>ErrorNumber</a:t>
+            </a:r>
+            <a:r>
+              <a:rPr lang="de-DE" dirty="0"/>
+              <a:t> = </a:t>
+            </a:r>
+            <a:r>
+              <a:rPr lang="de-DE" dirty="0" err="1"/>
+              <a:t>numberofError</a:t>
+            </a:r>
+            <a:r>
+              <a:rPr lang="de-DE" dirty="0"/>
+              <a:t>,</a:t>
+            </a:r>
+          </a:p>
+          <a:p>
+            <a:r>
+              <a:rPr lang="de-DE" dirty="0"/>
+              <a:t>                        RT1 = </a:t>
+            </a:r>
+            <a:r>
+              <a:rPr lang="de-DE" dirty="0" err="1"/>
+              <a:t>RT_first</a:t>
+            </a:r>
+            <a:r>
+              <a:rPr lang="de-DE" dirty="0"/>
+              <a:t>,</a:t>
+            </a:r>
+          </a:p>
+          <a:p>
+            <a:r>
+              <a:rPr lang="de-DE" dirty="0"/>
+              <a:t>                        RT2= </a:t>
+            </a:r>
+            <a:r>
+              <a:rPr lang="de-DE" dirty="0" err="1"/>
+              <a:t>RT_second</a:t>
+            </a:r>
+            <a:r>
+              <a:rPr lang="de-DE" dirty="0"/>
+              <a:t>,</a:t>
+            </a:r>
+          </a:p>
+          <a:p>
+            <a:r>
+              <a:rPr lang="de-DE" dirty="0"/>
+              <a:t>                        RT3 = </a:t>
+            </a:r>
+            <a:r>
+              <a:rPr lang="de-DE" dirty="0" err="1"/>
+              <a:t>RT_third</a:t>
+            </a:r>
+            <a:r>
+              <a:rPr lang="de-DE" dirty="0"/>
+              <a:t> });</a:t>
+            </a:r>
+          </a:p>
+          <a:p>
+            <a:endParaRPr lang="de-DE" dirty="0"/>
+          </a:p>
+          <a:p>
+            <a:r>
+              <a:rPr lang="en-US" dirty="0"/>
+              <a:t>                    // reset the RTs and error number</a:t>
+            </a:r>
+          </a:p>
+          <a:p>
+            <a:r>
+              <a:rPr lang="de-DE" dirty="0"/>
+              <a:t>                    </a:t>
+            </a:r>
+            <a:r>
+              <a:rPr lang="de-DE" dirty="0" err="1"/>
+              <a:t>RT_first</a:t>
+            </a:r>
+            <a:r>
+              <a:rPr lang="de-DE" dirty="0"/>
+              <a:t> = 0;</a:t>
+            </a:r>
+          </a:p>
+          <a:p>
+            <a:r>
+              <a:rPr lang="de-DE" dirty="0"/>
+              <a:t>                    </a:t>
+            </a:r>
+            <a:r>
+              <a:rPr lang="de-DE" dirty="0" err="1"/>
+              <a:t>RT_second</a:t>
+            </a:r>
+            <a:r>
+              <a:rPr lang="de-DE" dirty="0"/>
+              <a:t> = 0;</a:t>
+            </a:r>
+          </a:p>
+          <a:p>
+            <a:r>
+              <a:rPr lang="de-DE" dirty="0"/>
+              <a:t>                    </a:t>
+            </a:r>
+            <a:r>
+              <a:rPr lang="de-DE" dirty="0" err="1"/>
+              <a:t>RT_third</a:t>
+            </a:r>
+            <a:r>
+              <a:rPr lang="de-DE" dirty="0"/>
+              <a:t> = 0;</a:t>
+            </a:r>
+          </a:p>
+          <a:p>
+            <a:r>
+              <a:rPr lang="de-DE" dirty="0"/>
+              <a:t>                    </a:t>
+            </a:r>
+            <a:r>
+              <a:rPr lang="de-DE" dirty="0" err="1"/>
+              <a:t>numberofError</a:t>
+            </a:r>
+            <a:r>
+              <a:rPr lang="de-DE" dirty="0"/>
+              <a:t> = 0;</a:t>
+            </a:r>
+          </a:p>
+        </p:txBody>
+      </p:sp>
+      <p:sp>
+        <p:nvSpPr>
+          <p:cNvPr id="5" name="TextBox 4">
+            <a:extLst>
+              <a:ext uri="{FF2B5EF4-FFF2-40B4-BE49-F238E27FC236}">
+                <a16:creationId xmlns:a16="http://schemas.microsoft.com/office/drawing/2014/main" id="{4E382925-D569-4587-B4E2-00627ECEF187}"/>
+              </a:ext>
+            </a:extLst>
+          </p:cNvPr>
+          <p:cNvSpPr txBox="1"/>
+          <p:nvPr/>
+        </p:nvSpPr>
+        <p:spPr>
+          <a:xfrm>
+            <a:off x="1115122" y="5441795"/>
+            <a:ext cx="4868512" cy="369332"/>
+          </a:xfrm>
+          <a:prstGeom prst="rect">
+            <a:avLst/>
+          </a:prstGeom>
+          <a:noFill/>
+        </p:spPr>
+        <p:txBody>
+          <a:bodyPr wrap="none" rtlCol="0">
+            <a:spAutoFit/>
+          </a:bodyPr>
+          <a:lstStyle/>
+          <a:p>
+            <a:r>
+              <a:rPr lang="de-DE" dirty="0"/>
+              <a:t>I </a:t>
+            </a:r>
+            <a:r>
+              <a:rPr lang="de-DE" dirty="0" err="1"/>
+              <a:t>made</a:t>
+            </a:r>
+            <a:r>
+              <a:rPr lang="de-DE" dirty="0"/>
+              <a:t> </a:t>
+            </a:r>
+            <a:r>
+              <a:rPr lang="de-DE" dirty="0" err="1"/>
+              <a:t>this</a:t>
+            </a:r>
+            <a:r>
+              <a:rPr lang="de-DE" dirty="0"/>
+              <a:t> </a:t>
+            </a:r>
+            <a:r>
+              <a:rPr lang="de-DE" dirty="0" err="1"/>
+              <a:t>to</a:t>
+            </a:r>
+            <a:r>
+              <a:rPr lang="de-DE" dirty="0"/>
+              <a:t> </a:t>
+            </a:r>
+            <a:r>
+              <a:rPr lang="de-DE" dirty="0" err="1"/>
+              <a:t>keep</a:t>
+            </a:r>
+            <a:r>
+              <a:rPr lang="de-DE" dirty="0"/>
+              <a:t> </a:t>
+            </a:r>
+            <a:r>
+              <a:rPr lang="de-DE" dirty="0" err="1"/>
+              <a:t>correct</a:t>
+            </a:r>
+            <a:r>
+              <a:rPr lang="de-DE" dirty="0"/>
+              <a:t> track </a:t>
+            </a:r>
+            <a:r>
+              <a:rPr lang="de-DE" dirty="0" err="1"/>
+              <a:t>of</a:t>
+            </a:r>
+            <a:r>
+              <a:rPr lang="de-DE" dirty="0"/>
+              <a:t> </a:t>
+            </a:r>
+            <a:r>
+              <a:rPr lang="de-DE" dirty="0" err="1"/>
+              <a:t>the</a:t>
+            </a:r>
+            <a:r>
+              <a:rPr lang="de-DE" dirty="0"/>
+              <a:t> DP </a:t>
+            </a:r>
+            <a:r>
+              <a:rPr lang="de-DE" dirty="0" err="1"/>
+              <a:t>names</a:t>
+            </a:r>
+            <a:r>
+              <a:rPr lang="de-DE" dirty="0"/>
+              <a:t>.</a:t>
+            </a:r>
+          </a:p>
+        </p:txBody>
+      </p:sp>
+    </p:spTree>
+    <p:extLst>
+      <p:ext uri="{BB962C8B-B14F-4D97-AF65-F5344CB8AC3E}">
+        <p14:creationId xmlns:p14="http://schemas.microsoft.com/office/powerpoint/2010/main" val="2269389679"/>
+      </p:ext>
+    </p:extLst>
+  </p:cSld>
+  <p:clrMapOvr>
+    <a:masterClrMapping/>
+  </p:clrMapOvr>
+</p:sld>
+</file>
+
+<file path=ppt/slides/slide17.xml><?xml version="1.0" encoding="utf-8"?>
+<p:sld xmlns:a="http://schemas.openxmlformats.org/drawingml/2006/main" xmlns:r="http://schemas.openxmlformats.org/officeDocument/2006/relationships" xmlns:p="http://schemas.openxmlformats.org/presentationml/2006/main">
+  <p:cSld>
+    <p:spTree>
+      <p:nvGrpSpPr>
+        <p:cNvPr id="1" name=""/>
+        <p:cNvGrpSpPr/>
+        <p:nvPr/>
+      </p:nvGrpSpPr>
+      <p:grpSpPr>
+        <a:xfrm>
+          <a:off x="0" y="0"/>
+          <a:ext cx="0" cy="0"/>
+          <a:chOff x="0" y="0"/>
+          <a:chExt cx="0" cy="0"/>
+        </a:xfrm>
+      </p:grpSpPr>
+      <p:sp>
+        <p:nvSpPr>
+          <p:cNvPr id="2" name="Title 1">
+            <a:extLst>
+              <a:ext uri="{FF2B5EF4-FFF2-40B4-BE49-F238E27FC236}">
+                <a16:creationId xmlns:a16="http://schemas.microsoft.com/office/drawing/2014/main" id="{229E3037-B34E-4F35-A828-70ADC326337A}"/>
+              </a:ext>
+            </a:extLst>
+          </p:cNvPr>
+          <p:cNvSpPr>
+            <a:spLocks noGrp="1"/>
+          </p:cNvSpPr>
+          <p:nvPr>
+            <p:ph type="title"/>
+          </p:nvPr>
+        </p:nvSpPr>
+        <p:spPr/>
+        <p:txBody>
+          <a:bodyPr/>
+          <a:lstStyle/>
+          <a:p>
+            <a:r>
+              <a:rPr lang="de-DE" dirty="0" err="1"/>
+              <a:t>If</a:t>
+            </a:r>
+            <a:r>
+              <a:rPr lang="de-DE" dirty="0"/>
+              <a:t> </a:t>
+            </a:r>
+            <a:r>
+              <a:rPr lang="de-DE" dirty="0" err="1"/>
+              <a:t>decision</a:t>
+            </a:r>
+            <a:r>
+              <a:rPr lang="de-DE" dirty="0"/>
+              <a:t> </a:t>
+            </a:r>
+            <a:r>
+              <a:rPr lang="de-DE" dirty="0" err="1"/>
+              <a:t>is</a:t>
+            </a:r>
+            <a:r>
+              <a:rPr lang="de-DE" dirty="0"/>
+              <a:t> </a:t>
+            </a:r>
+            <a:r>
+              <a:rPr lang="de-DE" dirty="0" err="1"/>
+              <a:t>correct</a:t>
+            </a:r>
+            <a:endParaRPr lang="de-DE" dirty="0"/>
+          </a:p>
+        </p:txBody>
+      </p:sp>
+      <p:sp>
+        <p:nvSpPr>
+          <p:cNvPr id="4" name="Rectangle 3">
+            <a:extLst>
+              <a:ext uri="{FF2B5EF4-FFF2-40B4-BE49-F238E27FC236}">
+                <a16:creationId xmlns:a16="http://schemas.microsoft.com/office/drawing/2014/main" id="{02750C28-2B3D-413D-B918-8E1236E3134A}"/>
+              </a:ext>
+            </a:extLst>
+          </p:cNvPr>
+          <p:cNvSpPr/>
+          <p:nvPr/>
+        </p:nvSpPr>
+        <p:spPr>
+          <a:xfrm>
+            <a:off x="1065892" y="2051154"/>
+            <a:ext cx="4054315" cy="3416320"/>
+          </a:xfrm>
+          <a:prstGeom prst="rect">
+            <a:avLst/>
+          </a:prstGeom>
+        </p:spPr>
+        <p:txBody>
+          <a:bodyPr wrap="none">
+            <a:spAutoFit/>
+          </a:bodyPr>
+          <a:lstStyle/>
+          <a:p>
+            <a:r>
+              <a:rPr lang="de-DE" dirty="0" err="1"/>
+              <a:t>else</a:t>
+            </a:r>
+            <a:endParaRPr lang="de-DE" dirty="0"/>
+          </a:p>
+          <a:p>
+            <a:r>
+              <a:rPr lang="de-DE" dirty="0"/>
+              <a:t>                {</a:t>
+            </a:r>
+          </a:p>
+          <a:p>
+            <a:r>
+              <a:rPr lang="de-DE" dirty="0"/>
+              <a:t>                    </a:t>
+            </a:r>
+            <a:r>
+              <a:rPr lang="de-DE" dirty="0" err="1"/>
+              <a:t>numberofError</a:t>
+            </a:r>
+            <a:r>
+              <a:rPr lang="de-DE" dirty="0"/>
+              <a:t>++;</a:t>
+            </a:r>
+          </a:p>
+          <a:p>
+            <a:endParaRPr lang="de-DE" dirty="0"/>
+          </a:p>
+          <a:p>
+            <a:r>
+              <a:rPr lang="de-DE" dirty="0"/>
+              <a:t>                    </a:t>
+            </a:r>
+            <a:r>
+              <a:rPr lang="de-DE" dirty="0" err="1"/>
+              <a:t>if</a:t>
+            </a:r>
+            <a:r>
+              <a:rPr lang="de-DE" dirty="0"/>
+              <a:t> (</a:t>
+            </a:r>
+            <a:r>
+              <a:rPr lang="de-DE" dirty="0" err="1"/>
+              <a:t>numberofError</a:t>
+            </a:r>
+            <a:r>
+              <a:rPr lang="de-DE" dirty="0"/>
+              <a:t> == 1) </a:t>
+            </a:r>
+          </a:p>
+          <a:p>
+            <a:r>
+              <a:rPr lang="de-DE" dirty="0"/>
+              <a:t>                    {</a:t>
+            </a:r>
+          </a:p>
+          <a:p>
+            <a:r>
+              <a:rPr lang="de-DE" dirty="0"/>
+              <a:t>                        </a:t>
+            </a:r>
+            <a:r>
+              <a:rPr lang="de-DE" dirty="0" err="1"/>
+              <a:t>RT_second</a:t>
+            </a:r>
+            <a:r>
+              <a:rPr lang="de-DE" dirty="0"/>
+              <a:t> = </a:t>
+            </a:r>
+            <a:r>
+              <a:rPr lang="de-DE" dirty="0" err="1"/>
+              <a:t>rotationTimer</a:t>
+            </a:r>
+            <a:r>
+              <a:rPr lang="de-DE" dirty="0"/>
+              <a:t>;</a:t>
+            </a:r>
+          </a:p>
+          <a:p>
+            <a:r>
+              <a:rPr lang="de-DE" dirty="0"/>
+              <a:t>                    }</a:t>
+            </a:r>
+          </a:p>
+          <a:p>
+            <a:r>
+              <a:rPr lang="de-DE" dirty="0"/>
+              <a:t>                    </a:t>
+            </a:r>
+            <a:r>
+              <a:rPr lang="de-DE" dirty="0" err="1"/>
+              <a:t>else</a:t>
+            </a:r>
+            <a:r>
+              <a:rPr lang="de-DE" dirty="0"/>
+              <a:t> </a:t>
+            </a:r>
+            <a:r>
+              <a:rPr lang="de-DE" dirty="0" err="1"/>
+              <a:t>if</a:t>
+            </a:r>
+            <a:r>
+              <a:rPr lang="de-DE" dirty="0"/>
+              <a:t> (</a:t>
+            </a:r>
+            <a:r>
+              <a:rPr lang="de-DE" dirty="0" err="1"/>
+              <a:t>numberofError</a:t>
+            </a:r>
+            <a:r>
+              <a:rPr lang="de-DE" dirty="0"/>
+              <a:t> == 2)</a:t>
+            </a:r>
+          </a:p>
+          <a:p>
+            <a:r>
+              <a:rPr lang="de-DE" dirty="0"/>
+              <a:t>                    {</a:t>
+            </a:r>
+          </a:p>
+          <a:p>
+            <a:r>
+              <a:rPr lang="de-DE" dirty="0"/>
+              <a:t>                        </a:t>
+            </a:r>
+            <a:r>
+              <a:rPr lang="de-DE" dirty="0" err="1"/>
+              <a:t>RT_third</a:t>
+            </a:r>
+            <a:r>
+              <a:rPr lang="de-DE" dirty="0"/>
+              <a:t> = </a:t>
+            </a:r>
+            <a:r>
+              <a:rPr lang="de-DE" dirty="0" err="1"/>
+              <a:t>rotationTimer</a:t>
+            </a:r>
+            <a:r>
+              <a:rPr lang="de-DE" dirty="0"/>
+              <a:t>;</a:t>
+            </a:r>
+          </a:p>
+          <a:p>
+            <a:r>
+              <a:rPr lang="de-DE" dirty="0"/>
+              <a:t>                    }</a:t>
+            </a:r>
+          </a:p>
+        </p:txBody>
+      </p:sp>
+      <p:sp>
+        <p:nvSpPr>
+          <p:cNvPr id="5" name="Rectangle 4">
+            <a:extLst>
+              <a:ext uri="{FF2B5EF4-FFF2-40B4-BE49-F238E27FC236}">
+                <a16:creationId xmlns:a16="http://schemas.microsoft.com/office/drawing/2014/main" id="{B912919B-199B-4F77-BC85-7E261ED243A8}"/>
+              </a:ext>
+            </a:extLst>
+          </p:cNvPr>
+          <p:cNvSpPr/>
+          <p:nvPr/>
+        </p:nvSpPr>
+        <p:spPr>
+          <a:xfrm>
+            <a:off x="5779140" y="2051154"/>
+            <a:ext cx="4404667" cy="1200329"/>
+          </a:xfrm>
+          <a:prstGeom prst="rect">
+            <a:avLst/>
+          </a:prstGeom>
+        </p:spPr>
+        <p:txBody>
+          <a:bodyPr wrap="none">
+            <a:spAutoFit/>
+          </a:bodyPr>
+          <a:lstStyle/>
+          <a:p>
+            <a:r>
+              <a:rPr lang="de-DE" dirty="0" err="1"/>
+              <a:t>Increase</a:t>
+            </a:r>
+            <a:r>
+              <a:rPr lang="de-DE" dirty="0"/>
+              <a:t> </a:t>
+            </a:r>
+            <a:r>
+              <a:rPr lang="de-DE" dirty="0" err="1"/>
+              <a:t>the</a:t>
+            </a:r>
+            <a:r>
+              <a:rPr lang="de-DE" dirty="0"/>
+              <a:t> </a:t>
+            </a:r>
+            <a:r>
+              <a:rPr lang="de-DE" dirty="0" err="1"/>
+              <a:t>number</a:t>
+            </a:r>
+            <a:r>
+              <a:rPr lang="de-DE" dirty="0"/>
+              <a:t> </a:t>
+            </a:r>
+            <a:r>
+              <a:rPr lang="de-DE" dirty="0" err="1"/>
+              <a:t>of</a:t>
+            </a:r>
+            <a:r>
+              <a:rPr lang="de-DE" dirty="0"/>
+              <a:t> </a:t>
+            </a:r>
+            <a:r>
+              <a:rPr lang="de-DE" dirty="0" err="1"/>
+              <a:t>errors</a:t>
+            </a:r>
+            <a:r>
+              <a:rPr lang="de-DE" dirty="0"/>
+              <a:t> variable.</a:t>
+            </a:r>
+          </a:p>
+          <a:p>
+            <a:endParaRPr lang="de-DE" dirty="0"/>
+          </a:p>
+          <a:p>
+            <a:r>
+              <a:rPr lang="de-DE" dirty="0" err="1"/>
+              <a:t>If</a:t>
+            </a:r>
+            <a:r>
+              <a:rPr lang="de-DE" dirty="0"/>
+              <a:t> </a:t>
+            </a:r>
+            <a:r>
+              <a:rPr lang="de-DE" dirty="0" err="1"/>
+              <a:t>it</a:t>
+            </a:r>
+            <a:r>
+              <a:rPr lang="de-DE" dirty="0"/>
+              <a:t> </a:t>
+            </a:r>
+            <a:r>
+              <a:rPr lang="de-DE" dirty="0" err="1"/>
+              <a:t>is</a:t>
+            </a:r>
+            <a:r>
+              <a:rPr lang="de-DE" dirty="0"/>
+              <a:t> </a:t>
+            </a:r>
+            <a:r>
+              <a:rPr lang="de-DE" dirty="0" err="1"/>
+              <a:t>the</a:t>
+            </a:r>
+            <a:r>
+              <a:rPr lang="de-DE" dirty="0"/>
+              <a:t> </a:t>
+            </a:r>
+            <a:r>
+              <a:rPr lang="de-DE" dirty="0" err="1"/>
+              <a:t>first</a:t>
+            </a:r>
+            <a:r>
+              <a:rPr lang="de-DE" dirty="0"/>
+              <a:t> </a:t>
+            </a:r>
+            <a:r>
+              <a:rPr lang="de-DE" dirty="0" err="1"/>
+              <a:t>error</a:t>
+            </a:r>
+            <a:r>
+              <a:rPr lang="de-DE" dirty="0"/>
+              <a:t>, </a:t>
+            </a:r>
+            <a:r>
+              <a:rPr lang="de-DE" dirty="0" err="1"/>
+              <a:t>then</a:t>
+            </a:r>
+            <a:r>
+              <a:rPr lang="de-DE" dirty="0"/>
+              <a:t> save </a:t>
+            </a:r>
+            <a:r>
+              <a:rPr lang="de-DE" dirty="0" err="1"/>
+              <a:t>the</a:t>
+            </a:r>
+            <a:r>
+              <a:rPr lang="de-DE" dirty="0"/>
+              <a:t> </a:t>
+            </a:r>
+            <a:r>
+              <a:rPr lang="de-DE" dirty="0" err="1"/>
+              <a:t>second</a:t>
+            </a:r>
+            <a:r>
+              <a:rPr lang="de-DE" dirty="0"/>
+              <a:t> RT.</a:t>
+            </a:r>
+          </a:p>
+          <a:p>
+            <a:r>
+              <a:rPr lang="de-DE" dirty="0" err="1"/>
+              <a:t>If</a:t>
+            </a:r>
+            <a:r>
+              <a:rPr lang="de-DE" dirty="0"/>
+              <a:t> </a:t>
+            </a:r>
+            <a:r>
+              <a:rPr lang="de-DE" dirty="0" err="1"/>
+              <a:t>it</a:t>
+            </a:r>
+            <a:r>
+              <a:rPr lang="de-DE" dirty="0"/>
+              <a:t> </a:t>
+            </a:r>
+            <a:r>
+              <a:rPr lang="de-DE" dirty="0" err="1"/>
+              <a:t>is</a:t>
+            </a:r>
+            <a:r>
+              <a:rPr lang="de-DE" dirty="0"/>
+              <a:t> </a:t>
+            </a:r>
+            <a:r>
+              <a:rPr lang="de-DE" dirty="0" err="1"/>
+              <a:t>the</a:t>
+            </a:r>
+            <a:r>
+              <a:rPr lang="de-DE" dirty="0"/>
+              <a:t> </a:t>
+            </a:r>
+            <a:r>
+              <a:rPr lang="de-DE" dirty="0" err="1"/>
+              <a:t>third</a:t>
+            </a:r>
+            <a:r>
+              <a:rPr lang="de-DE" dirty="0"/>
+              <a:t> </a:t>
+            </a:r>
+            <a:r>
+              <a:rPr lang="de-DE" dirty="0" err="1"/>
+              <a:t>error</a:t>
+            </a:r>
+            <a:r>
+              <a:rPr lang="de-DE" dirty="0"/>
+              <a:t>, </a:t>
+            </a:r>
+            <a:r>
+              <a:rPr lang="de-DE" dirty="0" err="1"/>
+              <a:t>then</a:t>
+            </a:r>
+            <a:r>
+              <a:rPr lang="de-DE" dirty="0"/>
+              <a:t> save </a:t>
+            </a:r>
+            <a:r>
+              <a:rPr lang="de-DE" dirty="0" err="1"/>
+              <a:t>the</a:t>
+            </a:r>
+            <a:r>
+              <a:rPr lang="de-DE" dirty="0"/>
+              <a:t> </a:t>
+            </a:r>
+            <a:r>
+              <a:rPr lang="de-DE" dirty="0" err="1"/>
+              <a:t>third</a:t>
+            </a:r>
+            <a:r>
+              <a:rPr lang="de-DE" dirty="0"/>
+              <a:t> </a:t>
+            </a:r>
+            <a:r>
+              <a:rPr lang="de-DE" dirty="0" err="1"/>
+              <a:t>one</a:t>
+            </a:r>
+            <a:endParaRPr lang="de-DE" dirty="0"/>
+          </a:p>
+        </p:txBody>
+      </p:sp>
+      <p:sp>
+        <p:nvSpPr>
+          <p:cNvPr id="6" name="TextBox 5">
+            <a:extLst>
+              <a:ext uri="{FF2B5EF4-FFF2-40B4-BE49-F238E27FC236}">
+                <a16:creationId xmlns:a16="http://schemas.microsoft.com/office/drawing/2014/main" id="{3620537F-8271-4AC7-B4C9-831222354790}"/>
+              </a:ext>
+            </a:extLst>
+          </p:cNvPr>
+          <p:cNvSpPr txBox="1"/>
+          <p:nvPr/>
+        </p:nvSpPr>
+        <p:spPr>
+          <a:xfrm>
+            <a:off x="0" y="5827940"/>
+            <a:ext cx="12303304" cy="461665"/>
+          </a:xfrm>
+          <a:prstGeom prst="rect">
+            <a:avLst/>
+          </a:prstGeom>
+          <a:noFill/>
+        </p:spPr>
+        <p:txBody>
+          <a:bodyPr wrap="none" rtlCol="0">
+            <a:spAutoFit/>
+          </a:bodyPr>
+          <a:lstStyle/>
+          <a:p>
+            <a:r>
+              <a:rPr lang="de-DE" sz="2400" b="1" dirty="0">
+                <a:solidFill>
+                  <a:srgbClr val="FF0000"/>
+                </a:solidFill>
+              </a:rPr>
+              <a:t>RT </a:t>
+            </a:r>
+            <a:r>
+              <a:rPr lang="de-DE" sz="2400" b="1" dirty="0" err="1">
+                <a:solidFill>
+                  <a:srgbClr val="FF0000"/>
+                </a:solidFill>
+              </a:rPr>
+              <a:t>siralamasi</a:t>
+            </a:r>
+            <a:r>
+              <a:rPr lang="de-DE" sz="2400" b="1" dirty="0">
+                <a:solidFill>
+                  <a:srgbClr val="FF0000"/>
+                </a:solidFill>
+              </a:rPr>
+              <a:t> </a:t>
+            </a:r>
+            <a:r>
+              <a:rPr lang="de-DE" sz="2400" b="1" dirty="0" err="1">
+                <a:solidFill>
+                  <a:srgbClr val="FF0000"/>
+                </a:solidFill>
+              </a:rPr>
+              <a:t>dogru</a:t>
+            </a:r>
+            <a:r>
+              <a:rPr lang="de-DE" sz="2400" b="1" dirty="0">
+                <a:solidFill>
+                  <a:srgbClr val="FF0000"/>
+                </a:solidFill>
+              </a:rPr>
+              <a:t> </a:t>
+            </a:r>
+            <a:r>
+              <a:rPr lang="de-DE" sz="2400" b="1" dirty="0" err="1">
+                <a:solidFill>
+                  <a:srgbClr val="FF0000"/>
+                </a:solidFill>
+              </a:rPr>
+              <a:t>degil</a:t>
+            </a:r>
+            <a:r>
+              <a:rPr lang="de-DE" sz="2400" b="1" dirty="0">
+                <a:solidFill>
+                  <a:srgbClr val="FF0000"/>
+                </a:solidFill>
+              </a:rPr>
+              <a:t>. 3.‘de </a:t>
+            </a:r>
+            <a:r>
+              <a:rPr lang="de-DE" sz="2400" b="1" dirty="0" err="1">
+                <a:solidFill>
+                  <a:srgbClr val="FF0000"/>
+                </a:solidFill>
+              </a:rPr>
+              <a:t>dogru</a:t>
+            </a:r>
+            <a:r>
+              <a:rPr lang="de-DE" sz="2400" b="1" dirty="0">
+                <a:solidFill>
+                  <a:srgbClr val="FF0000"/>
+                </a:solidFill>
+              </a:rPr>
+              <a:t> </a:t>
+            </a:r>
+            <a:r>
+              <a:rPr lang="de-DE" sz="2400" b="1" dirty="0" err="1">
+                <a:solidFill>
+                  <a:srgbClr val="FF0000"/>
+                </a:solidFill>
+              </a:rPr>
+              <a:t>yapsa</a:t>
+            </a:r>
+            <a:r>
+              <a:rPr lang="de-DE" sz="2400" b="1" dirty="0">
+                <a:solidFill>
+                  <a:srgbClr val="FF0000"/>
+                </a:solidFill>
+              </a:rPr>
+              <a:t> da </a:t>
+            </a:r>
+            <a:r>
+              <a:rPr lang="de-DE" sz="2400" b="1" dirty="0" err="1">
+                <a:solidFill>
+                  <a:srgbClr val="FF0000"/>
+                </a:solidFill>
+              </a:rPr>
+              <a:t>onu</a:t>
+            </a:r>
+            <a:r>
+              <a:rPr lang="de-DE" sz="2400" b="1" dirty="0">
+                <a:solidFill>
+                  <a:srgbClr val="FF0000"/>
+                </a:solidFill>
+              </a:rPr>
+              <a:t> RT1 </a:t>
+            </a:r>
+            <a:r>
+              <a:rPr lang="de-DE" sz="2400" b="1" dirty="0" err="1">
+                <a:solidFill>
+                  <a:srgbClr val="FF0000"/>
+                </a:solidFill>
+              </a:rPr>
+              <a:t>diye</a:t>
+            </a:r>
+            <a:r>
+              <a:rPr lang="de-DE" sz="2400" b="1" dirty="0">
+                <a:solidFill>
+                  <a:srgbClr val="FF0000"/>
+                </a:solidFill>
+              </a:rPr>
+              <a:t> </a:t>
+            </a:r>
+            <a:r>
+              <a:rPr lang="de-DE" sz="2400" b="1" dirty="0" err="1">
+                <a:solidFill>
+                  <a:srgbClr val="FF0000"/>
+                </a:solidFill>
+              </a:rPr>
+              <a:t>kaydediyor</a:t>
+            </a:r>
+            <a:r>
+              <a:rPr lang="de-DE" sz="2400" b="1" dirty="0">
+                <a:solidFill>
+                  <a:srgbClr val="FF0000"/>
+                </a:solidFill>
+              </a:rPr>
+              <a:t>. </a:t>
+            </a:r>
+            <a:r>
+              <a:rPr lang="de-DE" sz="2400" b="1" dirty="0" err="1">
+                <a:solidFill>
+                  <a:srgbClr val="FF0000"/>
+                </a:solidFill>
+              </a:rPr>
+              <a:t>Bu</a:t>
+            </a:r>
+            <a:r>
+              <a:rPr lang="de-DE" sz="2400" b="1" dirty="0">
+                <a:solidFill>
+                  <a:srgbClr val="FF0000"/>
+                </a:solidFill>
+              </a:rPr>
+              <a:t> </a:t>
+            </a:r>
+            <a:r>
+              <a:rPr lang="de-DE" sz="2400" b="1" dirty="0" err="1">
+                <a:solidFill>
+                  <a:srgbClr val="FF0000"/>
+                </a:solidFill>
+              </a:rPr>
+              <a:t>siralamayi</a:t>
+            </a:r>
+            <a:r>
+              <a:rPr lang="de-DE" sz="2400" b="1" dirty="0">
+                <a:solidFill>
+                  <a:srgbClr val="FF0000"/>
+                </a:solidFill>
+              </a:rPr>
+              <a:t> </a:t>
+            </a:r>
+            <a:r>
+              <a:rPr lang="de-DE" sz="2400" b="1" dirty="0" err="1">
+                <a:solidFill>
+                  <a:srgbClr val="FF0000"/>
+                </a:solidFill>
+              </a:rPr>
+              <a:t>düzelt</a:t>
+            </a:r>
+            <a:r>
+              <a:rPr lang="de-DE" sz="2400" b="1" dirty="0">
+                <a:solidFill>
+                  <a:srgbClr val="FF0000"/>
+                </a:solidFill>
+              </a:rPr>
+              <a:t>!!!</a:t>
+            </a:r>
+          </a:p>
+        </p:txBody>
+      </p:sp>
+    </p:spTree>
+    <p:extLst>
+      <p:ext uri="{BB962C8B-B14F-4D97-AF65-F5344CB8AC3E}">
+        <p14:creationId xmlns:p14="http://schemas.microsoft.com/office/powerpoint/2010/main" val="1281712653"/>
+      </p:ext>
+    </p:extLst>
+  </p:cSld>
+  <p:clrMapOvr>
+    <a:masterClrMapping/>
+  </p:clrMapOvr>
+</p:sld>
+</file>
+
 <file path=ppt/slides/slide2.xml><?xml version="1.0" encoding="utf-8"?>
 <p:sld xmlns:a="http://schemas.openxmlformats.org/drawingml/2006/main" xmlns:r="http://schemas.openxmlformats.org/officeDocument/2006/relationships" xmlns:p="http://schemas.openxmlformats.org/presentationml/2006/main">
   <p:cSld>
@@ -4451,6 +7962,255 @@
           <p:cNvPr id="2" name="Title 1">
             <a:extLst>
               <a:ext uri="{FF2B5EF4-FFF2-40B4-BE49-F238E27FC236}">
+                <a16:creationId xmlns:a16="http://schemas.microsoft.com/office/drawing/2014/main" id="{94632AE7-3AF1-4AC5-AEF8-AF0B119A989C}"/>
+              </a:ext>
+            </a:extLst>
+          </p:cNvPr>
+          <p:cNvSpPr>
+            <a:spLocks noGrp="1"/>
+          </p:cNvSpPr>
+          <p:nvPr>
+            <p:ph type="title"/>
+          </p:nvPr>
+        </p:nvSpPr>
+        <p:spPr/>
+        <p:txBody>
+          <a:bodyPr/>
+          <a:lstStyle/>
+          <a:p>
+            <a:r>
+              <a:rPr lang="de-DE" dirty="0"/>
+              <a:t>Main </a:t>
+            </a:r>
+            <a:r>
+              <a:rPr lang="de-DE" dirty="0" err="1"/>
+              <a:t>Camera</a:t>
+            </a:r>
+            <a:r>
+              <a:rPr lang="de-DE" dirty="0"/>
+              <a:t> </a:t>
+            </a:r>
+            <a:r>
+              <a:rPr lang="de-DE" dirty="0" err="1"/>
+              <a:t>is</a:t>
+            </a:r>
+            <a:r>
+              <a:rPr lang="de-DE" dirty="0"/>
+              <a:t> </a:t>
+            </a:r>
+            <a:r>
+              <a:rPr lang="de-DE" dirty="0" err="1"/>
+              <a:t>our</a:t>
+            </a:r>
+            <a:r>
+              <a:rPr lang="de-DE" dirty="0"/>
+              <a:t> Player</a:t>
+            </a:r>
+          </a:p>
+        </p:txBody>
+      </p:sp>
+      <p:sp>
+        <p:nvSpPr>
+          <p:cNvPr id="3" name="Content Placeholder 2">
+            <a:extLst>
+              <a:ext uri="{FF2B5EF4-FFF2-40B4-BE49-F238E27FC236}">
+                <a16:creationId xmlns:a16="http://schemas.microsoft.com/office/drawing/2014/main" id="{B176D1DE-E506-4C8B-85C4-722B3200E3BB}"/>
+              </a:ext>
+            </a:extLst>
+          </p:cNvPr>
+          <p:cNvSpPr>
+            <a:spLocks noGrp="1"/>
+          </p:cNvSpPr>
+          <p:nvPr>
+            <p:ph idx="1"/>
+          </p:nvPr>
+        </p:nvSpPr>
+        <p:spPr>
+          <a:xfrm>
+            <a:off x="838200" y="1825625"/>
+            <a:ext cx="5005039" cy="4351338"/>
+          </a:xfrm>
+        </p:spPr>
+        <p:txBody>
+          <a:bodyPr>
+            <a:normAutofit fontScale="85000" lnSpcReduction="20000"/>
+          </a:bodyPr>
+          <a:lstStyle/>
+          <a:p>
+            <a:r>
+              <a:rPr lang="en-GB" dirty="0"/>
+              <a:t>I added </a:t>
+            </a:r>
+            <a:r>
+              <a:rPr lang="en-GB" dirty="0" err="1"/>
+              <a:t>NavMeshAgent</a:t>
+            </a:r>
+            <a:r>
+              <a:rPr lang="en-GB" dirty="0"/>
+              <a:t> component to the Main Camera to make it move in the routes. </a:t>
+            </a:r>
+          </a:p>
+          <a:p>
+            <a:r>
+              <a:rPr lang="en-GB" dirty="0"/>
+              <a:t>I attached the Player Movement Script to the main camera. In this script everything is defined.</a:t>
+            </a:r>
+          </a:p>
+          <a:p>
+            <a:r>
+              <a:rPr lang="en-GB" dirty="0"/>
+              <a:t>To define the initial orientation, I created and empty game object and placed it to where I want the player to face at the beginning.</a:t>
+            </a:r>
+          </a:p>
+          <a:p>
+            <a:r>
+              <a:rPr lang="en-GB" dirty="0"/>
+              <a:t>Then, under the Player Movement Script component, I dragged and dropped that </a:t>
+            </a:r>
+            <a:r>
+              <a:rPr lang="en-GB" dirty="0" err="1"/>
+              <a:t>InitialOrientation</a:t>
+            </a:r>
+            <a:r>
+              <a:rPr lang="en-GB" dirty="0"/>
+              <a:t> </a:t>
+            </a:r>
+            <a:r>
+              <a:rPr lang="en-GB" dirty="0" err="1"/>
+              <a:t>GameObject</a:t>
+            </a:r>
+            <a:r>
+              <a:rPr lang="en-GB" dirty="0"/>
+              <a:t> to the </a:t>
+            </a:r>
+            <a:r>
+              <a:rPr lang="en-GB" dirty="0" err="1"/>
+              <a:t>InitialOrientation</a:t>
+            </a:r>
+            <a:r>
+              <a:rPr lang="en-GB" dirty="0"/>
+              <a:t> area.</a:t>
+            </a:r>
+          </a:p>
+        </p:txBody>
+      </p:sp>
+      <p:pic>
+        <p:nvPicPr>
+          <p:cNvPr id="4" name="Picture 3">
+            <a:extLst>
+              <a:ext uri="{FF2B5EF4-FFF2-40B4-BE49-F238E27FC236}">
+                <a16:creationId xmlns:a16="http://schemas.microsoft.com/office/drawing/2014/main" id="{72FDA21B-A7E5-4E73-882A-8F02F31F7A59}"/>
+              </a:ext>
+            </a:extLst>
+          </p:cNvPr>
+          <p:cNvPicPr>
+            <a:picLocks noChangeAspect="1"/>
+          </p:cNvPicPr>
+          <p:nvPr/>
+        </p:nvPicPr>
+        <p:blipFill>
+          <a:blip r:embed="rId2"/>
+          <a:stretch>
+            <a:fillRect/>
+          </a:stretch>
+        </p:blipFill>
+        <p:spPr>
+          <a:xfrm>
+            <a:off x="6096000" y="1690688"/>
+            <a:ext cx="5582429" cy="3391373"/>
+          </a:xfrm>
+          <a:prstGeom prst="rect">
+            <a:avLst/>
+          </a:prstGeom>
+        </p:spPr>
+      </p:pic>
+      <p:sp>
+        <p:nvSpPr>
+          <p:cNvPr id="5" name="Arrow: Down 4">
+            <a:extLst>
+              <a:ext uri="{FF2B5EF4-FFF2-40B4-BE49-F238E27FC236}">
+                <a16:creationId xmlns:a16="http://schemas.microsoft.com/office/drawing/2014/main" id="{79CEA022-660C-4B15-9723-8888FC56D694}"/>
+              </a:ext>
+            </a:extLst>
+          </p:cNvPr>
+          <p:cNvSpPr/>
+          <p:nvPr/>
+        </p:nvSpPr>
+        <p:spPr>
+          <a:xfrm rot="18620828">
+            <a:off x="8720986" y="2182124"/>
+            <a:ext cx="176342" cy="2630652"/>
+          </a:xfrm>
+          <a:prstGeom prst="downArrow">
+            <a:avLst/>
+          </a:prstGeom>
+          <a:solidFill>
+            <a:srgbClr val="FF0000"/>
+          </a:solidFill>
+          <a:ln>
+            <a:noFill/>
+          </a:ln>
+        </p:spPr>
+        <p:style>
+          <a:lnRef idx="2">
+            <a:schemeClr val="accent1">
+              <a:shade val="50000"/>
+            </a:schemeClr>
+          </a:lnRef>
+          <a:fillRef idx="1">
+            <a:schemeClr val="accent1"/>
+          </a:fillRef>
+          <a:effectRef idx="0">
+            <a:schemeClr val="accent1"/>
+          </a:effectRef>
+          <a:fontRef idx="minor">
+            <a:schemeClr val="lt1"/>
+          </a:fontRef>
+        </p:style>
+        <p:txBody>
+          <a:bodyPr rtlCol="0" anchor="ctr"/>
+          <a:lstStyle/>
+          <a:p>
+            <a:pPr algn="ctr"/>
+            <a:endParaRPr lang="de-DE"/>
+          </a:p>
+        </p:txBody>
+      </p:sp>
+    </p:spTree>
+    <p:extLst>
+      <p:ext uri="{BB962C8B-B14F-4D97-AF65-F5344CB8AC3E}">
+        <p14:creationId xmlns:p14="http://schemas.microsoft.com/office/powerpoint/2010/main" val="2525323788"/>
+      </p:ext>
+    </p:extLst>
+  </p:cSld>
+  <p:clrMapOvr>
+    <a:masterClrMapping/>
+  </p:clrMapOvr>
+</p:sld>
+</file>
+
+<file path=ppt/slides/slide8.xml><?xml version="1.0" encoding="utf-8"?>
+<p:sld xmlns:a="http://schemas.openxmlformats.org/drawingml/2006/main" xmlns:r="http://schemas.openxmlformats.org/officeDocument/2006/relationships" xmlns:p="http://schemas.openxmlformats.org/presentationml/2006/main">
+  <p:cSld>
+    <p:spTree>
+      <p:nvGrpSpPr>
+        <p:cNvPr id="1" name=""/>
+        <p:cNvGrpSpPr/>
+        <p:nvPr/>
+      </p:nvGrpSpPr>
+      <p:grpSpPr>
+        <a:xfrm>
+          <a:off x="0" y="0"/>
+          <a:ext cx="0" cy="0"/>
+          <a:chOff x="0" y="0"/>
+          <a:chExt cx="0" cy="0"/>
+        </a:xfrm>
+      </p:grpSpPr>
+      <p:sp>
+        <p:nvSpPr>
+          <p:cNvPr id="2" name="Title 1">
+            <a:extLst>
+              <a:ext uri="{FF2B5EF4-FFF2-40B4-BE49-F238E27FC236}">
                 <a16:creationId xmlns:a16="http://schemas.microsoft.com/office/drawing/2014/main" id="{4665C8CF-18FA-4F21-8E50-70CBBB143081}"/>
               </a:ext>
             </a:extLst>
@@ -4508,6 +8268,208 @@
     <p:extLst>
       <p:ext uri="{BB962C8B-B14F-4D97-AF65-F5344CB8AC3E}">
         <p14:creationId xmlns:p14="http://schemas.microsoft.com/office/powerpoint/2010/main" val="2662140163"/>
+      </p:ext>
+    </p:extLst>
+  </p:cSld>
+  <p:clrMapOvr>
+    <a:masterClrMapping/>
+  </p:clrMapOvr>
+</p:sld>
+</file>
+
+<file path=ppt/slides/slide9.xml><?xml version="1.0" encoding="utf-8"?>
+<p:sld xmlns:a="http://schemas.openxmlformats.org/drawingml/2006/main" xmlns:r="http://schemas.openxmlformats.org/officeDocument/2006/relationships" xmlns:p="http://schemas.openxmlformats.org/presentationml/2006/main">
+  <p:cSld>
+    <p:spTree>
+      <p:nvGrpSpPr>
+        <p:cNvPr id="1" name=""/>
+        <p:cNvGrpSpPr/>
+        <p:nvPr/>
+      </p:nvGrpSpPr>
+      <p:grpSpPr>
+        <a:xfrm>
+          <a:off x="0" y="0"/>
+          <a:ext cx="0" cy="0"/>
+          <a:chOff x="0" y="0"/>
+          <a:chExt cx="0" cy="0"/>
+        </a:xfrm>
+      </p:grpSpPr>
+      <p:sp>
+        <p:nvSpPr>
+          <p:cNvPr id="3" name="Content Placeholder 2">
+            <a:extLst>
+              <a:ext uri="{FF2B5EF4-FFF2-40B4-BE49-F238E27FC236}">
+                <a16:creationId xmlns:a16="http://schemas.microsoft.com/office/drawing/2014/main" id="{E9CA1E7D-8E65-45A9-AA1D-86C64EECE4AE}"/>
+              </a:ext>
+            </a:extLst>
+          </p:cNvPr>
+          <p:cNvSpPr>
+            <a:spLocks noGrp="1"/>
+          </p:cNvSpPr>
+          <p:nvPr>
+            <p:ph idx="1"/>
+          </p:nvPr>
+        </p:nvSpPr>
+        <p:spPr>
+          <a:xfrm>
+            <a:off x="838199" y="613317"/>
+            <a:ext cx="4926675" cy="5319132"/>
+          </a:xfrm>
+        </p:spPr>
+        <p:txBody>
+          <a:bodyPr>
+            <a:normAutofit lnSpcReduction="10000"/>
+          </a:bodyPr>
+          <a:lstStyle/>
+          <a:p>
+            <a:r>
+              <a:rPr lang="en-GB" dirty="0"/>
+              <a:t>Under the player movement script component in the inspector, you see the Decision Points list.</a:t>
+            </a:r>
+          </a:p>
+          <a:p>
+            <a:r>
+              <a:rPr lang="en-GB" dirty="0"/>
+              <a:t>Click plus sign to add the decision points.</a:t>
+            </a:r>
+          </a:p>
+          <a:p>
+            <a:r>
+              <a:rPr lang="en-GB" dirty="0"/>
+              <a:t>Here, each element had the target and the correct answer to reach that target.</a:t>
+            </a:r>
+          </a:p>
+          <a:p>
+            <a:pPr lvl="1"/>
+            <a:r>
+              <a:rPr lang="en-GB" dirty="0"/>
+              <a:t>You should add the target decision point and select the correct button to reach that decision point. </a:t>
+            </a:r>
+          </a:p>
+          <a:p>
+            <a:pPr lvl="1"/>
+            <a:r>
+              <a:rPr lang="en-GB" dirty="0"/>
+              <a:t>For example, to go to DP1, ‚D‘ needs to be pressed.</a:t>
+            </a:r>
+          </a:p>
+        </p:txBody>
+      </p:sp>
+      <p:pic>
+        <p:nvPicPr>
+          <p:cNvPr id="4" name="Picture 3">
+            <a:extLst>
+              <a:ext uri="{FF2B5EF4-FFF2-40B4-BE49-F238E27FC236}">
+                <a16:creationId xmlns:a16="http://schemas.microsoft.com/office/drawing/2014/main" id="{DC189001-50F8-47A2-A49D-02BFE9BFB8C2}"/>
+              </a:ext>
+            </a:extLst>
+          </p:cNvPr>
+          <p:cNvPicPr>
+            <a:picLocks noChangeAspect="1"/>
+          </p:cNvPicPr>
+          <p:nvPr/>
+        </p:nvPicPr>
+        <p:blipFill>
+          <a:blip r:embed="rId2"/>
+          <a:stretch>
+            <a:fillRect/>
+          </a:stretch>
+        </p:blipFill>
+        <p:spPr>
+          <a:xfrm>
+            <a:off x="6096000" y="244260"/>
+            <a:ext cx="5582429" cy="3648584"/>
+          </a:xfrm>
+          <a:prstGeom prst="rect">
+            <a:avLst/>
+          </a:prstGeom>
+        </p:spPr>
+      </p:pic>
+      <p:sp>
+        <p:nvSpPr>
+          <p:cNvPr id="5" name="Oval 4">
+            <a:extLst>
+              <a:ext uri="{FF2B5EF4-FFF2-40B4-BE49-F238E27FC236}">
+                <a16:creationId xmlns:a16="http://schemas.microsoft.com/office/drawing/2014/main" id="{A3AE4026-02B2-47CC-A4B5-9A07A2746536}"/>
+              </a:ext>
+            </a:extLst>
+          </p:cNvPr>
+          <p:cNvSpPr/>
+          <p:nvPr/>
+        </p:nvSpPr>
+        <p:spPr>
+          <a:xfrm>
+            <a:off x="11353800" y="2732050"/>
+            <a:ext cx="254620" cy="278780"/>
+          </a:xfrm>
+          <a:prstGeom prst="ellipse">
+            <a:avLst/>
+          </a:prstGeom>
+          <a:noFill/>
+          <a:ln w="76200">
+            <a:solidFill>
+              <a:srgbClr val="FF0000"/>
+            </a:solidFill>
+          </a:ln>
+        </p:spPr>
+        <p:style>
+          <a:lnRef idx="2">
+            <a:schemeClr val="accent1">
+              <a:shade val="50000"/>
+            </a:schemeClr>
+          </a:lnRef>
+          <a:fillRef idx="1">
+            <a:schemeClr val="accent1"/>
+          </a:fillRef>
+          <a:effectRef idx="0">
+            <a:schemeClr val="accent1"/>
+          </a:effectRef>
+          <a:fontRef idx="minor">
+            <a:schemeClr val="lt1"/>
+          </a:fontRef>
+        </p:style>
+        <p:txBody>
+          <a:bodyPr rtlCol="0" anchor="ctr"/>
+          <a:lstStyle/>
+          <a:p>
+            <a:pPr algn="ctr"/>
+            <a:endParaRPr lang="de-DE"/>
+          </a:p>
+        </p:txBody>
+      </p:sp>
+      <p:pic>
+        <p:nvPicPr>
+          <p:cNvPr id="6" name="Picture 5">
+            <a:extLst>
+              <a:ext uri="{FF2B5EF4-FFF2-40B4-BE49-F238E27FC236}">
+                <a16:creationId xmlns:a16="http://schemas.microsoft.com/office/drawing/2014/main" id="{EA862B0C-F239-4D9B-A8B5-A0A23240EB7A}"/>
+              </a:ext>
+            </a:extLst>
+          </p:cNvPr>
+          <p:cNvPicPr>
+            <a:picLocks noChangeAspect="1"/>
+          </p:cNvPicPr>
+          <p:nvPr/>
+        </p:nvPicPr>
+        <p:blipFill rotWithShape="1">
+          <a:blip r:embed="rId3"/>
+          <a:srcRect l="45079" t="46442"/>
+          <a:stretch/>
+        </p:blipFill>
+        <p:spPr>
+          <a:xfrm>
+            <a:off x="6096000" y="4282068"/>
+            <a:ext cx="3060703" cy="2331672"/>
+          </a:xfrm>
+          <a:prstGeom prst="rect">
+            <a:avLst/>
+          </a:prstGeom>
+        </p:spPr>
+      </p:pic>
+    </p:spTree>
+    <p:extLst>
+      <p:ext uri="{BB962C8B-B14F-4D97-AF65-F5344CB8AC3E}">
+        <p14:creationId xmlns:p14="http://schemas.microsoft.com/office/powerpoint/2010/main" val="3835119679"/>
       </p:ext>
     </p:extLst>
   </p:cSld>

</xml_diff>

<commit_message>
SubID and Map Orders
It gets the subject id as input and decides the map order accordingly.
It has the instructions.
</commit_message>
<xml_diff>
--- a/Route_Following/Explanations.pptx
+++ b/Route_Following/Explanations.pptx
@@ -22,6 +22,9 @@
     <p:sldId id="271" r:id="rId16"/>
     <p:sldId id="272" r:id="rId17"/>
     <p:sldId id="273" r:id="rId18"/>
+    <p:sldId id="274" r:id="rId19"/>
+    <p:sldId id="275" r:id="rId20"/>
+    <p:sldId id="276" r:id="rId21"/>
   </p:sldIdLst>
   <p:sldSz cx="12192000" cy="6858000"/>
   <p:notesSz cx="6858000" cy="9144000"/>
@@ -130,6 +133,76 @@
 
 <file path=ppt/changesInfos/changesInfo1.xml><?xml version="1.0" encoding="utf-8"?>
 <pc:chgInfo xmlns:a="http://schemas.openxmlformats.org/drawingml/2006/main" xmlns:r="http://schemas.openxmlformats.org/officeDocument/2006/relationships" xmlns:ac="http://schemas.microsoft.com/office/drawing/2013/main/command" xmlns:pc="http://schemas.microsoft.com/office/powerpoint/2013/main/command">
+  <pc:docChgLst>
+    <pc:chgData name="Hatice Dedetas" userId="0f1ed94a-1d65-4e39-8c1f-69d4ca4b7cee" providerId="ADAL" clId="{03FB35F1-D2C0-43F6-A878-68208269AD47}"/>
+    <pc:docChg chg="undo custSel addSld modSld">
+      <pc:chgData name="Hatice Dedetas" userId="0f1ed94a-1d65-4e39-8c1f-69d4ca4b7cee" providerId="ADAL" clId="{03FB35F1-D2C0-43F6-A878-68208269AD47}" dt="2023-08-21T12:51:29.874" v="1251" actId="20577"/>
+      <pc:docMkLst>
+        <pc:docMk/>
+      </pc:docMkLst>
+      <pc:sldChg chg="modSp add">
+        <pc:chgData name="Hatice Dedetas" userId="0f1ed94a-1d65-4e39-8c1f-69d4ca4b7cee" providerId="ADAL" clId="{03FB35F1-D2C0-43F6-A878-68208269AD47}" dt="2023-08-21T12:15:05.478" v="18" actId="20577"/>
+        <pc:sldMkLst>
+          <pc:docMk/>
+          <pc:sldMk cId="3793994553" sldId="274"/>
+        </pc:sldMkLst>
+        <pc:spChg chg="mod">
+          <ac:chgData name="Hatice Dedetas" userId="0f1ed94a-1d65-4e39-8c1f-69d4ca4b7cee" providerId="ADAL" clId="{03FB35F1-D2C0-43F6-A878-68208269AD47}" dt="2023-08-21T12:15:05.478" v="18" actId="20577"/>
+          <ac:spMkLst>
+            <pc:docMk/>
+            <pc:sldMk cId="3793994553" sldId="274"/>
+            <ac:spMk id="2" creationId="{4665C8CF-18FA-4F21-8E50-70CBBB143081}"/>
+          </ac:spMkLst>
+        </pc:spChg>
+      </pc:sldChg>
+      <pc:sldChg chg="modSp add">
+        <pc:chgData name="Hatice Dedetas" userId="0f1ed94a-1d65-4e39-8c1f-69d4ca4b7cee" providerId="ADAL" clId="{03FB35F1-D2C0-43F6-A878-68208269AD47}" dt="2023-08-21T12:18:53.319" v="633" actId="20577"/>
+        <pc:sldMkLst>
+          <pc:docMk/>
+          <pc:sldMk cId="2818166252" sldId="275"/>
+        </pc:sldMkLst>
+        <pc:spChg chg="mod">
+          <ac:chgData name="Hatice Dedetas" userId="0f1ed94a-1d65-4e39-8c1f-69d4ca4b7cee" providerId="ADAL" clId="{03FB35F1-D2C0-43F6-A878-68208269AD47}" dt="2023-08-21T12:15:48.211" v="102" actId="20577"/>
+          <ac:spMkLst>
+            <pc:docMk/>
+            <pc:sldMk cId="2818166252" sldId="275"/>
+            <ac:spMk id="2" creationId="{BD1454BC-EDDA-4C20-A5FA-76EB68E73204}"/>
+          </ac:spMkLst>
+        </pc:spChg>
+        <pc:spChg chg="mod">
+          <ac:chgData name="Hatice Dedetas" userId="0f1ed94a-1d65-4e39-8c1f-69d4ca4b7cee" providerId="ADAL" clId="{03FB35F1-D2C0-43F6-A878-68208269AD47}" dt="2023-08-21T12:18:53.319" v="633" actId="20577"/>
+          <ac:spMkLst>
+            <pc:docMk/>
+            <pc:sldMk cId="2818166252" sldId="275"/>
+            <ac:spMk id="3" creationId="{BD57164B-77E8-429A-994F-CC1004173B18}"/>
+          </ac:spMkLst>
+        </pc:spChg>
+      </pc:sldChg>
+      <pc:sldChg chg="modSp add">
+        <pc:chgData name="Hatice Dedetas" userId="0f1ed94a-1d65-4e39-8c1f-69d4ca4b7cee" providerId="ADAL" clId="{03FB35F1-D2C0-43F6-A878-68208269AD47}" dt="2023-08-21T12:51:29.874" v="1251" actId="20577"/>
+        <pc:sldMkLst>
+          <pc:docMk/>
+          <pc:sldMk cId="519959973" sldId="276"/>
+        </pc:sldMkLst>
+        <pc:spChg chg="mod">
+          <ac:chgData name="Hatice Dedetas" userId="0f1ed94a-1d65-4e39-8c1f-69d4ca4b7cee" providerId="ADAL" clId="{03FB35F1-D2C0-43F6-A878-68208269AD47}" dt="2023-08-21T12:51:29.874" v="1251" actId="20577"/>
+          <ac:spMkLst>
+            <pc:docMk/>
+            <pc:sldMk cId="519959973" sldId="276"/>
+            <ac:spMk id="2" creationId="{E6BED0F0-9D23-473A-B439-C120A2AE8EA6}"/>
+          </ac:spMkLst>
+        </pc:spChg>
+        <pc:spChg chg="mod">
+          <ac:chgData name="Hatice Dedetas" userId="0f1ed94a-1d65-4e39-8c1f-69d4ca4b7cee" providerId="ADAL" clId="{03FB35F1-D2C0-43F6-A878-68208269AD47}" dt="2023-08-21T12:51:21.153" v="1232" actId="27636"/>
+          <ac:spMkLst>
+            <pc:docMk/>
+            <pc:sldMk cId="519959973" sldId="276"/>
+            <ac:spMk id="3" creationId="{8F16E654-5141-4E8C-9156-1C0CB40715F4}"/>
+          </ac:spMkLst>
+        </pc:spChg>
+      </pc:sldChg>
+    </pc:docChg>
+  </pc:docChgLst>
   <pc:docChgLst>
     <pc:chgData name="Hatice Dedetas" userId="0f1ed94a-1d65-4e39-8c1f-69d4ca4b7cee" providerId="ADAL" clId="{39B2A147-5B08-4919-8EC3-FE551673579F}"/>
     <pc:docChg chg="undo custSel addSld delSld modSld sldOrd">
@@ -778,7 +851,7 @@
           <a:p>
             <a:fld id="{27A1BD6C-8E33-4C79-A2B2-98AAAC5F43E1}" type="datetimeFigureOut">
               <a:rPr lang="de-DE" smtClean="0"/>
-              <a:t>29.06.2023</a:t>
+              <a:t>21.08.2023</a:t>
             </a:fld>
             <a:endParaRPr lang="de-DE"/>
           </a:p>
@@ -978,7 +1051,7 @@
           <a:p>
             <a:fld id="{27A1BD6C-8E33-4C79-A2B2-98AAAC5F43E1}" type="datetimeFigureOut">
               <a:rPr lang="de-DE" smtClean="0"/>
-              <a:t>29.06.2023</a:t>
+              <a:t>21.08.2023</a:t>
             </a:fld>
             <a:endParaRPr lang="de-DE"/>
           </a:p>
@@ -1188,7 +1261,7 @@
           <a:p>
             <a:fld id="{27A1BD6C-8E33-4C79-A2B2-98AAAC5F43E1}" type="datetimeFigureOut">
               <a:rPr lang="de-DE" smtClean="0"/>
-              <a:t>29.06.2023</a:t>
+              <a:t>21.08.2023</a:t>
             </a:fld>
             <a:endParaRPr lang="de-DE"/>
           </a:p>
@@ -1388,7 +1461,7 @@
           <a:p>
             <a:fld id="{27A1BD6C-8E33-4C79-A2B2-98AAAC5F43E1}" type="datetimeFigureOut">
               <a:rPr lang="de-DE" smtClean="0"/>
-              <a:t>29.06.2023</a:t>
+              <a:t>21.08.2023</a:t>
             </a:fld>
             <a:endParaRPr lang="de-DE"/>
           </a:p>
@@ -1664,7 +1737,7 @@
           <a:p>
             <a:fld id="{27A1BD6C-8E33-4C79-A2B2-98AAAC5F43E1}" type="datetimeFigureOut">
               <a:rPr lang="de-DE" smtClean="0"/>
-              <a:t>29.06.2023</a:t>
+              <a:t>21.08.2023</a:t>
             </a:fld>
             <a:endParaRPr lang="de-DE"/>
           </a:p>
@@ -1932,7 +2005,7 @@
           <a:p>
             <a:fld id="{27A1BD6C-8E33-4C79-A2B2-98AAAC5F43E1}" type="datetimeFigureOut">
               <a:rPr lang="de-DE" smtClean="0"/>
-              <a:t>29.06.2023</a:t>
+              <a:t>21.08.2023</a:t>
             </a:fld>
             <a:endParaRPr lang="de-DE"/>
           </a:p>
@@ -2347,7 +2420,7 @@
           <a:p>
             <a:fld id="{27A1BD6C-8E33-4C79-A2B2-98AAAC5F43E1}" type="datetimeFigureOut">
               <a:rPr lang="de-DE" smtClean="0"/>
-              <a:t>29.06.2023</a:t>
+              <a:t>21.08.2023</a:t>
             </a:fld>
             <a:endParaRPr lang="de-DE"/>
           </a:p>
@@ -2489,7 +2562,7 @@
           <a:p>
             <a:fld id="{27A1BD6C-8E33-4C79-A2B2-98AAAC5F43E1}" type="datetimeFigureOut">
               <a:rPr lang="de-DE" smtClean="0"/>
-              <a:t>29.06.2023</a:t>
+              <a:t>21.08.2023</a:t>
             </a:fld>
             <a:endParaRPr lang="de-DE"/>
           </a:p>
@@ -2602,7 +2675,7 @@
           <a:p>
             <a:fld id="{27A1BD6C-8E33-4C79-A2B2-98AAAC5F43E1}" type="datetimeFigureOut">
               <a:rPr lang="de-DE" smtClean="0"/>
-              <a:t>29.06.2023</a:t>
+              <a:t>21.08.2023</a:t>
             </a:fld>
             <a:endParaRPr lang="de-DE"/>
           </a:p>
@@ -2915,7 +2988,7 @@
           <a:p>
             <a:fld id="{27A1BD6C-8E33-4C79-A2B2-98AAAC5F43E1}" type="datetimeFigureOut">
               <a:rPr lang="de-DE" smtClean="0"/>
-              <a:t>29.06.2023</a:t>
+              <a:t>21.08.2023</a:t>
             </a:fld>
             <a:endParaRPr lang="de-DE"/>
           </a:p>
@@ -3204,7 +3277,7 @@
           <a:p>
             <a:fld id="{27A1BD6C-8E33-4C79-A2B2-98AAAC5F43E1}" type="datetimeFigureOut">
               <a:rPr lang="de-DE" smtClean="0"/>
-              <a:t>29.06.2023</a:t>
+              <a:t>21.08.2023</a:t>
             </a:fld>
             <a:endParaRPr lang="de-DE"/>
           </a:p>
@@ -3447,7 +3520,7 @@
           <a:p>
             <a:fld id="{27A1BD6C-8E33-4C79-A2B2-98AAAC5F43E1}" type="datetimeFigureOut">
               <a:rPr lang="de-DE" smtClean="0"/>
-              <a:t>29.06.2023</a:t>
+              <a:t>21.08.2023</a:t>
             </a:fld>
             <a:endParaRPr lang="de-DE"/>
           </a:p>
@@ -7190,6 +7263,650 @@
 </p:sld>
 </file>
 
+<file path=ppt/slides/slide18.xml><?xml version="1.0" encoding="utf-8"?>
+<p:sld xmlns:a="http://schemas.openxmlformats.org/drawingml/2006/main" xmlns:r="http://schemas.openxmlformats.org/officeDocument/2006/relationships" xmlns:p="http://schemas.openxmlformats.org/presentationml/2006/main">
+  <p:cSld>
+    <p:spTree>
+      <p:nvGrpSpPr>
+        <p:cNvPr id="1" name=""/>
+        <p:cNvGrpSpPr/>
+        <p:nvPr/>
+      </p:nvGrpSpPr>
+      <p:grpSpPr>
+        <a:xfrm>
+          <a:off x="0" y="0"/>
+          <a:ext cx="0" cy="0"/>
+          <a:chOff x="0" y="0"/>
+          <a:chExt cx="0" cy="0"/>
+        </a:xfrm>
+      </p:grpSpPr>
+      <p:sp>
+        <p:nvSpPr>
+          <p:cNvPr id="2" name="Title 1">
+            <a:extLst>
+              <a:ext uri="{FF2B5EF4-FFF2-40B4-BE49-F238E27FC236}">
+                <a16:creationId xmlns:a16="http://schemas.microsoft.com/office/drawing/2014/main" id="{4665C8CF-18FA-4F21-8E50-70CBBB143081}"/>
+              </a:ext>
+            </a:extLst>
+          </p:cNvPr>
+          <p:cNvSpPr>
+            <a:spLocks noGrp="1"/>
+          </p:cNvSpPr>
+          <p:nvPr>
+            <p:ph type="ctrTitle"/>
+          </p:nvPr>
+        </p:nvSpPr>
+        <p:spPr/>
+        <p:txBody>
+          <a:bodyPr/>
+          <a:lstStyle/>
+          <a:p>
+            <a:r>
+              <a:rPr lang="de-DE" dirty="0" err="1"/>
+              <a:t>Get</a:t>
+            </a:r>
+            <a:r>
+              <a:rPr lang="de-DE" dirty="0"/>
+              <a:t> </a:t>
+            </a:r>
+            <a:r>
+              <a:rPr lang="de-DE" dirty="0" err="1"/>
+              <a:t>Subject</a:t>
+            </a:r>
+            <a:r>
+              <a:rPr lang="de-DE" dirty="0"/>
+              <a:t> ID</a:t>
+            </a:r>
+          </a:p>
+        </p:txBody>
+      </p:sp>
+      <p:sp>
+        <p:nvSpPr>
+          <p:cNvPr id="3" name="Subtitle 2">
+            <a:extLst>
+              <a:ext uri="{FF2B5EF4-FFF2-40B4-BE49-F238E27FC236}">
+                <a16:creationId xmlns:a16="http://schemas.microsoft.com/office/drawing/2014/main" id="{4901B3B2-DE50-467A-BB32-D282EF20ECD9}"/>
+              </a:ext>
+            </a:extLst>
+          </p:cNvPr>
+          <p:cNvSpPr>
+            <a:spLocks noGrp="1"/>
+          </p:cNvSpPr>
+          <p:nvPr>
+            <p:ph type="subTitle" idx="1"/>
+          </p:nvPr>
+        </p:nvSpPr>
+        <p:spPr/>
+        <p:txBody>
+          <a:bodyPr/>
+          <a:lstStyle/>
+          <a:p>
+            <a:endParaRPr lang="de-DE"/>
+          </a:p>
+        </p:txBody>
+      </p:sp>
+    </p:spTree>
+    <p:extLst>
+      <p:ext uri="{BB962C8B-B14F-4D97-AF65-F5344CB8AC3E}">
+        <p14:creationId xmlns:p14="http://schemas.microsoft.com/office/powerpoint/2010/main" val="3793994553"/>
+      </p:ext>
+    </p:extLst>
+  </p:cSld>
+  <p:clrMapOvr>
+    <a:masterClrMapping/>
+  </p:clrMapOvr>
+</p:sld>
+</file>
+
+<file path=ppt/slides/slide19.xml><?xml version="1.0" encoding="utf-8"?>
+<p:sld xmlns:a="http://schemas.openxmlformats.org/drawingml/2006/main" xmlns:r="http://schemas.openxmlformats.org/officeDocument/2006/relationships" xmlns:p="http://schemas.openxmlformats.org/presentationml/2006/main">
+  <p:cSld>
+    <p:spTree>
+      <p:nvGrpSpPr>
+        <p:cNvPr id="1" name=""/>
+        <p:cNvGrpSpPr/>
+        <p:nvPr/>
+      </p:nvGrpSpPr>
+      <p:grpSpPr>
+        <a:xfrm>
+          <a:off x="0" y="0"/>
+          <a:ext cx="0" cy="0"/>
+          <a:chOff x="0" y="0"/>
+          <a:chExt cx="0" cy="0"/>
+        </a:xfrm>
+      </p:grpSpPr>
+      <p:sp>
+        <p:nvSpPr>
+          <p:cNvPr id="2" name="Title 1">
+            <a:extLst>
+              <a:ext uri="{FF2B5EF4-FFF2-40B4-BE49-F238E27FC236}">
+                <a16:creationId xmlns:a16="http://schemas.microsoft.com/office/drawing/2014/main" id="{BD1454BC-EDDA-4C20-A5FA-76EB68E73204}"/>
+              </a:ext>
+            </a:extLst>
+          </p:cNvPr>
+          <p:cNvSpPr>
+            <a:spLocks noGrp="1"/>
+          </p:cNvSpPr>
+          <p:nvPr>
+            <p:ph type="title"/>
+          </p:nvPr>
+        </p:nvSpPr>
+        <p:spPr/>
+        <p:txBody>
+          <a:bodyPr/>
+          <a:lstStyle/>
+          <a:p>
+            <a:r>
+              <a:rPr lang="de-DE" dirty="0"/>
+              <a:t>Design a </a:t>
+            </a:r>
+            <a:r>
+              <a:rPr lang="de-DE" dirty="0" err="1"/>
+              <a:t>welcome</a:t>
+            </a:r>
+            <a:r>
+              <a:rPr lang="de-DE" dirty="0"/>
+              <a:t> screen </a:t>
+            </a:r>
+            <a:r>
+              <a:rPr lang="de-DE" dirty="0" err="1"/>
+              <a:t>scene</a:t>
+            </a:r>
+            <a:endParaRPr lang="de-DE" dirty="0"/>
+          </a:p>
+        </p:txBody>
+      </p:sp>
+      <p:sp>
+        <p:nvSpPr>
+          <p:cNvPr id="3" name="Content Placeholder 2">
+            <a:extLst>
+              <a:ext uri="{FF2B5EF4-FFF2-40B4-BE49-F238E27FC236}">
+                <a16:creationId xmlns:a16="http://schemas.microsoft.com/office/drawing/2014/main" id="{BD57164B-77E8-429A-994F-CC1004173B18}"/>
+              </a:ext>
+            </a:extLst>
+          </p:cNvPr>
+          <p:cNvSpPr>
+            <a:spLocks noGrp="1"/>
+          </p:cNvSpPr>
+          <p:nvPr>
+            <p:ph idx="1"/>
+          </p:nvPr>
+        </p:nvSpPr>
+        <p:spPr/>
+        <p:txBody>
+          <a:bodyPr/>
+          <a:lstStyle/>
+          <a:p>
+            <a:r>
+              <a:rPr lang="de-DE" dirty="0"/>
+              <a:t>I </a:t>
+            </a:r>
+            <a:r>
+              <a:rPr lang="de-DE" dirty="0" err="1"/>
+              <a:t>added</a:t>
+            </a:r>
+            <a:r>
+              <a:rPr lang="de-DE" dirty="0"/>
+              <a:t> an Input Field in </a:t>
+            </a:r>
+            <a:r>
+              <a:rPr lang="de-DE" dirty="0" err="1"/>
+              <a:t>the</a:t>
+            </a:r>
+            <a:r>
+              <a:rPr lang="de-DE" dirty="0"/>
+              <a:t> Welcome Screen Scene</a:t>
+            </a:r>
+          </a:p>
+          <a:p>
+            <a:r>
+              <a:rPr lang="de-DE" dirty="0"/>
+              <a:t>I </a:t>
+            </a:r>
+            <a:r>
+              <a:rPr lang="de-DE" dirty="0" err="1"/>
+              <a:t>added</a:t>
+            </a:r>
+            <a:r>
+              <a:rPr lang="de-DE" dirty="0"/>
+              <a:t> </a:t>
+            </a:r>
+            <a:r>
+              <a:rPr lang="de-DE" dirty="0" err="1"/>
+              <a:t>Participant</a:t>
+            </a:r>
+            <a:r>
+              <a:rPr lang="de-DE" dirty="0"/>
+              <a:t> </a:t>
+            </a:r>
+            <a:r>
+              <a:rPr lang="de-DE" dirty="0" err="1"/>
+              <a:t>number</a:t>
+            </a:r>
+            <a:r>
+              <a:rPr lang="de-DE" dirty="0"/>
+              <a:t> </a:t>
+            </a:r>
+            <a:r>
+              <a:rPr lang="de-DE" dirty="0" err="1"/>
+              <a:t>text</a:t>
+            </a:r>
+            <a:r>
+              <a:rPr lang="de-DE" dirty="0"/>
+              <a:t>.</a:t>
+            </a:r>
+          </a:p>
+          <a:p>
+            <a:r>
+              <a:rPr lang="de-DE" dirty="0"/>
+              <a:t>I </a:t>
+            </a:r>
+            <a:r>
+              <a:rPr lang="de-DE" dirty="0" err="1"/>
+              <a:t>created</a:t>
+            </a:r>
+            <a:r>
+              <a:rPr lang="de-DE" dirty="0"/>
+              <a:t> a </a:t>
+            </a:r>
+            <a:r>
+              <a:rPr lang="de-DE" dirty="0" err="1"/>
+              <a:t>script</a:t>
+            </a:r>
+            <a:r>
+              <a:rPr lang="de-DE" dirty="0"/>
+              <a:t> </a:t>
+            </a:r>
+            <a:r>
+              <a:rPr lang="de-DE" dirty="0" err="1"/>
+              <a:t>called</a:t>
+            </a:r>
+            <a:r>
+              <a:rPr lang="de-DE" dirty="0"/>
+              <a:t> </a:t>
+            </a:r>
+            <a:r>
+              <a:rPr lang="de-DE" dirty="0" err="1"/>
+              <a:t>GetSubID</a:t>
+            </a:r>
+            <a:endParaRPr lang="de-DE" dirty="0"/>
+          </a:p>
+          <a:p>
+            <a:r>
+              <a:rPr lang="de-DE" dirty="0"/>
+              <a:t>In </a:t>
+            </a:r>
+            <a:r>
+              <a:rPr lang="de-DE" dirty="0" err="1"/>
+              <a:t>that</a:t>
+            </a:r>
+            <a:r>
+              <a:rPr lang="de-DE" dirty="0"/>
+              <a:t> </a:t>
+            </a:r>
+            <a:r>
+              <a:rPr lang="de-DE" dirty="0" err="1"/>
+              <a:t>script</a:t>
+            </a:r>
+            <a:r>
+              <a:rPr lang="de-DE" dirty="0"/>
+              <a:t> I </a:t>
+            </a:r>
+            <a:r>
+              <a:rPr lang="de-DE" dirty="0" err="1"/>
+              <a:t>created</a:t>
+            </a:r>
+            <a:r>
+              <a:rPr lang="de-DE" dirty="0"/>
+              <a:t> a </a:t>
+            </a:r>
+            <a:r>
+              <a:rPr lang="de-DE" dirty="0" err="1"/>
+              <a:t>function</a:t>
+            </a:r>
+            <a:r>
+              <a:rPr lang="de-DE" dirty="0"/>
+              <a:t> </a:t>
+            </a:r>
+            <a:r>
+              <a:rPr lang="de-DE" dirty="0" err="1"/>
+              <a:t>called</a:t>
+            </a:r>
+            <a:r>
+              <a:rPr lang="de-DE" dirty="0"/>
+              <a:t> </a:t>
+            </a:r>
+            <a:r>
+              <a:rPr lang="de-DE" dirty="0" err="1"/>
+              <a:t>ReadSubID</a:t>
+            </a:r>
+            <a:endParaRPr lang="de-DE" dirty="0"/>
+          </a:p>
+          <a:p>
+            <a:r>
+              <a:rPr lang="de-DE" dirty="0"/>
+              <a:t>This </a:t>
+            </a:r>
+            <a:r>
+              <a:rPr lang="de-DE" dirty="0" err="1"/>
+              <a:t>function</a:t>
+            </a:r>
+            <a:r>
+              <a:rPr lang="de-DE" dirty="0"/>
+              <a:t> </a:t>
+            </a:r>
+            <a:r>
+              <a:rPr lang="de-DE" dirty="0" err="1"/>
+              <a:t>gets</a:t>
+            </a:r>
+            <a:r>
+              <a:rPr lang="de-DE" dirty="0"/>
+              <a:t> </a:t>
+            </a:r>
+            <a:r>
+              <a:rPr lang="de-DE" dirty="0" err="1"/>
+              <a:t>the</a:t>
+            </a:r>
+            <a:r>
+              <a:rPr lang="de-DE" dirty="0"/>
+              <a:t> </a:t>
+            </a:r>
+            <a:r>
+              <a:rPr lang="de-DE" dirty="0" err="1"/>
+              <a:t>entered</a:t>
+            </a:r>
+            <a:r>
+              <a:rPr lang="de-DE" dirty="0"/>
+              <a:t> </a:t>
+            </a:r>
+            <a:r>
+              <a:rPr lang="de-DE" dirty="0" err="1"/>
+              <a:t>string</a:t>
+            </a:r>
+            <a:r>
+              <a:rPr lang="de-DE" dirty="0"/>
+              <a:t> and </a:t>
+            </a:r>
+            <a:r>
+              <a:rPr lang="de-DE" dirty="0" err="1"/>
+              <a:t>assigns</a:t>
+            </a:r>
+            <a:r>
+              <a:rPr lang="de-DE" dirty="0"/>
+              <a:t> </a:t>
+            </a:r>
+            <a:r>
+              <a:rPr lang="de-DE" dirty="0" err="1"/>
+              <a:t>it</a:t>
+            </a:r>
+            <a:r>
+              <a:rPr lang="de-DE" dirty="0"/>
+              <a:t> </a:t>
+            </a:r>
+            <a:r>
+              <a:rPr lang="de-DE" dirty="0" err="1"/>
+              <a:t>to</a:t>
+            </a:r>
+            <a:r>
+              <a:rPr lang="de-DE" dirty="0"/>
+              <a:t> a variable.</a:t>
+            </a:r>
+          </a:p>
+          <a:p>
+            <a:r>
+              <a:rPr lang="de-DE" dirty="0" err="1"/>
+              <a:t>Then</a:t>
+            </a:r>
+            <a:r>
+              <a:rPr lang="de-DE" dirty="0"/>
+              <a:t>, I </a:t>
+            </a:r>
+            <a:r>
+              <a:rPr lang="de-DE" dirty="0" err="1"/>
+              <a:t>added</a:t>
+            </a:r>
+            <a:r>
+              <a:rPr lang="de-DE" dirty="0"/>
+              <a:t> </a:t>
+            </a:r>
+            <a:r>
+              <a:rPr lang="de-DE" dirty="0" err="1"/>
+              <a:t>this</a:t>
+            </a:r>
+            <a:r>
+              <a:rPr lang="de-DE" dirty="0"/>
+              <a:t> </a:t>
+            </a:r>
+            <a:r>
+              <a:rPr lang="de-DE" dirty="0" err="1"/>
+              <a:t>script</a:t>
+            </a:r>
+            <a:r>
+              <a:rPr lang="de-DE" dirty="0"/>
+              <a:t> </a:t>
+            </a:r>
+            <a:r>
+              <a:rPr lang="de-DE" dirty="0" err="1"/>
+              <a:t>to</a:t>
+            </a:r>
+            <a:r>
+              <a:rPr lang="de-DE" dirty="0"/>
+              <a:t> a </a:t>
+            </a:r>
+            <a:r>
+              <a:rPr lang="de-DE" dirty="0" err="1"/>
+              <a:t>GameObject</a:t>
+            </a:r>
+            <a:r>
+              <a:rPr lang="de-DE" dirty="0"/>
+              <a:t> in </a:t>
+            </a:r>
+            <a:r>
+              <a:rPr lang="de-DE" dirty="0" err="1"/>
+              <a:t>the</a:t>
+            </a:r>
+            <a:r>
+              <a:rPr lang="de-DE" dirty="0"/>
+              <a:t> Scene</a:t>
+            </a:r>
+          </a:p>
+          <a:p>
+            <a:pPr lvl="1"/>
+            <a:r>
+              <a:rPr lang="de-DE" dirty="0"/>
+              <a:t>I </a:t>
+            </a:r>
+            <a:r>
+              <a:rPr lang="de-DE" dirty="0" err="1"/>
+              <a:t>added</a:t>
+            </a:r>
+            <a:r>
+              <a:rPr lang="de-DE" dirty="0"/>
+              <a:t> </a:t>
+            </a:r>
+            <a:r>
+              <a:rPr lang="de-DE" dirty="0" err="1"/>
+              <a:t>it</a:t>
+            </a:r>
+            <a:r>
+              <a:rPr lang="de-DE" dirty="0"/>
+              <a:t> </a:t>
+            </a:r>
+            <a:r>
+              <a:rPr lang="de-DE" dirty="0" err="1"/>
+              <a:t>to</a:t>
+            </a:r>
+            <a:r>
+              <a:rPr lang="de-DE" dirty="0"/>
+              <a:t> </a:t>
+            </a:r>
+            <a:r>
+              <a:rPr lang="de-DE" dirty="0" err="1"/>
+              <a:t>the</a:t>
+            </a:r>
+            <a:r>
+              <a:rPr lang="de-DE" dirty="0"/>
+              <a:t> </a:t>
+            </a:r>
+            <a:r>
+              <a:rPr lang="de-DE" dirty="0" err="1"/>
+              <a:t>ParticipantNumber</a:t>
+            </a:r>
+            <a:r>
+              <a:rPr lang="de-DE" dirty="0"/>
+              <a:t> </a:t>
+            </a:r>
+            <a:r>
+              <a:rPr lang="de-DE" dirty="0" err="1"/>
+              <a:t>text</a:t>
+            </a:r>
+            <a:r>
+              <a:rPr lang="de-DE" dirty="0"/>
+              <a:t> </a:t>
+            </a:r>
+            <a:r>
+              <a:rPr lang="de-DE" dirty="0" err="1"/>
+              <a:t>object</a:t>
+            </a:r>
+            <a:endParaRPr lang="de-DE" dirty="0"/>
+          </a:p>
+          <a:p>
+            <a:r>
+              <a:rPr lang="de-DE" dirty="0" err="1"/>
+              <a:t>Then</a:t>
+            </a:r>
+            <a:r>
+              <a:rPr lang="de-DE" dirty="0"/>
+              <a:t>, in </a:t>
+            </a:r>
+            <a:r>
+              <a:rPr lang="de-DE" dirty="0" err="1"/>
+              <a:t>the</a:t>
+            </a:r>
+            <a:r>
+              <a:rPr lang="de-DE" dirty="0"/>
+              <a:t> </a:t>
+            </a:r>
+            <a:r>
+              <a:rPr lang="de-DE" dirty="0" err="1"/>
+              <a:t>InputField</a:t>
+            </a:r>
+            <a:r>
+              <a:rPr lang="de-DE" dirty="0"/>
+              <a:t>, at </a:t>
+            </a:r>
+            <a:r>
+              <a:rPr lang="de-DE" dirty="0" err="1"/>
+              <a:t>the</a:t>
+            </a:r>
+            <a:r>
+              <a:rPr lang="de-DE" dirty="0"/>
+              <a:t> </a:t>
+            </a:r>
+            <a:r>
+              <a:rPr lang="de-DE" dirty="0" err="1"/>
+              <a:t>OnEndEdit</a:t>
+            </a:r>
+            <a:r>
+              <a:rPr lang="de-DE" dirty="0"/>
+              <a:t>(String) </a:t>
+            </a:r>
+            <a:r>
+              <a:rPr lang="de-DE" dirty="0" err="1"/>
+              <a:t>filed</a:t>
+            </a:r>
+            <a:r>
+              <a:rPr lang="de-DE" dirty="0"/>
+              <a:t>, I </a:t>
+            </a:r>
+            <a:r>
+              <a:rPr lang="de-DE" dirty="0" err="1"/>
+              <a:t>added</a:t>
+            </a:r>
+            <a:r>
+              <a:rPr lang="de-DE" dirty="0"/>
+              <a:t> </a:t>
+            </a:r>
+            <a:r>
+              <a:rPr lang="de-DE" dirty="0" err="1"/>
+              <a:t>Participant</a:t>
+            </a:r>
+            <a:r>
+              <a:rPr lang="de-DE" dirty="0"/>
+              <a:t> </a:t>
+            </a:r>
+            <a:r>
+              <a:rPr lang="de-DE" dirty="0" err="1"/>
+              <a:t>Number</a:t>
+            </a:r>
+            <a:r>
+              <a:rPr lang="de-DE" dirty="0"/>
+              <a:t> </a:t>
+            </a:r>
+            <a:r>
+              <a:rPr lang="de-DE" dirty="0" err="1"/>
+              <a:t>text</a:t>
+            </a:r>
+            <a:r>
+              <a:rPr lang="de-DE" dirty="0"/>
+              <a:t> </a:t>
+            </a:r>
+            <a:r>
+              <a:rPr lang="de-DE" dirty="0" err="1"/>
+              <a:t>object</a:t>
+            </a:r>
+            <a:r>
+              <a:rPr lang="de-DE" dirty="0"/>
+              <a:t> and </a:t>
+            </a:r>
+            <a:r>
+              <a:rPr lang="de-DE" dirty="0" err="1"/>
+              <a:t>selected</a:t>
+            </a:r>
+            <a:r>
+              <a:rPr lang="de-DE" dirty="0"/>
+              <a:t> </a:t>
+            </a:r>
+            <a:r>
+              <a:rPr lang="de-DE" dirty="0" err="1"/>
+              <a:t>the</a:t>
+            </a:r>
+            <a:r>
+              <a:rPr lang="de-DE" dirty="0"/>
+              <a:t> </a:t>
+            </a:r>
+            <a:r>
+              <a:rPr lang="de-DE" dirty="0" err="1"/>
+              <a:t>function</a:t>
+            </a:r>
+            <a:r>
+              <a:rPr lang="de-DE" dirty="0"/>
+              <a:t> I </a:t>
+            </a:r>
+            <a:r>
+              <a:rPr lang="de-DE" dirty="0" err="1"/>
+              <a:t>created</a:t>
+            </a:r>
+            <a:r>
+              <a:rPr lang="de-DE" dirty="0"/>
+              <a:t>.</a:t>
+            </a:r>
+          </a:p>
+        </p:txBody>
+      </p:sp>
+    </p:spTree>
+    <p:extLst>
+      <p:ext uri="{BB962C8B-B14F-4D97-AF65-F5344CB8AC3E}">
+        <p14:creationId xmlns:p14="http://schemas.microsoft.com/office/powerpoint/2010/main" val="2818166252"/>
+      </p:ext>
+    </p:extLst>
+  </p:cSld>
+  <p:clrMapOvr>
+    <a:masterClrMapping/>
+  </p:clrMapOvr>
+</p:sld>
+</file>
+
 <file path=ppt/slides/slide2.xml><?xml version="1.0" encoding="utf-8"?>
 <p:sld xmlns:a="http://schemas.openxmlformats.org/drawingml/2006/main" xmlns:r="http://schemas.openxmlformats.org/officeDocument/2006/relationships" xmlns:p="http://schemas.openxmlformats.org/presentationml/2006/main">
   <p:cSld>
@@ -7399,6 +8116,600 @@
     <p:extLst>
       <p:ext uri="{BB962C8B-B14F-4D97-AF65-F5344CB8AC3E}">
         <p14:creationId xmlns:p14="http://schemas.microsoft.com/office/powerpoint/2010/main" val="3673787184"/>
+      </p:ext>
+    </p:extLst>
+  </p:cSld>
+  <p:clrMapOvr>
+    <a:masterClrMapping/>
+  </p:clrMapOvr>
+</p:sld>
+</file>
+
+<file path=ppt/slides/slide20.xml><?xml version="1.0" encoding="utf-8"?>
+<p:sld xmlns:a="http://schemas.openxmlformats.org/drawingml/2006/main" xmlns:r="http://schemas.openxmlformats.org/officeDocument/2006/relationships" xmlns:p="http://schemas.openxmlformats.org/presentationml/2006/main">
+  <p:cSld>
+    <p:spTree>
+      <p:nvGrpSpPr>
+        <p:cNvPr id="1" name=""/>
+        <p:cNvGrpSpPr/>
+        <p:nvPr/>
+      </p:nvGrpSpPr>
+      <p:grpSpPr>
+        <a:xfrm>
+          <a:off x="0" y="0"/>
+          <a:ext cx="0" cy="0"/>
+          <a:chOff x="0" y="0"/>
+          <a:chExt cx="0" cy="0"/>
+        </a:xfrm>
+      </p:grpSpPr>
+      <p:sp>
+        <p:nvSpPr>
+          <p:cNvPr id="2" name="Title 1">
+            <a:extLst>
+              <a:ext uri="{FF2B5EF4-FFF2-40B4-BE49-F238E27FC236}">
+                <a16:creationId xmlns:a16="http://schemas.microsoft.com/office/drawing/2014/main" id="{E6BED0F0-9D23-473A-B439-C120A2AE8EA6}"/>
+              </a:ext>
+            </a:extLst>
+          </p:cNvPr>
+          <p:cNvSpPr>
+            <a:spLocks noGrp="1"/>
+          </p:cNvSpPr>
+          <p:nvPr>
+            <p:ph type="title"/>
+          </p:nvPr>
+        </p:nvSpPr>
+        <p:spPr/>
+        <p:txBody>
+          <a:bodyPr/>
+          <a:lstStyle/>
+          <a:p>
+            <a:r>
+              <a:rPr lang="de-DE" dirty="0"/>
+              <a:t>Send </a:t>
+            </a:r>
+            <a:r>
+              <a:rPr lang="de-DE" dirty="0" err="1"/>
+              <a:t>SubID</a:t>
+            </a:r>
+            <a:r>
+              <a:rPr lang="de-DE" dirty="0"/>
+              <a:t> and </a:t>
+            </a:r>
+            <a:r>
+              <a:rPr lang="de-DE" dirty="0" err="1"/>
+              <a:t>TimeInfo</a:t>
+            </a:r>
+            <a:r>
+              <a:rPr lang="de-DE" dirty="0"/>
+              <a:t> </a:t>
+            </a:r>
+            <a:r>
+              <a:rPr lang="de-DE" dirty="0" err="1"/>
+              <a:t>to</a:t>
+            </a:r>
+            <a:r>
+              <a:rPr lang="de-DE" dirty="0"/>
+              <a:t> </a:t>
+            </a:r>
+            <a:r>
+              <a:rPr lang="de-DE" dirty="0" err="1"/>
+              <a:t>PlayerMovement</a:t>
+            </a:r>
+            <a:endParaRPr lang="de-DE" dirty="0"/>
+          </a:p>
+        </p:txBody>
+      </p:sp>
+      <p:sp>
+        <p:nvSpPr>
+          <p:cNvPr id="3" name="Content Placeholder 2">
+            <a:extLst>
+              <a:ext uri="{FF2B5EF4-FFF2-40B4-BE49-F238E27FC236}">
+                <a16:creationId xmlns:a16="http://schemas.microsoft.com/office/drawing/2014/main" id="{8F16E654-5141-4E8C-9156-1C0CB40715F4}"/>
+              </a:ext>
+            </a:extLst>
+          </p:cNvPr>
+          <p:cNvSpPr>
+            <a:spLocks noGrp="1"/>
+          </p:cNvSpPr>
+          <p:nvPr>
+            <p:ph idx="1"/>
+          </p:nvPr>
+        </p:nvSpPr>
+        <p:spPr>
+          <a:xfrm>
+            <a:off x="838200" y="1825624"/>
+            <a:ext cx="10515600" cy="4541721"/>
+          </a:xfrm>
+        </p:spPr>
+        <p:txBody>
+          <a:bodyPr>
+            <a:normAutofit lnSpcReduction="10000"/>
+          </a:bodyPr>
+          <a:lstStyle/>
+          <a:p>
+            <a:r>
+              <a:rPr lang="de-DE" dirty="0"/>
+              <a:t>In </a:t>
+            </a:r>
+            <a:r>
+              <a:rPr lang="de-DE" dirty="0" err="1"/>
+              <a:t>the</a:t>
+            </a:r>
+            <a:r>
+              <a:rPr lang="de-DE" dirty="0"/>
+              <a:t> </a:t>
+            </a:r>
+            <a:r>
+              <a:rPr lang="de-DE" dirty="0" err="1"/>
+              <a:t>playerMovement</a:t>
+            </a:r>
+            <a:r>
+              <a:rPr lang="de-DE" dirty="0"/>
+              <a:t> </a:t>
+            </a:r>
+            <a:r>
+              <a:rPr lang="de-DE" dirty="0" err="1"/>
+              <a:t>sctipt</a:t>
+            </a:r>
+            <a:r>
+              <a:rPr lang="de-DE" dirty="0"/>
+              <a:t> I </a:t>
+            </a:r>
+            <a:r>
+              <a:rPr lang="de-DE" dirty="0" err="1"/>
+              <a:t>declared</a:t>
+            </a:r>
+            <a:r>
+              <a:rPr lang="de-DE" dirty="0"/>
+              <a:t> a </a:t>
+            </a:r>
+            <a:r>
+              <a:rPr lang="de-DE" dirty="0" err="1"/>
+              <a:t>static</a:t>
+            </a:r>
+            <a:r>
+              <a:rPr lang="de-DE" dirty="0"/>
+              <a:t> </a:t>
+            </a:r>
+            <a:r>
+              <a:rPr lang="de-DE" dirty="0" err="1"/>
+              <a:t>string</a:t>
+            </a:r>
+            <a:r>
+              <a:rPr lang="de-DE" dirty="0"/>
+              <a:t> </a:t>
+            </a:r>
+            <a:r>
+              <a:rPr lang="de-DE" dirty="0" err="1"/>
+              <a:t>to</a:t>
+            </a:r>
+            <a:r>
+              <a:rPr lang="de-DE" dirty="0"/>
+              <a:t> </a:t>
+            </a:r>
+            <a:r>
+              <a:rPr lang="de-DE" dirty="0" err="1"/>
+              <a:t>call</a:t>
+            </a:r>
+            <a:r>
+              <a:rPr lang="de-DE" dirty="0"/>
+              <a:t> </a:t>
+            </a:r>
+            <a:r>
+              <a:rPr lang="de-DE" dirty="0" err="1"/>
+              <a:t>them</a:t>
+            </a:r>
+            <a:r>
+              <a:rPr lang="de-DE" dirty="0"/>
+              <a:t> in </a:t>
+            </a:r>
+            <a:r>
+              <a:rPr lang="de-DE" dirty="0" err="1"/>
+              <a:t>other</a:t>
+            </a:r>
+            <a:r>
+              <a:rPr lang="de-DE" dirty="0"/>
+              <a:t> </a:t>
+            </a:r>
+            <a:r>
+              <a:rPr lang="de-DE" dirty="0" err="1"/>
+              <a:t>scripts</a:t>
+            </a:r>
+            <a:endParaRPr lang="de-DE" dirty="0"/>
+          </a:p>
+          <a:p>
+            <a:pPr lvl="1"/>
+            <a:r>
+              <a:rPr lang="de-DE" dirty="0" err="1"/>
+              <a:t>public</a:t>
+            </a:r>
+            <a:r>
+              <a:rPr lang="de-DE" dirty="0"/>
+              <a:t> </a:t>
+            </a:r>
+            <a:r>
+              <a:rPr lang="de-DE" dirty="0" err="1"/>
+              <a:t>static</a:t>
+            </a:r>
+            <a:r>
+              <a:rPr lang="de-DE" dirty="0"/>
+              <a:t> </a:t>
+            </a:r>
+            <a:r>
+              <a:rPr lang="de-DE" dirty="0" err="1"/>
+              <a:t>string</a:t>
+            </a:r>
+            <a:r>
+              <a:rPr lang="de-DE" dirty="0"/>
+              <a:t> </a:t>
+            </a:r>
+            <a:r>
+              <a:rPr lang="de-DE" dirty="0" err="1"/>
+              <a:t>SubID</a:t>
+            </a:r>
+            <a:r>
+              <a:rPr lang="de-DE" dirty="0"/>
+              <a:t>; </a:t>
+            </a:r>
+          </a:p>
+          <a:p>
+            <a:r>
+              <a:rPr lang="de-DE" dirty="0"/>
+              <a:t>In </a:t>
+            </a:r>
+            <a:r>
+              <a:rPr lang="de-DE" dirty="0" err="1"/>
+              <a:t>the</a:t>
+            </a:r>
+            <a:r>
+              <a:rPr lang="de-DE" dirty="0"/>
+              <a:t> </a:t>
+            </a:r>
+            <a:r>
+              <a:rPr lang="de-DE" dirty="0" err="1"/>
+              <a:t>GetSubID</a:t>
+            </a:r>
+            <a:r>
+              <a:rPr lang="de-DE" dirty="0"/>
+              <a:t> </a:t>
+            </a:r>
+            <a:r>
+              <a:rPr lang="de-DE" dirty="0" err="1"/>
+              <a:t>script</a:t>
+            </a:r>
+            <a:r>
+              <a:rPr lang="de-DE" dirty="0"/>
+              <a:t>, </a:t>
+            </a:r>
+            <a:r>
+              <a:rPr lang="de-DE" dirty="0" err="1"/>
+              <a:t>the</a:t>
+            </a:r>
+            <a:r>
+              <a:rPr lang="de-DE" dirty="0"/>
+              <a:t> </a:t>
+            </a:r>
+            <a:r>
+              <a:rPr lang="de-DE" dirty="0" err="1"/>
+              <a:t>function</a:t>
+            </a:r>
+            <a:r>
+              <a:rPr lang="de-DE" dirty="0"/>
+              <a:t> </a:t>
+            </a:r>
+            <a:r>
+              <a:rPr lang="de-DE" dirty="0" err="1"/>
+              <a:t>gets</a:t>
+            </a:r>
+            <a:r>
+              <a:rPr lang="de-DE" dirty="0"/>
+              <a:t> </a:t>
+            </a:r>
+            <a:r>
+              <a:rPr lang="de-DE" dirty="0" err="1"/>
+              <a:t>the</a:t>
+            </a:r>
+            <a:r>
+              <a:rPr lang="de-DE" dirty="0"/>
+              <a:t> </a:t>
+            </a:r>
+            <a:r>
+              <a:rPr lang="de-DE" dirty="0" err="1"/>
+              <a:t>input</a:t>
+            </a:r>
+            <a:r>
+              <a:rPr lang="de-DE" dirty="0"/>
+              <a:t> and </a:t>
+            </a:r>
+            <a:r>
+              <a:rPr lang="de-DE" dirty="0" err="1"/>
+              <a:t>assing</a:t>
+            </a:r>
+            <a:r>
+              <a:rPr lang="de-DE" dirty="0"/>
+              <a:t> </a:t>
+            </a:r>
+            <a:r>
+              <a:rPr lang="de-DE" dirty="0" err="1"/>
+              <a:t>it</a:t>
+            </a:r>
+            <a:r>
+              <a:rPr lang="de-DE" dirty="0"/>
+              <a:t> </a:t>
+            </a:r>
+            <a:r>
+              <a:rPr lang="de-DE" dirty="0" err="1"/>
+              <a:t>to</a:t>
+            </a:r>
+            <a:r>
+              <a:rPr lang="de-DE" dirty="0"/>
+              <a:t> </a:t>
+            </a:r>
+            <a:r>
+              <a:rPr lang="de-DE" dirty="0" err="1"/>
+              <a:t>SubID</a:t>
+            </a:r>
+            <a:endParaRPr lang="de-DE" dirty="0"/>
+          </a:p>
+          <a:p>
+            <a:pPr lvl="1"/>
+            <a:r>
+              <a:rPr lang="en-US" dirty="0"/>
+              <a:t>public void </a:t>
+            </a:r>
+            <a:r>
+              <a:rPr lang="en-US" dirty="0" err="1"/>
+              <a:t>ReadSubID</a:t>
+            </a:r>
+            <a:r>
+              <a:rPr lang="en-US" dirty="0"/>
+              <a:t>(string s)</a:t>
+            </a:r>
+          </a:p>
+          <a:p>
+            <a:pPr lvl="1"/>
+            <a:r>
+              <a:rPr lang="en-US" dirty="0"/>
+              <a:t>    {  </a:t>
+            </a:r>
+            <a:r>
+              <a:rPr lang="en-US" dirty="0" err="1"/>
+              <a:t>PlayerMovement.SubID</a:t>
+            </a:r>
+            <a:r>
+              <a:rPr lang="en-US" dirty="0"/>
+              <a:t> = s;  }</a:t>
+            </a:r>
+          </a:p>
+          <a:p>
+            <a:r>
+              <a:rPr lang="en-US" dirty="0"/>
+              <a:t>In </a:t>
+            </a:r>
+            <a:r>
+              <a:rPr lang="en-US" dirty="0" err="1"/>
+              <a:t>GetSubID</a:t>
+            </a:r>
+            <a:r>
+              <a:rPr lang="en-US" dirty="0"/>
+              <a:t> </a:t>
+            </a:r>
+            <a:r>
+              <a:rPr lang="en-US" dirty="0" err="1"/>
+              <a:t>sctipt</a:t>
+            </a:r>
+            <a:r>
+              <a:rPr lang="en-US" dirty="0"/>
+              <a:t>, I </a:t>
+            </a:r>
+            <a:r>
+              <a:rPr lang="en-US" dirty="0" err="1"/>
+              <a:t>collec</a:t>
+            </a:r>
+            <a:r>
+              <a:rPr lang="en-US" dirty="0"/>
+              <a:t> the time information to add the data file name.</a:t>
+            </a:r>
+          </a:p>
+          <a:p>
+            <a:pPr lvl="1"/>
+            <a:r>
+              <a:rPr lang="en-US" dirty="0"/>
+              <a:t>I created a </a:t>
+            </a:r>
+            <a:r>
+              <a:rPr lang="de-DE" dirty="0" err="1"/>
+              <a:t>public</a:t>
+            </a:r>
+            <a:r>
+              <a:rPr lang="de-DE" dirty="0"/>
+              <a:t> </a:t>
+            </a:r>
+            <a:r>
+              <a:rPr lang="de-DE" dirty="0" err="1"/>
+              <a:t>static</a:t>
+            </a:r>
+            <a:r>
+              <a:rPr lang="de-DE" dirty="0"/>
+              <a:t> </a:t>
+            </a:r>
+            <a:r>
+              <a:rPr lang="de-DE" dirty="0" err="1"/>
+              <a:t>string</a:t>
+            </a:r>
+            <a:r>
+              <a:rPr lang="de-DE" dirty="0"/>
+              <a:t> </a:t>
+            </a:r>
+            <a:r>
+              <a:rPr lang="de-DE" dirty="0" err="1"/>
+              <a:t>exptime</a:t>
+            </a:r>
+            <a:r>
+              <a:rPr lang="de-DE" dirty="0"/>
+              <a:t> and I </a:t>
+            </a:r>
+            <a:r>
+              <a:rPr lang="de-DE" dirty="0" err="1"/>
+              <a:t>assigned</a:t>
+            </a:r>
+            <a:r>
+              <a:rPr lang="de-DE" dirty="0"/>
+              <a:t> </a:t>
+            </a:r>
+            <a:r>
+              <a:rPr lang="de-DE" dirty="0" err="1"/>
+              <a:t>the</a:t>
+            </a:r>
+            <a:r>
+              <a:rPr lang="de-DE" dirty="0"/>
+              <a:t> </a:t>
+            </a:r>
+            <a:r>
+              <a:rPr lang="de-DE" dirty="0" err="1"/>
+              <a:t>value</a:t>
+            </a:r>
+            <a:r>
+              <a:rPr lang="de-DE" dirty="0"/>
+              <a:t> in </a:t>
+            </a:r>
+            <a:r>
+              <a:rPr lang="de-DE" dirty="0" err="1"/>
+              <a:t>that</a:t>
+            </a:r>
+            <a:r>
+              <a:rPr lang="de-DE" dirty="0"/>
+              <a:t> </a:t>
+            </a:r>
+            <a:r>
+              <a:rPr lang="de-DE" dirty="0" err="1"/>
+              <a:t>script</a:t>
+            </a:r>
+            <a:r>
+              <a:rPr lang="de-DE" dirty="0"/>
+              <a:t>.</a:t>
+            </a:r>
+          </a:p>
+          <a:p>
+            <a:pPr lvl="1"/>
+            <a:r>
+              <a:rPr lang="de-DE" dirty="0" err="1"/>
+              <a:t>Then</a:t>
+            </a:r>
+            <a:r>
+              <a:rPr lang="de-DE" dirty="0"/>
+              <a:t>, I </a:t>
+            </a:r>
+            <a:r>
+              <a:rPr lang="de-DE" dirty="0" err="1"/>
+              <a:t>named</a:t>
+            </a:r>
+            <a:r>
+              <a:rPr lang="de-DE" dirty="0"/>
+              <a:t> </a:t>
+            </a:r>
+            <a:r>
+              <a:rPr lang="de-DE" dirty="0" err="1"/>
+              <a:t>the</a:t>
+            </a:r>
+            <a:r>
+              <a:rPr lang="de-DE" dirty="0"/>
+              <a:t> </a:t>
+            </a:r>
+            <a:r>
+              <a:rPr lang="de-DE" dirty="0" err="1"/>
+              <a:t>data</a:t>
+            </a:r>
+            <a:r>
+              <a:rPr lang="de-DE" dirty="0"/>
+              <a:t> </a:t>
+            </a:r>
+            <a:r>
+              <a:rPr lang="de-DE" dirty="0" err="1"/>
+              <a:t>file</a:t>
+            </a:r>
+            <a:r>
+              <a:rPr lang="de-DE" dirty="0"/>
+              <a:t> in </a:t>
+            </a:r>
+            <a:r>
+              <a:rPr lang="de-DE" dirty="0" err="1"/>
+              <a:t>the</a:t>
+            </a:r>
+            <a:r>
+              <a:rPr lang="de-DE" dirty="0"/>
+              <a:t> </a:t>
+            </a:r>
+            <a:r>
+              <a:rPr lang="de-DE" dirty="0" err="1"/>
+              <a:t>PlayerMovement</a:t>
+            </a:r>
+            <a:r>
+              <a:rPr lang="de-DE" dirty="0"/>
+              <a:t> </a:t>
+            </a:r>
+            <a:r>
+              <a:rPr lang="de-DE" dirty="0" err="1"/>
+              <a:t>script</a:t>
+            </a:r>
+            <a:r>
+              <a:rPr lang="de-DE" dirty="0"/>
+              <a:t>:</a:t>
+            </a:r>
+          </a:p>
+          <a:p>
+            <a:pPr lvl="2"/>
+            <a:r>
+              <a:rPr lang="de-DE" dirty="0"/>
+              <a:t> private </a:t>
+            </a:r>
+            <a:r>
+              <a:rPr lang="de-DE" dirty="0" err="1"/>
+              <a:t>string</a:t>
+            </a:r>
+            <a:r>
+              <a:rPr lang="de-DE" dirty="0"/>
+              <a:t> </a:t>
+            </a:r>
+            <a:r>
+              <a:rPr lang="de-DE" dirty="0" err="1"/>
+              <a:t>fileName</a:t>
+            </a:r>
+            <a:r>
+              <a:rPr lang="de-DE" dirty="0"/>
+              <a:t> = </a:t>
+            </a:r>
+            <a:r>
+              <a:rPr lang="de-DE" dirty="0" err="1"/>
+              <a:t>SubID</a:t>
+            </a:r>
+            <a:r>
+              <a:rPr lang="de-DE" dirty="0"/>
+              <a:t> + "_" + </a:t>
+            </a:r>
+            <a:r>
+              <a:rPr lang="de-DE" dirty="0" err="1"/>
+              <a:t>GetSubID.exptime</a:t>
+            </a:r>
+            <a:r>
+              <a:rPr lang="de-DE" dirty="0"/>
+              <a:t> + ".</a:t>
+            </a:r>
+            <a:r>
+              <a:rPr lang="de-DE" dirty="0" err="1"/>
+              <a:t>csv</a:t>
+            </a:r>
+            <a:r>
+              <a:rPr lang="de-DE" dirty="0"/>
+              <a:t>";</a:t>
+            </a:r>
+          </a:p>
+        </p:txBody>
+      </p:sp>
+    </p:spTree>
+    <p:extLst>
+      <p:ext uri="{BB962C8B-B14F-4D97-AF65-F5344CB8AC3E}">
+        <p14:creationId xmlns:p14="http://schemas.microsoft.com/office/powerpoint/2010/main" val="519959973"/>
       </p:ext>
     </p:extLst>
   </p:cSld>

</xml_diff>